<commit_message>
assignBlobsInOcclusion, test cases need to be done
</commit_message>
<xml_diff>
--- a/utilities/occlusion.pptx
+++ b/utilities/occlusion.pptx
@@ -6,6 +6,7 @@
   </p:sldMasterIdLst>
   <p:sldIdLst>
     <p:sldId id="276" r:id="rId2"/>
+    <p:sldId id="277" r:id="rId3"/>
   </p:sldIdLst>
   <p:sldSz cx="9144000" cy="6858000" type="screen4x3"/>
   <p:notesSz cx="6865938" cy="9996488"/>
@@ -288,7 +289,7 @@
           <a:p>
             <a:fld id="{7F847C87-CECF-4A9A-88F5-87615B577ED8}" type="datetimeFigureOut">
               <a:rPr lang="de-DE" smtClean="0"/>
-              <a:t>27.12.2018</a:t>
+              <a:t>13.01.2019</a:t>
             </a:fld>
             <a:endParaRPr lang="de-DE"/>
           </a:p>
@@ -467,7 +468,7 @@
           <a:p>
             <a:fld id="{7F847C87-CECF-4A9A-88F5-87615B577ED8}" type="datetimeFigureOut">
               <a:rPr lang="de-DE" smtClean="0"/>
-              <a:t>27.12.2018</a:t>
+              <a:t>13.01.2019</a:t>
             </a:fld>
             <a:endParaRPr lang="de-DE"/>
           </a:p>
@@ -647,7 +648,7 @@
           <a:p>
             <a:fld id="{7F847C87-CECF-4A9A-88F5-87615B577ED8}" type="datetimeFigureOut">
               <a:rPr lang="de-DE" smtClean="0"/>
-              <a:t>27.12.2018</a:t>
+              <a:t>13.01.2019</a:t>
             </a:fld>
             <a:endParaRPr lang="de-DE"/>
           </a:p>
@@ -881,7 +882,7 @@
           <a:p>
             <a:fld id="{7F847C87-CECF-4A9A-88F5-87615B577ED8}" type="datetimeFigureOut">
               <a:rPr lang="de-DE" smtClean="0"/>
-              <a:t>27.12.2018</a:t>
+              <a:t>13.01.2019</a:t>
             </a:fld>
             <a:endParaRPr lang="de-DE"/>
           </a:p>
@@ -1134,7 +1135,7 @@
           <a:p>
             <a:fld id="{7F847C87-CECF-4A9A-88F5-87615B577ED8}" type="datetimeFigureOut">
               <a:rPr lang="de-DE" smtClean="0"/>
-              <a:t>27.12.2018</a:t>
+              <a:t>13.01.2019</a:t>
             </a:fld>
             <a:endParaRPr lang="de-DE"/>
           </a:p>
@@ -1422,7 +1423,7 @@
           <a:p>
             <a:fld id="{7F847C87-CECF-4A9A-88F5-87615B577ED8}" type="datetimeFigureOut">
               <a:rPr lang="de-DE" smtClean="0"/>
-              <a:t>27.12.2018</a:t>
+              <a:t>13.01.2019</a:t>
             </a:fld>
             <a:endParaRPr lang="de-DE"/>
           </a:p>
@@ -1844,7 +1845,7 @@
           <a:p>
             <a:fld id="{7F847C87-CECF-4A9A-88F5-87615B577ED8}" type="datetimeFigureOut">
               <a:rPr lang="de-DE" smtClean="0"/>
-              <a:t>27.12.2018</a:t>
+              <a:t>13.01.2019</a:t>
             </a:fld>
             <a:endParaRPr lang="de-DE"/>
           </a:p>
@@ -1962,7 +1963,7 @@
           <a:p>
             <a:fld id="{7F847C87-CECF-4A9A-88F5-87615B577ED8}" type="datetimeFigureOut">
               <a:rPr lang="de-DE" smtClean="0"/>
-              <a:t>27.12.2018</a:t>
+              <a:t>13.01.2019</a:t>
             </a:fld>
             <a:endParaRPr lang="de-DE"/>
           </a:p>
@@ -2057,7 +2058,7 @@
           <a:p>
             <a:fld id="{7F847C87-CECF-4A9A-88F5-87615B577ED8}" type="datetimeFigureOut">
               <a:rPr lang="de-DE" smtClean="0"/>
-              <a:t>27.12.2018</a:t>
+              <a:t>13.01.2019</a:t>
             </a:fld>
             <a:endParaRPr lang="de-DE"/>
           </a:p>
@@ -2334,7 +2335,7 @@
           <a:p>
             <a:fld id="{7F847C87-CECF-4A9A-88F5-87615B577ED8}" type="datetimeFigureOut">
               <a:rPr lang="de-DE" smtClean="0"/>
-              <a:t>27.12.2018</a:t>
+              <a:t>13.01.2019</a:t>
             </a:fld>
             <a:endParaRPr lang="de-DE"/>
           </a:p>
@@ -2587,7 +2588,7 @@
           <a:p>
             <a:fld id="{7F847C87-CECF-4A9A-88F5-87615B577ED8}" type="datetimeFigureOut">
               <a:rPr lang="de-DE" smtClean="0"/>
-              <a:t>27.12.2018</a:t>
+              <a:t>13.01.2019</a:t>
             </a:fld>
             <a:endParaRPr lang="de-DE"/>
           </a:p>
@@ -2793,7 +2794,7 @@
           <a:p>
             <a:fld id="{7F847C87-CECF-4A9A-88F5-87615B577ED8}" type="datetimeFigureOut">
               <a:rPr lang="de-DE" smtClean="0"/>
-              <a:t>27.12.2018</a:t>
+              <a:t>13.01.2019</a:t>
             </a:fld>
             <a:endParaRPr lang="de-DE"/>
           </a:p>
@@ -3564,10 +3565,6 @@
               </a:rPr>
               <a:t> = 5</a:t>
             </a:r>
-            <a:endParaRPr lang="de-DE" sz="1200" i="1" dirty="0" smtClean="0">
-              <a:latin typeface="Times New Roman" panose="02020603050405020304" pitchFamily="18" charset="0"/>
-              <a:cs typeface="Times New Roman" panose="02020603050405020304" pitchFamily="18" charset="0"/>
-            </a:endParaRPr>
           </a:p>
         </p:txBody>
       </p:sp>
@@ -3651,10 +3648,6 @@
               </a:rPr>
               <a:t> = 10</a:t>
             </a:r>
-            <a:endParaRPr lang="de-DE" sz="1200" i="1" dirty="0" smtClean="0">
-              <a:latin typeface="Times New Roman" panose="02020603050405020304" pitchFamily="18" charset="0"/>
-              <a:cs typeface="Times New Roman" panose="02020603050405020304" pitchFamily="18" charset="0"/>
-            </a:endParaRPr>
           </a:p>
         </p:txBody>
       </p:sp>
@@ -4843,8 +4836,8 @@
           </a:p>
         </p:txBody>
       </p:sp>
-      <mc:AlternateContent xmlns:mc="http://schemas.openxmlformats.org/markup-compatibility/2006">
-        <mc:Choice xmlns:a14="http://schemas.microsoft.com/office/drawing/2010/main" Requires="a14">
+      <mc:AlternateContent xmlns:mc="http://schemas.openxmlformats.org/markup-compatibility/2006" xmlns:a14="http://schemas.microsoft.com/office/drawing/2010/main">
+        <mc:Choice Requires="a14">
           <p:sp>
             <p:nvSpPr>
               <p:cNvPr id="7" name="Textfeld 6"/>
@@ -4867,6 +4860,7 @@
               </a:bodyPr>
               <a:lstStyle/>
               <a:p>
+                <a:pPr/>
                 <a14:m>
                   <m:oMathPara xmlns:m="http://schemas.openxmlformats.org/officeDocument/2006/math">
                     <m:oMathParaPr>
@@ -5070,7 +5064,7 @@
             </p:txBody>
           </p:sp>
         </mc:Choice>
-        <mc:Fallback>
+        <mc:Fallback xmlns="">
           <p:sp>
             <p:nvSpPr>
               <p:cNvPr id="7" name="Textfeld 6"/>
@@ -5787,10 +5781,6 @@
               </a:rPr>
               <a:t> = 5</a:t>
             </a:r>
-            <a:endParaRPr lang="de-DE" sz="1200" i="1" dirty="0" smtClean="0">
-              <a:latin typeface="Times New Roman" panose="02020603050405020304" pitchFamily="18" charset="0"/>
-              <a:cs typeface="Times New Roman" panose="02020603050405020304" pitchFamily="18" charset="0"/>
-            </a:endParaRPr>
           </a:p>
         </p:txBody>
       </p:sp>
@@ -5837,10 +5827,6 @@
               </a:rPr>
               <a:t> = 10</a:t>
             </a:r>
-            <a:endParaRPr lang="de-DE" sz="1200" i="1" dirty="0" smtClean="0">
-              <a:latin typeface="Times New Roman" panose="02020603050405020304" pitchFamily="18" charset="0"/>
-              <a:cs typeface="Times New Roman" panose="02020603050405020304" pitchFamily="18" charset="0"/>
-            </a:endParaRPr>
           </a:p>
         </p:txBody>
       </p:sp>
@@ -6094,7 +6080,6 @@
               <a:rPr lang="de-DE" dirty="0" smtClean="0"/>
               <a:t> &lt; 0</a:t>
             </a:r>
-            <a:endParaRPr lang="de-DE" dirty="0" smtClean="0"/>
           </a:p>
         </p:txBody>
       </p:sp>
@@ -6470,6 +6455,2632 @@
     <p:extLst>
       <p:ext uri="{BB962C8B-B14F-4D97-AF65-F5344CB8AC3E}">
         <p14:creationId xmlns:p14="http://schemas.microsoft.com/office/powerpoint/2010/main" val="1512781419"/>
+      </p:ext>
+    </p:extLst>
+  </p:cSld>
+  <p:clrMapOvr>
+    <a:masterClrMapping/>
+  </p:clrMapOvr>
+  <p:timing>
+    <p:tnLst>
+      <p:par>
+        <p:cTn id="1" dur="indefinite" restart="never" nodeType="tmRoot"/>
+      </p:par>
+    </p:tnLst>
+  </p:timing>
+</p:sld>
+</file>
+
+<file path=ppt/slides/slide2.xml><?xml version="1.0" encoding="utf-8"?>
+<p:sld xmlns:a="http://schemas.openxmlformats.org/drawingml/2006/main" xmlns:r="http://schemas.openxmlformats.org/officeDocument/2006/relationships" xmlns:p="http://schemas.openxmlformats.org/presentationml/2006/main">
+  <p:cSld>
+    <p:spTree>
+      <p:nvGrpSpPr>
+        <p:cNvPr id="1" name=""/>
+        <p:cNvGrpSpPr/>
+        <p:nvPr/>
+      </p:nvGrpSpPr>
+      <p:grpSpPr>
+        <a:xfrm>
+          <a:off x="0" y="0"/>
+          <a:ext cx="0" cy="0"/>
+          <a:chOff x="0" y="0"/>
+          <a:chExt cx="0" cy="0"/>
+        </a:xfrm>
+      </p:grpSpPr>
+      <p:sp>
+        <p:nvSpPr>
+          <p:cNvPr id="2" name="Titel 1"/>
+          <p:cNvSpPr>
+            <a:spLocks noGrp="1"/>
+          </p:cNvSpPr>
+          <p:nvPr>
+            <p:ph type="title"/>
+          </p:nvPr>
+        </p:nvSpPr>
+        <p:spPr/>
+        <p:txBody>
+          <a:bodyPr/>
+          <a:lstStyle/>
+          <a:p>
+            <a:r>
+              <a:rPr lang="de-DE" dirty="0" err="1" smtClean="0"/>
+              <a:t>adjust</a:t>
+            </a:r>
+            <a:r>
+              <a:rPr lang="de-DE" dirty="0" smtClean="0"/>
+              <a:t>  </a:t>
+            </a:r>
+            <a:r>
+              <a:rPr lang="de-DE" dirty="0" err="1" smtClean="0"/>
+              <a:t>substitute</a:t>
+            </a:r>
+            <a:r>
+              <a:rPr lang="de-DE" dirty="0" smtClean="0"/>
+              <a:t> </a:t>
+            </a:r>
+            <a:r>
+              <a:rPr lang="de-DE" dirty="0" err="1" smtClean="0"/>
+              <a:t>rect</a:t>
+            </a:r>
+            <a:r>
+              <a:rPr lang="de-DE" dirty="0" smtClean="0"/>
+              <a:t> </a:t>
+            </a:r>
+            <a:r>
+              <a:rPr lang="de-DE" dirty="0" err="1" smtClean="0"/>
+              <a:t>depending</a:t>
+            </a:r>
+            <a:r>
+              <a:rPr lang="de-DE" dirty="0" smtClean="0"/>
+              <a:t> on </a:t>
+            </a:r>
+            <a:r>
+              <a:rPr lang="de-DE" dirty="0" err="1" smtClean="0"/>
+              <a:t>blob</a:t>
+            </a:r>
+            <a:r>
+              <a:rPr lang="de-DE" dirty="0" smtClean="0"/>
+              <a:t> </a:t>
+            </a:r>
+            <a:r>
+              <a:rPr lang="de-DE" dirty="0" err="1" smtClean="0"/>
+              <a:t>edges</a:t>
+            </a:r>
+            <a:endParaRPr lang="de-DE" dirty="0"/>
+          </a:p>
+        </p:txBody>
+      </p:sp>
+      <p:sp>
+        <p:nvSpPr>
+          <p:cNvPr id="3" name="Rechteck 2"/>
+          <p:cNvSpPr/>
+          <p:nvPr/>
+        </p:nvSpPr>
+        <p:spPr>
+          <a:xfrm>
+            <a:off x="4305767" y="1838992"/>
+            <a:ext cx="1440000" cy="720000"/>
+          </a:xfrm>
+          <a:prstGeom prst="rect">
+            <a:avLst/>
+          </a:prstGeom>
+          <a:noFill/>
+          <a:ln w="19050">
+            <a:solidFill>
+              <a:srgbClr val="0070C0"/>
+            </a:solidFill>
+            <a:prstDash val="dash"/>
+          </a:ln>
+        </p:spPr>
+        <p:style>
+          <a:lnRef idx="2">
+            <a:schemeClr val="accent1">
+              <a:shade val="50000"/>
+            </a:schemeClr>
+          </a:lnRef>
+          <a:fillRef idx="1">
+            <a:schemeClr val="accent1"/>
+          </a:fillRef>
+          <a:effectRef idx="0">
+            <a:schemeClr val="accent1"/>
+          </a:effectRef>
+          <a:fontRef idx="minor">
+            <a:schemeClr val="lt1"/>
+          </a:fontRef>
+        </p:style>
+        <p:txBody>
+          <a:bodyPr rtlCol="0" anchor="ctr"/>
+          <a:lstStyle/>
+          <a:p>
+            <a:pPr algn="ctr"/>
+            <a:endParaRPr lang="de-DE"/>
+          </a:p>
+        </p:txBody>
+      </p:sp>
+      <p:sp>
+        <p:nvSpPr>
+          <p:cNvPr id="4" name="Rechteck 3"/>
+          <p:cNvSpPr/>
+          <p:nvPr/>
+        </p:nvSpPr>
+        <p:spPr>
+          <a:xfrm>
+            <a:off x="3225607" y="2013436"/>
+            <a:ext cx="720000" cy="540000"/>
+          </a:xfrm>
+          <a:prstGeom prst="rect">
+            <a:avLst/>
+          </a:prstGeom>
+          <a:noFill/>
+          <a:ln w="19050">
+            <a:solidFill>
+              <a:schemeClr val="tx1"/>
+            </a:solidFill>
+            <a:prstDash val="dash"/>
+          </a:ln>
+        </p:spPr>
+        <p:style>
+          <a:lnRef idx="2">
+            <a:schemeClr val="accent1">
+              <a:shade val="50000"/>
+            </a:schemeClr>
+          </a:lnRef>
+          <a:fillRef idx="1">
+            <a:schemeClr val="accent1"/>
+          </a:fillRef>
+          <a:effectRef idx="0">
+            <a:schemeClr val="accent1"/>
+          </a:effectRef>
+          <a:fontRef idx="minor">
+            <a:schemeClr val="lt1"/>
+          </a:fontRef>
+        </p:style>
+        <p:txBody>
+          <a:bodyPr rtlCol="0" anchor="ctr"/>
+          <a:lstStyle/>
+          <a:p>
+            <a:pPr algn="ctr"/>
+            <a:endParaRPr lang="de-DE"/>
+          </a:p>
+        </p:txBody>
+      </p:sp>
+      <p:cxnSp>
+        <p:nvCxnSpPr>
+          <p:cNvPr id="5" name="Gerade Verbindung mit Pfeil 4"/>
+          <p:cNvCxnSpPr/>
+          <p:nvPr/>
+        </p:nvCxnSpPr>
+        <p:spPr>
+          <a:xfrm>
+            <a:off x="3321489" y="1722734"/>
+            <a:ext cx="540000" cy="0"/>
+          </a:xfrm>
+          <a:prstGeom prst="straightConnector1">
+            <a:avLst/>
+          </a:prstGeom>
+          <a:ln w="19050">
+            <a:solidFill>
+              <a:schemeClr val="tx1"/>
+            </a:solidFill>
+            <a:headEnd type="none" w="med" len="med"/>
+            <a:tailEnd type="triangle" w="med" len="med"/>
+          </a:ln>
+        </p:spPr>
+        <p:style>
+          <a:lnRef idx="1">
+            <a:schemeClr val="accent1"/>
+          </a:lnRef>
+          <a:fillRef idx="0">
+            <a:schemeClr val="accent1"/>
+          </a:fillRef>
+          <a:effectRef idx="0">
+            <a:schemeClr val="accent1"/>
+          </a:effectRef>
+          <a:fontRef idx="minor">
+            <a:schemeClr val="tx1"/>
+          </a:fontRef>
+        </p:style>
+      </p:cxnSp>
+      <p:sp>
+        <p:nvSpPr>
+          <p:cNvPr id="6" name="Textfeld 5"/>
+          <p:cNvSpPr txBox="1"/>
+          <p:nvPr/>
+        </p:nvSpPr>
+        <p:spPr>
+          <a:xfrm>
+            <a:off x="3276961" y="1453611"/>
+            <a:ext cx="570990" cy="276999"/>
+          </a:xfrm>
+          <a:prstGeom prst="rect">
+            <a:avLst/>
+          </a:prstGeom>
+          <a:noFill/>
+        </p:spPr>
+        <p:txBody>
+          <a:bodyPr wrap="none" rtlCol="0">
+            <a:spAutoFit/>
+          </a:bodyPr>
+          <a:lstStyle/>
+          <a:p>
+            <a:r>
+              <a:rPr lang="de-DE" sz="1200" i="1" dirty="0" err="1" smtClean="0">
+                <a:latin typeface="Times New Roman" panose="02020603050405020304" pitchFamily="18" charset="0"/>
+                <a:cs typeface="Times New Roman" panose="02020603050405020304" pitchFamily="18" charset="0"/>
+              </a:rPr>
+              <a:t>v</a:t>
+            </a:r>
+            <a:r>
+              <a:rPr lang="de-DE" sz="1200" i="1" baseline="-25000" dirty="0" err="1" smtClean="0">
+                <a:latin typeface="Times New Roman" panose="02020603050405020304" pitchFamily="18" charset="0"/>
+                <a:cs typeface="Times New Roman" panose="02020603050405020304" pitchFamily="18" charset="0"/>
+              </a:rPr>
+              <a:t>R</a:t>
+            </a:r>
+            <a:r>
+              <a:rPr lang="de-DE" sz="1200" i="1" dirty="0" smtClean="0">
+                <a:latin typeface="Times New Roman" panose="02020603050405020304" pitchFamily="18" charset="0"/>
+                <a:cs typeface="Times New Roman" panose="02020603050405020304" pitchFamily="18" charset="0"/>
+              </a:rPr>
+              <a:t> = 5</a:t>
+            </a:r>
+          </a:p>
+        </p:txBody>
+      </p:sp>
+      <p:cxnSp>
+        <p:nvCxnSpPr>
+          <p:cNvPr id="7" name="Gerade Verbindung mit Pfeil 6"/>
+          <p:cNvCxnSpPr/>
+          <p:nvPr/>
+        </p:nvCxnSpPr>
+        <p:spPr>
+          <a:xfrm flipH="1">
+            <a:off x="4737755" y="1722734"/>
+            <a:ext cx="540000" cy="0"/>
+          </a:xfrm>
+          <a:prstGeom prst="straightConnector1">
+            <a:avLst/>
+          </a:prstGeom>
+          <a:ln w="19050">
+            <a:solidFill>
+              <a:srgbClr val="0070C0"/>
+            </a:solidFill>
+            <a:headEnd type="none" w="med" len="med"/>
+            <a:tailEnd type="triangle" w="med" len="med"/>
+          </a:ln>
+        </p:spPr>
+        <p:style>
+          <a:lnRef idx="1">
+            <a:schemeClr val="accent1"/>
+          </a:lnRef>
+          <a:fillRef idx="0">
+            <a:schemeClr val="accent1"/>
+          </a:fillRef>
+          <a:effectRef idx="0">
+            <a:schemeClr val="accent1"/>
+          </a:effectRef>
+          <a:fontRef idx="minor">
+            <a:schemeClr val="tx1"/>
+          </a:fontRef>
+        </p:style>
+      </p:cxnSp>
+      <p:sp>
+        <p:nvSpPr>
+          <p:cNvPr id="8" name="Textfeld 7"/>
+          <p:cNvSpPr txBox="1"/>
+          <p:nvPr/>
+        </p:nvSpPr>
+        <p:spPr>
+          <a:xfrm>
+            <a:off x="4687979" y="1453611"/>
+            <a:ext cx="661784" cy="276999"/>
+          </a:xfrm>
+          <a:prstGeom prst="rect">
+            <a:avLst/>
+          </a:prstGeom>
+          <a:noFill/>
+        </p:spPr>
+        <p:txBody>
+          <a:bodyPr wrap="none" rtlCol="0">
+            <a:spAutoFit/>
+          </a:bodyPr>
+          <a:lstStyle/>
+          <a:p>
+            <a:r>
+              <a:rPr lang="de-DE" sz="1200" i="1" dirty="0" err="1" smtClean="0">
+                <a:solidFill>
+                  <a:srgbClr val="0070C0"/>
+                </a:solidFill>
+                <a:latin typeface="Times New Roman" panose="02020603050405020304" pitchFamily="18" charset="0"/>
+                <a:cs typeface="Times New Roman" panose="02020603050405020304" pitchFamily="18" charset="0"/>
+              </a:rPr>
+              <a:t>v</a:t>
+            </a:r>
+            <a:r>
+              <a:rPr lang="de-DE" sz="1200" i="1" baseline="-25000" dirty="0" err="1" smtClean="0">
+                <a:solidFill>
+                  <a:srgbClr val="0070C0"/>
+                </a:solidFill>
+                <a:latin typeface="Times New Roman" panose="02020603050405020304" pitchFamily="18" charset="0"/>
+                <a:cs typeface="Times New Roman" panose="02020603050405020304" pitchFamily="18" charset="0"/>
+              </a:rPr>
+              <a:t>L</a:t>
+            </a:r>
+            <a:r>
+              <a:rPr lang="de-DE" sz="1200" i="1" dirty="0" smtClean="0">
+                <a:solidFill>
+                  <a:srgbClr val="0070C0"/>
+                </a:solidFill>
+                <a:latin typeface="Times New Roman" panose="02020603050405020304" pitchFamily="18" charset="0"/>
+                <a:cs typeface="Times New Roman" panose="02020603050405020304" pitchFamily="18" charset="0"/>
+              </a:rPr>
+              <a:t> = 10</a:t>
+            </a:r>
+          </a:p>
+        </p:txBody>
+      </p:sp>
+      <p:sp>
+        <p:nvSpPr>
+          <p:cNvPr id="9" name="Textfeld 8"/>
+          <p:cNvSpPr txBox="1"/>
+          <p:nvPr/>
+        </p:nvSpPr>
+        <p:spPr>
+          <a:xfrm>
+            <a:off x="3272890" y="1093571"/>
+            <a:ext cx="636713" cy="461665"/>
+          </a:xfrm>
+          <a:prstGeom prst="rect">
+            <a:avLst/>
+          </a:prstGeom>
+          <a:noFill/>
+        </p:spPr>
+        <p:txBody>
+          <a:bodyPr wrap="none" rtlCol="0">
+            <a:spAutoFit/>
+          </a:bodyPr>
+          <a:lstStyle/>
+          <a:p>
+            <a:r>
+              <a:rPr lang="de-DE" sz="1200" dirty="0" err="1" smtClean="0">
+                <a:latin typeface="Arial" panose="020B0604020202020204" pitchFamily="34" charset="0"/>
+                <a:cs typeface="Arial" panose="020B0604020202020204" pitchFamily="34" charset="0"/>
+              </a:rPr>
+              <a:t>moves</a:t>
+            </a:r>
+            <a:r>
+              <a:rPr lang="de-DE" sz="1200" dirty="0" smtClean="0">
+                <a:latin typeface="Arial" panose="020B0604020202020204" pitchFamily="34" charset="0"/>
+                <a:cs typeface="Arial" panose="020B0604020202020204" pitchFamily="34" charset="0"/>
+              </a:rPr>
+              <a:t/>
+            </a:r>
+            <a:br>
+              <a:rPr lang="de-DE" sz="1200" dirty="0" smtClean="0">
+                <a:latin typeface="Arial" panose="020B0604020202020204" pitchFamily="34" charset="0"/>
+                <a:cs typeface="Arial" panose="020B0604020202020204" pitchFamily="34" charset="0"/>
+              </a:rPr>
+            </a:br>
+            <a:r>
+              <a:rPr lang="de-DE" sz="1200" dirty="0" err="1" smtClean="0">
+                <a:latin typeface="Arial" panose="020B0604020202020204" pitchFamily="34" charset="0"/>
+                <a:cs typeface="Arial" panose="020B0604020202020204" pitchFamily="34" charset="0"/>
+              </a:rPr>
+              <a:t>Right</a:t>
+            </a:r>
+            <a:endParaRPr lang="de-DE" sz="1200" dirty="0" smtClean="0">
+              <a:latin typeface="Arial" panose="020B0604020202020204" pitchFamily="34" charset="0"/>
+              <a:cs typeface="Arial" panose="020B0604020202020204" pitchFamily="34" charset="0"/>
+            </a:endParaRPr>
+          </a:p>
+        </p:txBody>
+      </p:sp>
+      <p:sp>
+        <p:nvSpPr>
+          <p:cNvPr id="10" name="Textfeld 9"/>
+          <p:cNvSpPr txBox="1"/>
+          <p:nvPr/>
+        </p:nvSpPr>
+        <p:spPr>
+          <a:xfrm>
+            <a:off x="4593679" y="1165579"/>
+            <a:ext cx="893193" cy="276999"/>
+          </a:xfrm>
+          <a:prstGeom prst="rect">
+            <a:avLst/>
+          </a:prstGeom>
+          <a:noFill/>
+        </p:spPr>
+        <p:txBody>
+          <a:bodyPr wrap="none" rtlCol="0">
+            <a:spAutoFit/>
+          </a:bodyPr>
+          <a:lstStyle/>
+          <a:p>
+            <a:r>
+              <a:rPr lang="de-DE" sz="1200" dirty="0" err="1" smtClean="0">
+                <a:solidFill>
+                  <a:srgbClr val="0070C0"/>
+                </a:solidFill>
+                <a:latin typeface="Arial" panose="020B0604020202020204" pitchFamily="34" charset="0"/>
+                <a:cs typeface="Arial" panose="020B0604020202020204" pitchFamily="34" charset="0"/>
+              </a:rPr>
+              <a:t>movesLeft</a:t>
+            </a:r>
+            <a:endParaRPr lang="de-DE" sz="1200" dirty="0" smtClean="0">
+              <a:solidFill>
+                <a:srgbClr val="0070C0"/>
+              </a:solidFill>
+              <a:latin typeface="Arial" panose="020B0604020202020204" pitchFamily="34" charset="0"/>
+              <a:cs typeface="Arial" panose="020B0604020202020204" pitchFamily="34" charset="0"/>
+            </a:endParaRPr>
+          </a:p>
+        </p:txBody>
+      </p:sp>
+      <p:sp>
+        <p:nvSpPr>
+          <p:cNvPr id="36" name="Rechteck 35"/>
+          <p:cNvSpPr/>
+          <p:nvPr/>
+        </p:nvSpPr>
+        <p:spPr>
+          <a:xfrm>
+            <a:off x="3405627" y="2029735"/>
+            <a:ext cx="720000" cy="540000"/>
+          </a:xfrm>
+          <a:prstGeom prst="rect">
+            <a:avLst/>
+          </a:prstGeom>
+          <a:noFill/>
+          <a:ln w="19050">
+            <a:solidFill>
+              <a:schemeClr val="tx1"/>
+            </a:solidFill>
+          </a:ln>
+        </p:spPr>
+        <p:style>
+          <a:lnRef idx="2">
+            <a:schemeClr val="accent1">
+              <a:shade val="50000"/>
+            </a:schemeClr>
+          </a:lnRef>
+          <a:fillRef idx="1">
+            <a:schemeClr val="accent1"/>
+          </a:fillRef>
+          <a:effectRef idx="0">
+            <a:schemeClr val="accent1"/>
+          </a:effectRef>
+          <a:fontRef idx="minor">
+            <a:schemeClr val="lt1"/>
+          </a:fontRef>
+        </p:style>
+        <p:txBody>
+          <a:bodyPr rtlCol="0" anchor="ctr"/>
+          <a:lstStyle/>
+          <a:p>
+            <a:pPr algn="ctr"/>
+            <a:endParaRPr lang="de-DE"/>
+          </a:p>
+        </p:txBody>
+      </p:sp>
+      <p:sp>
+        <p:nvSpPr>
+          <p:cNvPr id="37" name="Rechteck 36"/>
+          <p:cNvSpPr/>
+          <p:nvPr/>
+        </p:nvSpPr>
+        <p:spPr>
+          <a:xfrm>
+            <a:off x="3945527" y="1849735"/>
+            <a:ext cx="1440000" cy="720000"/>
+          </a:xfrm>
+          <a:prstGeom prst="rect">
+            <a:avLst/>
+          </a:prstGeom>
+          <a:noFill/>
+          <a:ln w="19050">
+            <a:solidFill>
+              <a:srgbClr val="0070C0"/>
+            </a:solidFill>
+          </a:ln>
+        </p:spPr>
+        <p:style>
+          <a:lnRef idx="2">
+            <a:schemeClr val="accent1">
+              <a:shade val="50000"/>
+            </a:schemeClr>
+          </a:lnRef>
+          <a:fillRef idx="1">
+            <a:schemeClr val="accent1"/>
+          </a:fillRef>
+          <a:effectRef idx="0">
+            <a:schemeClr val="accent1"/>
+          </a:effectRef>
+          <a:fontRef idx="minor">
+            <a:schemeClr val="lt1"/>
+          </a:fontRef>
+        </p:style>
+        <p:txBody>
+          <a:bodyPr rtlCol="0" anchor="ctr"/>
+          <a:lstStyle/>
+          <a:p>
+            <a:pPr algn="ctr"/>
+            <a:endParaRPr lang="de-DE"/>
+          </a:p>
+        </p:txBody>
+      </p:sp>
+      <p:sp>
+        <p:nvSpPr>
+          <p:cNvPr id="40" name="Rechteck 39"/>
+          <p:cNvSpPr/>
+          <p:nvPr/>
+        </p:nvSpPr>
+        <p:spPr>
+          <a:xfrm>
+            <a:off x="3447732" y="1830134"/>
+            <a:ext cx="1859949" cy="764492"/>
+          </a:xfrm>
+          <a:prstGeom prst="rect">
+            <a:avLst/>
+          </a:prstGeom>
+          <a:noFill/>
+          <a:ln w="38100">
+            <a:solidFill>
+              <a:srgbClr val="FF0000"/>
+            </a:solidFill>
+          </a:ln>
+        </p:spPr>
+        <p:style>
+          <a:lnRef idx="2">
+            <a:schemeClr val="accent1">
+              <a:shade val="50000"/>
+            </a:schemeClr>
+          </a:lnRef>
+          <a:fillRef idx="1">
+            <a:schemeClr val="accent1"/>
+          </a:fillRef>
+          <a:effectRef idx="0">
+            <a:schemeClr val="accent1"/>
+          </a:effectRef>
+          <a:fontRef idx="minor">
+            <a:schemeClr val="lt1"/>
+          </a:fontRef>
+        </p:style>
+        <p:txBody>
+          <a:bodyPr rtlCol="0" anchor="ctr"/>
+          <a:lstStyle/>
+          <a:p>
+            <a:pPr algn="ctr"/>
+            <a:endParaRPr lang="de-DE"/>
+          </a:p>
+        </p:txBody>
+      </p:sp>
+      <p:sp>
+        <p:nvSpPr>
+          <p:cNvPr id="38" name="Rechteck 37"/>
+          <p:cNvSpPr/>
+          <p:nvPr/>
+        </p:nvSpPr>
+        <p:spPr>
+          <a:xfrm>
+            <a:off x="3477635" y="2029675"/>
+            <a:ext cx="720000" cy="540000"/>
+          </a:xfrm>
+          <a:prstGeom prst="rect">
+            <a:avLst/>
+          </a:prstGeom>
+          <a:noFill/>
+          <a:ln w="38100">
+            <a:solidFill>
+              <a:schemeClr val="tx1"/>
+            </a:solidFill>
+          </a:ln>
+        </p:spPr>
+        <p:style>
+          <a:lnRef idx="2">
+            <a:schemeClr val="accent1">
+              <a:shade val="50000"/>
+            </a:schemeClr>
+          </a:lnRef>
+          <a:fillRef idx="1">
+            <a:schemeClr val="accent1"/>
+          </a:fillRef>
+          <a:effectRef idx="0">
+            <a:schemeClr val="accent1"/>
+          </a:effectRef>
+          <a:fontRef idx="minor">
+            <a:schemeClr val="lt1"/>
+          </a:fontRef>
+        </p:style>
+        <p:txBody>
+          <a:bodyPr rtlCol="0" anchor="ctr"/>
+          <a:lstStyle/>
+          <a:p>
+            <a:pPr algn="ctr"/>
+            <a:endParaRPr lang="de-DE"/>
+          </a:p>
+        </p:txBody>
+      </p:sp>
+      <p:sp>
+        <p:nvSpPr>
+          <p:cNvPr id="39" name="Rechteck 38"/>
+          <p:cNvSpPr/>
+          <p:nvPr/>
+        </p:nvSpPr>
+        <p:spPr>
+          <a:xfrm>
+            <a:off x="3837595" y="1849655"/>
+            <a:ext cx="1440000" cy="720000"/>
+          </a:xfrm>
+          <a:prstGeom prst="rect">
+            <a:avLst/>
+          </a:prstGeom>
+          <a:noFill/>
+          <a:ln w="38100">
+            <a:solidFill>
+              <a:srgbClr val="0070C0"/>
+            </a:solidFill>
+          </a:ln>
+        </p:spPr>
+        <p:style>
+          <a:lnRef idx="2">
+            <a:schemeClr val="accent1">
+              <a:shade val="50000"/>
+            </a:schemeClr>
+          </a:lnRef>
+          <a:fillRef idx="1">
+            <a:schemeClr val="accent1"/>
+          </a:fillRef>
+          <a:effectRef idx="0">
+            <a:schemeClr val="accent1"/>
+          </a:effectRef>
+          <a:fontRef idx="minor">
+            <a:schemeClr val="lt1"/>
+          </a:fontRef>
+        </p:style>
+        <p:txBody>
+          <a:bodyPr rtlCol="0" anchor="ctr"/>
+          <a:lstStyle/>
+          <a:p>
+            <a:pPr algn="ctr"/>
+            <a:endParaRPr lang="de-DE"/>
+          </a:p>
+        </p:txBody>
+      </p:sp>
+      <p:sp>
+        <p:nvSpPr>
+          <p:cNvPr id="41" name="Textfeld 40"/>
+          <p:cNvSpPr txBox="1"/>
+          <p:nvPr/>
+        </p:nvSpPr>
+        <p:spPr>
+          <a:xfrm>
+            <a:off x="4154008" y="2971981"/>
+            <a:ext cx="511679" cy="276999"/>
+          </a:xfrm>
+          <a:prstGeom prst="rect">
+            <a:avLst/>
+          </a:prstGeom>
+          <a:noFill/>
+          <a:ln w="38100">
+            <a:solidFill>
+              <a:srgbClr val="FF0000"/>
+            </a:solidFill>
+          </a:ln>
+        </p:spPr>
+        <p:txBody>
+          <a:bodyPr wrap="none" rtlCol="0">
+            <a:spAutoFit/>
+          </a:bodyPr>
+          <a:lstStyle/>
+          <a:p>
+            <a:r>
+              <a:rPr lang="de-DE" sz="1200" b="1" dirty="0" err="1" smtClean="0">
+                <a:solidFill>
+                  <a:srgbClr val="FF0000"/>
+                </a:solidFill>
+                <a:latin typeface="Arial" panose="020B0604020202020204" pitchFamily="34" charset="0"/>
+                <a:cs typeface="Arial" panose="020B0604020202020204" pitchFamily="34" charset="0"/>
+              </a:rPr>
+              <a:t>blob</a:t>
+            </a:r>
+            <a:endParaRPr lang="de-DE" sz="1200" b="1" dirty="0" smtClean="0">
+              <a:solidFill>
+                <a:srgbClr val="FF0000"/>
+              </a:solidFill>
+              <a:latin typeface="Arial" panose="020B0604020202020204" pitchFamily="34" charset="0"/>
+              <a:cs typeface="Arial" panose="020B0604020202020204" pitchFamily="34" charset="0"/>
+            </a:endParaRPr>
+          </a:p>
+        </p:txBody>
+      </p:sp>
+      <p:sp>
+        <p:nvSpPr>
+          <p:cNvPr id="42" name="Textfeld 41"/>
+          <p:cNvSpPr txBox="1"/>
+          <p:nvPr/>
+        </p:nvSpPr>
+        <p:spPr>
+          <a:xfrm>
+            <a:off x="2073398" y="2339544"/>
+            <a:ext cx="785793" cy="276999"/>
+          </a:xfrm>
+          <a:prstGeom prst="rect">
+            <a:avLst/>
+          </a:prstGeom>
+          <a:noFill/>
+          <a:ln w="19050">
+            <a:solidFill>
+              <a:schemeClr val="tx1"/>
+            </a:solidFill>
+          </a:ln>
+        </p:spPr>
+        <p:txBody>
+          <a:bodyPr wrap="none" rtlCol="0">
+            <a:spAutoFit/>
+          </a:bodyPr>
+          <a:lstStyle/>
+          <a:p>
+            <a:r>
+              <a:rPr lang="de-DE" sz="1200" dirty="0" err="1" smtClean="0">
+                <a:latin typeface="Arial" panose="020B0604020202020204" pitchFamily="34" charset="0"/>
+                <a:cs typeface="Arial" panose="020B0604020202020204" pitchFamily="34" charset="0"/>
+              </a:rPr>
+              <a:t>right</a:t>
+            </a:r>
+            <a:r>
+              <a:rPr lang="de-DE" sz="1200" dirty="0" smtClean="0">
+                <a:latin typeface="Arial" panose="020B0604020202020204" pitchFamily="34" charset="0"/>
+                <a:cs typeface="Arial" panose="020B0604020202020204" pitchFamily="34" charset="0"/>
+              </a:rPr>
+              <a:t> n+1</a:t>
+            </a:r>
+            <a:endParaRPr lang="de-DE" sz="1200" dirty="0" smtClean="0">
+              <a:latin typeface="Arial" panose="020B0604020202020204" pitchFamily="34" charset="0"/>
+              <a:cs typeface="Arial" panose="020B0604020202020204" pitchFamily="34" charset="0"/>
+            </a:endParaRPr>
+          </a:p>
+        </p:txBody>
+      </p:sp>
+      <p:sp>
+        <p:nvSpPr>
+          <p:cNvPr id="43" name="Textfeld 42"/>
+          <p:cNvSpPr txBox="1"/>
+          <p:nvPr/>
+        </p:nvSpPr>
+        <p:spPr>
+          <a:xfrm>
+            <a:off x="2073398" y="2774725"/>
+            <a:ext cx="1516762" cy="276999"/>
+          </a:xfrm>
+          <a:prstGeom prst="rect">
+            <a:avLst/>
+          </a:prstGeom>
+          <a:noFill/>
+          <a:ln w="38100">
+            <a:solidFill>
+              <a:schemeClr val="tx1"/>
+            </a:solidFill>
+          </a:ln>
+        </p:spPr>
+        <p:txBody>
+          <a:bodyPr wrap="none" rtlCol="0">
+            <a:spAutoFit/>
+          </a:bodyPr>
+          <a:lstStyle/>
+          <a:p>
+            <a:r>
+              <a:rPr lang="de-DE" sz="1200" b="1" dirty="0" err="1" smtClean="0">
+                <a:latin typeface="Arial" panose="020B0604020202020204" pitchFamily="34" charset="0"/>
+                <a:cs typeface="Arial" panose="020B0604020202020204" pitchFamily="34" charset="0"/>
+              </a:rPr>
+              <a:t>right</a:t>
+            </a:r>
+            <a:r>
+              <a:rPr lang="de-DE" sz="1200" b="1" dirty="0" smtClean="0">
+                <a:latin typeface="Arial" panose="020B0604020202020204" pitchFamily="34" charset="0"/>
+                <a:cs typeface="Arial" panose="020B0604020202020204" pitchFamily="34" charset="0"/>
+              </a:rPr>
+              <a:t> n+1 </a:t>
+            </a:r>
+            <a:r>
+              <a:rPr lang="de-DE" sz="1200" b="1" dirty="0" err="1" smtClean="0">
+                <a:latin typeface="Arial" panose="020B0604020202020204" pitchFamily="34" charset="0"/>
+                <a:cs typeface="Arial" panose="020B0604020202020204" pitchFamily="34" charset="0"/>
+              </a:rPr>
+              <a:t>adjusted</a:t>
+            </a:r>
+            <a:endParaRPr lang="de-DE" sz="1200" b="1" dirty="0" smtClean="0">
+              <a:latin typeface="Arial" panose="020B0604020202020204" pitchFamily="34" charset="0"/>
+              <a:cs typeface="Arial" panose="020B0604020202020204" pitchFamily="34" charset="0"/>
+            </a:endParaRPr>
+          </a:p>
+        </p:txBody>
+      </p:sp>
+      <p:cxnSp>
+        <p:nvCxnSpPr>
+          <p:cNvPr id="45" name="Gerade Verbindung mit Pfeil 44"/>
+          <p:cNvCxnSpPr/>
+          <p:nvPr/>
+        </p:nvCxnSpPr>
+        <p:spPr>
+          <a:xfrm flipV="1">
+            <a:off x="3602106" y="2590105"/>
+            <a:ext cx="153748" cy="320530"/>
+          </a:xfrm>
+          <a:prstGeom prst="straightConnector1">
+            <a:avLst/>
+          </a:prstGeom>
+          <a:ln w="19050">
+            <a:solidFill>
+              <a:schemeClr val="tx1"/>
+            </a:solidFill>
+            <a:headEnd type="none" w="med" len="med"/>
+            <a:tailEnd type="arrow"/>
+          </a:ln>
+        </p:spPr>
+        <p:style>
+          <a:lnRef idx="1">
+            <a:schemeClr val="accent1"/>
+          </a:lnRef>
+          <a:fillRef idx="0">
+            <a:schemeClr val="accent1"/>
+          </a:fillRef>
+          <a:effectRef idx="0">
+            <a:schemeClr val="accent1"/>
+          </a:effectRef>
+          <a:fontRef idx="minor">
+            <a:schemeClr val="tx1"/>
+          </a:fontRef>
+        </p:style>
+      </p:cxnSp>
+      <p:cxnSp>
+        <p:nvCxnSpPr>
+          <p:cNvPr id="46" name="Gerade Verbindung mit Pfeil 45"/>
+          <p:cNvCxnSpPr/>
+          <p:nvPr/>
+        </p:nvCxnSpPr>
+        <p:spPr>
+          <a:xfrm>
+            <a:off x="2684463" y="2101683"/>
+            <a:ext cx="546436" cy="0"/>
+          </a:xfrm>
+          <a:prstGeom prst="straightConnector1">
+            <a:avLst/>
+          </a:prstGeom>
+          <a:ln w="19050">
+            <a:solidFill>
+              <a:schemeClr val="tx1"/>
+            </a:solidFill>
+            <a:headEnd type="none" w="med" len="med"/>
+            <a:tailEnd type="arrow"/>
+          </a:ln>
+        </p:spPr>
+        <p:style>
+          <a:lnRef idx="1">
+            <a:schemeClr val="accent1"/>
+          </a:lnRef>
+          <a:fillRef idx="0">
+            <a:schemeClr val="accent1"/>
+          </a:fillRef>
+          <a:effectRef idx="0">
+            <a:schemeClr val="accent1"/>
+          </a:effectRef>
+          <a:fontRef idx="minor">
+            <a:schemeClr val="tx1"/>
+          </a:fontRef>
+        </p:style>
+      </p:cxnSp>
+      <p:cxnSp>
+        <p:nvCxnSpPr>
+          <p:cNvPr id="50" name="Gerade Verbindung mit Pfeil 49"/>
+          <p:cNvCxnSpPr>
+            <a:stCxn id="41" idx="0"/>
+          </p:cNvCxnSpPr>
+          <p:nvPr/>
+        </p:nvCxnSpPr>
+        <p:spPr>
+          <a:xfrm flipH="1" flipV="1">
+            <a:off x="4407925" y="2590105"/>
+            <a:ext cx="1923" cy="381876"/>
+          </a:xfrm>
+          <a:prstGeom prst="straightConnector1">
+            <a:avLst/>
+          </a:prstGeom>
+          <a:ln w="19050">
+            <a:solidFill>
+              <a:srgbClr val="FF0000"/>
+            </a:solidFill>
+            <a:headEnd type="none" w="med" len="med"/>
+            <a:tailEnd type="arrow"/>
+          </a:ln>
+        </p:spPr>
+        <p:style>
+          <a:lnRef idx="1">
+            <a:schemeClr val="accent1"/>
+          </a:lnRef>
+          <a:fillRef idx="0">
+            <a:schemeClr val="accent1"/>
+          </a:fillRef>
+          <a:effectRef idx="0">
+            <a:schemeClr val="accent1"/>
+          </a:effectRef>
+          <a:fontRef idx="minor">
+            <a:schemeClr val="tx1"/>
+          </a:fontRef>
+        </p:style>
+      </p:cxnSp>
+      <p:sp>
+        <p:nvSpPr>
+          <p:cNvPr id="53" name="Textfeld 52"/>
+          <p:cNvSpPr txBox="1"/>
+          <p:nvPr/>
+        </p:nvSpPr>
+        <p:spPr>
+          <a:xfrm>
+            <a:off x="5997835" y="2162772"/>
+            <a:ext cx="692818" cy="276999"/>
+          </a:xfrm>
+          <a:prstGeom prst="rect">
+            <a:avLst/>
+          </a:prstGeom>
+          <a:noFill/>
+          <a:ln w="19050">
+            <a:solidFill>
+              <a:srgbClr val="0070C0"/>
+            </a:solidFill>
+          </a:ln>
+        </p:spPr>
+        <p:txBody>
+          <a:bodyPr wrap="none" rtlCol="0">
+            <a:spAutoFit/>
+          </a:bodyPr>
+          <a:lstStyle/>
+          <a:p>
+            <a:r>
+              <a:rPr lang="de-DE" sz="1200" dirty="0" err="1" smtClean="0">
+                <a:solidFill>
+                  <a:srgbClr val="0070C0"/>
+                </a:solidFill>
+                <a:latin typeface="Arial" panose="020B0604020202020204" pitchFamily="34" charset="0"/>
+                <a:cs typeface="Arial" panose="020B0604020202020204" pitchFamily="34" charset="0"/>
+              </a:rPr>
+              <a:t>lef</a:t>
+            </a:r>
+            <a:r>
+              <a:rPr lang="de-DE" sz="1200" dirty="0" err="1" smtClean="0">
+                <a:solidFill>
+                  <a:srgbClr val="0070C0"/>
+                </a:solidFill>
+                <a:latin typeface="Arial" panose="020B0604020202020204" pitchFamily="34" charset="0"/>
+                <a:cs typeface="Arial" panose="020B0604020202020204" pitchFamily="34" charset="0"/>
+              </a:rPr>
+              <a:t>t</a:t>
+            </a:r>
+            <a:r>
+              <a:rPr lang="de-DE" sz="1200" dirty="0" smtClean="0">
+                <a:solidFill>
+                  <a:srgbClr val="0070C0"/>
+                </a:solidFill>
+                <a:latin typeface="Arial" panose="020B0604020202020204" pitchFamily="34" charset="0"/>
+                <a:cs typeface="Arial" panose="020B0604020202020204" pitchFamily="34" charset="0"/>
+              </a:rPr>
+              <a:t> n+1</a:t>
+            </a:r>
+            <a:endParaRPr lang="de-DE" sz="1200" dirty="0" smtClean="0">
+              <a:solidFill>
+                <a:srgbClr val="0070C0"/>
+              </a:solidFill>
+              <a:latin typeface="Arial" panose="020B0604020202020204" pitchFamily="34" charset="0"/>
+              <a:cs typeface="Arial" panose="020B0604020202020204" pitchFamily="34" charset="0"/>
+            </a:endParaRPr>
+          </a:p>
+        </p:txBody>
+      </p:sp>
+      <p:sp>
+        <p:nvSpPr>
+          <p:cNvPr id="54" name="Textfeld 53"/>
+          <p:cNvSpPr txBox="1"/>
+          <p:nvPr/>
+        </p:nvSpPr>
+        <p:spPr>
+          <a:xfrm>
+            <a:off x="5286101" y="2754446"/>
+            <a:ext cx="1404552" cy="276999"/>
+          </a:xfrm>
+          <a:prstGeom prst="rect">
+            <a:avLst/>
+          </a:prstGeom>
+          <a:noFill/>
+          <a:ln w="38100">
+            <a:solidFill>
+              <a:srgbClr val="0070C0"/>
+            </a:solidFill>
+          </a:ln>
+        </p:spPr>
+        <p:txBody>
+          <a:bodyPr wrap="none" rtlCol="0">
+            <a:spAutoFit/>
+          </a:bodyPr>
+          <a:lstStyle/>
+          <a:p>
+            <a:r>
+              <a:rPr lang="de-DE" sz="1200" b="1" dirty="0" err="1" smtClean="0">
+                <a:solidFill>
+                  <a:srgbClr val="0070C0"/>
+                </a:solidFill>
+                <a:latin typeface="Arial" panose="020B0604020202020204" pitchFamily="34" charset="0"/>
+                <a:cs typeface="Arial" panose="020B0604020202020204" pitchFamily="34" charset="0"/>
+              </a:rPr>
+              <a:t>left</a:t>
+            </a:r>
+            <a:r>
+              <a:rPr lang="de-DE" sz="1200" b="1" dirty="0" smtClean="0">
+                <a:solidFill>
+                  <a:srgbClr val="0070C0"/>
+                </a:solidFill>
+                <a:latin typeface="Arial" panose="020B0604020202020204" pitchFamily="34" charset="0"/>
+                <a:cs typeface="Arial" panose="020B0604020202020204" pitchFamily="34" charset="0"/>
+              </a:rPr>
+              <a:t> n+1 </a:t>
+            </a:r>
+            <a:r>
+              <a:rPr lang="de-DE" sz="1200" b="1" dirty="0" err="1" smtClean="0">
+                <a:solidFill>
+                  <a:srgbClr val="0070C0"/>
+                </a:solidFill>
+                <a:latin typeface="Arial" panose="020B0604020202020204" pitchFamily="34" charset="0"/>
+                <a:cs typeface="Arial" panose="020B0604020202020204" pitchFamily="34" charset="0"/>
+              </a:rPr>
+              <a:t>adjusted</a:t>
+            </a:r>
+            <a:endParaRPr lang="de-DE" sz="1200" b="1" dirty="0" smtClean="0">
+              <a:solidFill>
+                <a:srgbClr val="0070C0"/>
+              </a:solidFill>
+              <a:latin typeface="Arial" panose="020B0604020202020204" pitchFamily="34" charset="0"/>
+              <a:cs typeface="Arial" panose="020B0604020202020204" pitchFamily="34" charset="0"/>
+            </a:endParaRPr>
+          </a:p>
+        </p:txBody>
+      </p:sp>
+      <p:sp>
+        <p:nvSpPr>
+          <p:cNvPr id="55" name="Textfeld 54"/>
+          <p:cNvSpPr txBox="1"/>
+          <p:nvPr/>
+        </p:nvSpPr>
+        <p:spPr>
+          <a:xfrm>
+            <a:off x="2073398" y="1957667"/>
+            <a:ext cx="611065" cy="276999"/>
+          </a:xfrm>
+          <a:prstGeom prst="rect">
+            <a:avLst/>
+          </a:prstGeom>
+          <a:noFill/>
+          <a:ln w="19050">
+            <a:solidFill>
+              <a:schemeClr val="tx1"/>
+            </a:solidFill>
+            <a:prstDash val="dash"/>
+          </a:ln>
+        </p:spPr>
+        <p:txBody>
+          <a:bodyPr wrap="none" rtlCol="0">
+            <a:spAutoFit/>
+          </a:bodyPr>
+          <a:lstStyle/>
+          <a:p>
+            <a:r>
+              <a:rPr lang="de-DE" sz="1200" dirty="0" err="1" smtClean="0">
+                <a:latin typeface="Arial" panose="020B0604020202020204" pitchFamily="34" charset="0"/>
+                <a:cs typeface="Arial" panose="020B0604020202020204" pitchFamily="34" charset="0"/>
+              </a:rPr>
+              <a:t>right</a:t>
+            </a:r>
+            <a:r>
+              <a:rPr lang="de-DE" sz="1200" dirty="0" smtClean="0">
+                <a:latin typeface="Arial" panose="020B0604020202020204" pitchFamily="34" charset="0"/>
+                <a:cs typeface="Arial" panose="020B0604020202020204" pitchFamily="34" charset="0"/>
+              </a:rPr>
+              <a:t> n</a:t>
+            </a:r>
+            <a:endParaRPr lang="de-DE" sz="1200" dirty="0" smtClean="0">
+              <a:latin typeface="Arial" panose="020B0604020202020204" pitchFamily="34" charset="0"/>
+              <a:cs typeface="Arial" panose="020B0604020202020204" pitchFamily="34" charset="0"/>
+            </a:endParaRPr>
+          </a:p>
+        </p:txBody>
+      </p:sp>
+      <p:sp>
+        <p:nvSpPr>
+          <p:cNvPr id="57" name="Textfeld 56"/>
+          <p:cNvSpPr txBox="1"/>
+          <p:nvPr/>
+        </p:nvSpPr>
+        <p:spPr>
+          <a:xfrm>
+            <a:off x="6172562" y="1833334"/>
+            <a:ext cx="518091" cy="276999"/>
+          </a:xfrm>
+          <a:prstGeom prst="rect">
+            <a:avLst/>
+          </a:prstGeom>
+          <a:noFill/>
+          <a:ln w="19050">
+            <a:solidFill>
+              <a:srgbClr val="0070C0"/>
+            </a:solidFill>
+          </a:ln>
+        </p:spPr>
+        <p:txBody>
+          <a:bodyPr wrap="none" rtlCol="0">
+            <a:spAutoFit/>
+          </a:bodyPr>
+          <a:lstStyle/>
+          <a:p>
+            <a:r>
+              <a:rPr lang="de-DE" sz="1200" dirty="0" err="1" smtClean="0">
+                <a:solidFill>
+                  <a:srgbClr val="0070C0"/>
+                </a:solidFill>
+                <a:latin typeface="Arial" panose="020B0604020202020204" pitchFamily="34" charset="0"/>
+                <a:cs typeface="Arial" panose="020B0604020202020204" pitchFamily="34" charset="0"/>
+              </a:rPr>
+              <a:t>lef</a:t>
+            </a:r>
+            <a:r>
+              <a:rPr lang="de-DE" sz="1200" dirty="0" err="1" smtClean="0">
+                <a:solidFill>
+                  <a:srgbClr val="0070C0"/>
+                </a:solidFill>
+                <a:latin typeface="Arial" panose="020B0604020202020204" pitchFamily="34" charset="0"/>
+                <a:cs typeface="Arial" panose="020B0604020202020204" pitchFamily="34" charset="0"/>
+              </a:rPr>
+              <a:t>t</a:t>
+            </a:r>
+            <a:r>
+              <a:rPr lang="de-DE" sz="1200" dirty="0" smtClean="0">
+                <a:solidFill>
+                  <a:srgbClr val="0070C0"/>
+                </a:solidFill>
+                <a:latin typeface="Arial" panose="020B0604020202020204" pitchFamily="34" charset="0"/>
+                <a:cs typeface="Arial" panose="020B0604020202020204" pitchFamily="34" charset="0"/>
+              </a:rPr>
+              <a:t> n</a:t>
+            </a:r>
+            <a:endParaRPr lang="de-DE" sz="1200" dirty="0" smtClean="0">
+              <a:solidFill>
+                <a:srgbClr val="0070C0"/>
+              </a:solidFill>
+              <a:latin typeface="Arial" panose="020B0604020202020204" pitchFamily="34" charset="0"/>
+              <a:cs typeface="Arial" panose="020B0604020202020204" pitchFamily="34" charset="0"/>
+            </a:endParaRPr>
+          </a:p>
+        </p:txBody>
+      </p:sp>
+      <p:cxnSp>
+        <p:nvCxnSpPr>
+          <p:cNvPr id="58" name="Gerade Verbindung mit Pfeil 57"/>
+          <p:cNvCxnSpPr>
+            <a:stCxn id="57" idx="1"/>
+          </p:cNvCxnSpPr>
+          <p:nvPr/>
+        </p:nvCxnSpPr>
+        <p:spPr>
+          <a:xfrm flipH="1">
+            <a:off x="5745768" y="1971834"/>
+            <a:ext cx="426794" cy="1"/>
+          </a:xfrm>
+          <a:prstGeom prst="straightConnector1">
+            <a:avLst/>
+          </a:prstGeom>
+          <a:ln w="19050">
+            <a:solidFill>
+              <a:srgbClr val="0070C0"/>
+            </a:solidFill>
+            <a:headEnd type="none" w="med" len="med"/>
+            <a:tailEnd type="arrow"/>
+          </a:ln>
+        </p:spPr>
+        <p:style>
+          <a:lnRef idx="1">
+            <a:schemeClr val="accent1"/>
+          </a:lnRef>
+          <a:fillRef idx="0">
+            <a:schemeClr val="accent1"/>
+          </a:fillRef>
+          <a:effectRef idx="0">
+            <a:schemeClr val="accent1"/>
+          </a:effectRef>
+          <a:fontRef idx="minor">
+            <a:schemeClr val="tx1"/>
+          </a:fontRef>
+        </p:style>
+      </p:cxnSp>
+      <p:cxnSp>
+        <p:nvCxnSpPr>
+          <p:cNvPr id="61" name="Gerade Verbindung mit Pfeil 60"/>
+          <p:cNvCxnSpPr>
+            <a:stCxn id="53" idx="1"/>
+          </p:cNvCxnSpPr>
+          <p:nvPr/>
+        </p:nvCxnSpPr>
+        <p:spPr>
+          <a:xfrm flipH="1" flipV="1">
+            <a:off x="5397257" y="2299736"/>
+            <a:ext cx="600578" cy="1536"/>
+          </a:xfrm>
+          <a:prstGeom prst="straightConnector1">
+            <a:avLst/>
+          </a:prstGeom>
+          <a:ln w="19050">
+            <a:solidFill>
+              <a:srgbClr val="0070C0"/>
+            </a:solidFill>
+            <a:headEnd type="none" w="med" len="med"/>
+            <a:tailEnd type="arrow"/>
+          </a:ln>
+        </p:spPr>
+        <p:style>
+          <a:lnRef idx="1">
+            <a:schemeClr val="accent1"/>
+          </a:lnRef>
+          <a:fillRef idx="0">
+            <a:schemeClr val="accent1"/>
+          </a:fillRef>
+          <a:effectRef idx="0">
+            <a:schemeClr val="accent1"/>
+          </a:effectRef>
+          <a:fontRef idx="minor">
+            <a:schemeClr val="tx1"/>
+          </a:fontRef>
+        </p:style>
+      </p:cxnSp>
+      <p:cxnSp>
+        <p:nvCxnSpPr>
+          <p:cNvPr id="63" name="Gerade Verbindung mit Pfeil 62"/>
+          <p:cNvCxnSpPr>
+            <a:stCxn id="54" idx="1"/>
+          </p:cNvCxnSpPr>
+          <p:nvPr/>
+        </p:nvCxnSpPr>
+        <p:spPr>
+          <a:xfrm flipH="1" flipV="1">
+            <a:off x="5041390" y="2594626"/>
+            <a:ext cx="244711" cy="298320"/>
+          </a:xfrm>
+          <a:prstGeom prst="straightConnector1">
+            <a:avLst/>
+          </a:prstGeom>
+          <a:ln w="19050">
+            <a:solidFill>
+              <a:srgbClr val="0070C0"/>
+            </a:solidFill>
+            <a:headEnd type="none" w="med" len="med"/>
+            <a:tailEnd type="arrow"/>
+          </a:ln>
+        </p:spPr>
+        <p:style>
+          <a:lnRef idx="1">
+            <a:schemeClr val="accent1"/>
+          </a:lnRef>
+          <a:fillRef idx="0">
+            <a:schemeClr val="accent1"/>
+          </a:fillRef>
+          <a:effectRef idx="0">
+            <a:schemeClr val="accent1"/>
+          </a:effectRef>
+          <a:fontRef idx="minor">
+            <a:schemeClr val="tx1"/>
+          </a:fontRef>
+        </p:style>
+      </p:cxnSp>
+      <p:cxnSp>
+        <p:nvCxnSpPr>
+          <p:cNvPr id="69" name="Gerade Verbindung mit Pfeil 68"/>
+          <p:cNvCxnSpPr/>
+          <p:nvPr/>
+        </p:nvCxnSpPr>
+        <p:spPr>
+          <a:xfrm>
+            <a:off x="2859191" y="2478043"/>
+            <a:ext cx="546436" cy="0"/>
+          </a:xfrm>
+          <a:prstGeom prst="straightConnector1">
+            <a:avLst/>
+          </a:prstGeom>
+          <a:ln w="19050">
+            <a:solidFill>
+              <a:schemeClr val="tx1"/>
+            </a:solidFill>
+            <a:headEnd type="none" w="med" len="med"/>
+            <a:tailEnd type="arrow"/>
+          </a:ln>
+        </p:spPr>
+        <p:style>
+          <a:lnRef idx="1">
+            <a:schemeClr val="accent1"/>
+          </a:lnRef>
+          <a:fillRef idx="0">
+            <a:schemeClr val="accent1"/>
+          </a:fillRef>
+          <a:effectRef idx="0">
+            <a:schemeClr val="accent1"/>
+          </a:effectRef>
+          <a:fontRef idx="minor">
+            <a:schemeClr val="tx1"/>
+          </a:fontRef>
+        </p:style>
+      </p:cxnSp>
+      <p:sp>
+        <p:nvSpPr>
+          <p:cNvPr id="70" name="Rechteck 69"/>
+          <p:cNvSpPr/>
+          <p:nvPr/>
+        </p:nvSpPr>
+        <p:spPr>
+          <a:xfrm>
+            <a:off x="3261730" y="4575296"/>
+            <a:ext cx="1440000" cy="720000"/>
+          </a:xfrm>
+          <a:prstGeom prst="rect">
+            <a:avLst/>
+          </a:prstGeom>
+          <a:noFill/>
+          <a:ln w="19050">
+            <a:solidFill>
+              <a:srgbClr val="0070C0"/>
+            </a:solidFill>
+            <a:prstDash val="dash"/>
+          </a:ln>
+        </p:spPr>
+        <p:style>
+          <a:lnRef idx="2">
+            <a:schemeClr val="accent1">
+              <a:shade val="50000"/>
+            </a:schemeClr>
+          </a:lnRef>
+          <a:fillRef idx="1">
+            <a:schemeClr val="accent1"/>
+          </a:fillRef>
+          <a:effectRef idx="0">
+            <a:schemeClr val="accent1"/>
+          </a:effectRef>
+          <a:fontRef idx="minor">
+            <a:schemeClr val="lt1"/>
+          </a:fontRef>
+        </p:style>
+        <p:txBody>
+          <a:bodyPr rtlCol="0" anchor="ctr"/>
+          <a:lstStyle/>
+          <a:p>
+            <a:pPr algn="ctr"/>
+            <a:endParaRPr lang="de-DE"/>
+          </a:p>
+        </p:txBody>
+      </p:sp>
+      <p:sp>
+        <p:nvSpPr>
+          <p:cNvPr id="71" name="Rechteck 70"/>
+          <p:cNvSpPr/>
+          <p:nvPr/>
+        </p:nvSpPr>
+        <p:spPr>
+          <a:xfrm>
+            <a:off x="4161710" y="4749740"/>
+            <a:ext cx="720000" cy="540000"/>
+          </a:xfrm>
+          <a:prstGeom prst="rect">
+            <a:avLst/>
+          </a:prstGeom>
+          <a:noFill/>
+          <a:ln w="19050">
+            <a:solidFill>
+              <a:schemeClr val="tx1"/>
+            </a:solidFill>
+            <a:prstDash val="dash"/>
+          </a:ln>
+        </p:spPr>
+        <p:style>
+          <a:lnRef idx="2">
+            <a:schemeClr val="accent1">
+              <a:shade val="50000"/>
+            </a:schemeClr>
+          </a:lnRef>
+          <a:fillRef idx="1">
+            <a:schemeClr val="accent1"/>
+          </a:fillRef>
+          <a:effectRef idx="0">
+            <a:schemeClr val="accent1"/>
+          </a:effectRef>
+          <a:fontRef idx="minor">
+            <a:schemeClr val="lt1"/>
+          </a:fontRef>
+        </p:style>
+        <p:txBody>
+          <a:bodyPr rtlCol="0" anchor="ctr"/>
+          <a:lstStyle/>
+          <a:p>
+            <a:pPr algn="ctr"/>
+            <a:endParaRPr lang="de-DE"/>
+          </a:p>
+        </p:txBody>
+      </p:sp>
+      <p:cxnSp>
+        <p:nvCxnSpPr>
+          <p:cNvPr id="72" name="Gerade Verbindung mit Pfeil 71"/>
+          <p:cNvCxnSpPr/>
+          <p:nvPr/>
+        </p:nvCxnSpPr>
+        <p:spPr>
+          <a:xfrm>
+            <a:off x="4462257" y="4459038"/>
+            <a:ext cx="540000" cy="0"/>
+          </a:xfrm>
+          <a:prstGeom prst="straightConnector1">
+            <a:avLst/>
+          </a:prstGeom>
+          <a:ln w="19050">
+            <a:solidFill>
+              <a:schemeClr val="tx1"/>
+            </a:solidFill>
+            <a:headEnd type="none" w="med" len="med"/>
+            <a:tailEnd type="triangle" w="med" len="med"/>
+          </a:ln>
+        </p:spPr>
+        <p:style>
+          <a:lnRef idx="1">
+            <a:schemeClr val="accent1"/>
+          </a:lnRef>
+          <a:fillRef idx="0">
+            <a:schemeClr val="accent1"/>
+          </a:fillRef>
+          <a:effectRef idx="0">
+            <a:schemeClr val="accent1"/>
+          </a:effectRef>
+          <a:fontRef idx="minor">
+            <a:schemeClr val="tx1"/>
+          </a:fontRef>
+        </p:style>
+      </p:cxnSp>
+      <p:sp>
+        <p:nvSpPr>
+          <p:cNvPr id="73" name="Textfeld 72"/>
+          <p:cNvSpPr txBox="1"/>
+          <p:nvPr/>
+        </p:nvSpPr>
+        <p:spPr>
+          <a:xfrm>
+            <a:off x="4417729" y="4189915"/>
+            <a:ext cx="570990" cy="276999"/>
+          </a:xfrm>
+          <a:prstGeom prst="rect">
+            <a:avLst/>
+          </a:prstGeom>
+          <a:noFill/>
+        </p:spPr>
+        <p:txBody>
+          <a:bodyPr wrap="none" rtlCol="0">
+            <a:spAutoFit/>
+          </a:bodyPr>
+          <a:lstStyle/>
+          <a:p>
+            <a:r>
+              <a:rPr lang="de-DE" sz="1200" i="1" dirty="0" err="1" smtClean="0">
+                <a:latin typeface="Times New Roman" panose="02020603050405020304" pitchFamily="18" charset="0"/>
+                <a:cs typeface="Times New Roman" panose="02020603050405020304" pitchFamily="18" charset="0"/>
+              </a:rPr>
+              <a:t>v</a:t>
+            </a:r>
+            <a:r>
+              <a:rPr lang="de-DE" sz="1200" i="1" baseline="-25000" dirty="0" err="1" smtClean="0">
+                <a:latin typeface="Times New Roman" panose="02020603050405020304" pitchFamily="18" charset="0"/>
+                <a:cs typeface="Times New Roman" panose="02020603050405020304" pitchFamily="18" charset="0"/>
+              </a:rPr>
+              <a:t>R</a:t>
+            </a:r>
+            <a:r>
+              <a:rPr lang="de-DE" sz="1200" i="1" dirty="0" smtClean="0">
+                <a:latin typeface="Times New Roman" panose="02020603050405020304" pitchFamily="18" charset="0"/>
+                <a:cs typeface="Times New Roman" panose="02020603050405020304" pitchFamily="18" charset="0"/>
+              </a:rPr>
+              <a:t> = 5</a:t>
+            </a:r>
+          </a:p>
+        </p:txBody>
+      </p:sp>
+      <p:cxnSp>
+        <p:nvCxnSpPr>
+          <p:cNvPr id="74" name="Gerade Verbindung mit Pfeil 73"/>
+          <p:cNvCxnSpPr/>
+          <p:nvPr/>
+        </p:nvCxnSpPr>
+        <p:spPr>
+          <a:xfrm flipH="1">
+            <a:off x="3117574" y="4459038"/>
+            <a:ext cx="540000" cy="0"/>
+          </a:xfrm>
+          <a:prstGeom prst="straightConnector1">
+            <a:avLst/>
+          </a:prstGeom>
+          <a:ln w="19050">
+            <a:solidFill>
+              <a:srgbClr val="0070C0"/>
+            </a:solidFill>
+            <a:headEnd type="none" w="med" len="med"/>
+            <a:tailEnd type="triangle" w="med" len="med"/>
+          </a:ln>
+        </p:spPr>
+        <p:style>
+          <a:lnRef idx="1">
+            <a:schemeClr val="accent1"/>
+          </a:lnRef>
+          <a:fillRef idx="0">
+            <a:schemeClr val="accent1"/>
+          </a:fillRef>
+          <a:effectRef idx="0">
+            <a:schemeClr val="accent1"/>
+          </a:effectRef>
+          <a:fontRef idx="minor">
+            <a:schemeClr val="tx1"/>
+          </a:fontRef>
+        </p:style>
+      </p:cxnSp>
+      <p:sp>
+        <p:nvSpPr>
+          <p:cNvPr id="75" name="Textfeld 74"/>
+          <p:cNvSpPr txBox="1"/>
+          <p:nvPr/>
+        </p:nvSpPr>
+        <p:spPr>
+          <a:xfrm>
+            <a:off x="3067798" y="4189915"/>
+            <a:ext cx="661784" cy="276999"/>
+          </a:xfrm>
+          <a:prstGeom prst="rect">
+            <a:avLst/>
+          </a:prstGeom>
+          <a:noFill/>
+        </p:spPr>
+        <p:txBody>
+          <a:bodyPr wrap="none" rtlCol="0">
+            <a:spAutoFit/>
+          </a:bodyPr>
+          <a:lstStyle/>
+          <a:p>
+            <a:r>
+              <a:rPr lang="de-DE" sz="1200" i="1" dirty="0" err="1" smtClean="0">
+                <a:solidFill>
+                  <a:srgbClr val="0070C0"/>
+                </a:solidFill>
+                <a:latin typeface="Times New Roman" panose="02020603050405020304" pitchFamily="18" charset="0"/>
+                <a:cs typeface="Times New Roman" panose="02020603050405020304" pitchFamily="18" charset="0"/>
+              </a:rPr>
+              <a:t>v</a:t>
+            </a:r>
+            <a:r>
+              <a:rPr lang="de-DE" sz="1200" i="1" baseline="-25000" dirty="0" err="1" smtClean="0">
+                <a:solidFill>
+                  <a:srgbClr val="0070C0"/>
+                </a:solidFill>
+                <a:latin typeface="Times New Roman" panose="02020603050405020304" pitchFamily="18" charset="0"/>
+                <a:cs typeface="Times New Roman" panose="02020603050405020304" pitchFamily="18" charset="0"/>
+              </a:rPr>
+              <a:t>L</a:t>
+            </a:r>
+            <a:r>
+              <a:rPr lang="de-DE" sz="1200" i="1" dirty="0" smtClean="0">
+                <a:solidFill>
+                  <a:srgbClr val="0070C0"/>
+                </a:solidFill>
+                <a:latin typeface="Times New Roman" panose="02020603050405020304" pitchFamily="18" charset="0"/>
+                <a:cs typeface="Times New Roman" panose="02020603050405020304" pitchFamily="18" charset="0"/>
+              </a:rPr>
+              <a:t> = 10</a:t>
+            </a:r>
+          </a:p>
+        </p:txBody>
+      </p:sp>
+      <p:sp>
+        <p:nvSpPr>
+          <p:cNvPr id="76" name="Textfeld 75"/>
+          <p:cNvSpPr txBox="1"/>
+          <p:nvPr/>
+        </p:nvSpPr>
+        <p:spPr>
+          <a:xfrm>
+            <a:off x="4413658" y="3829875"/>
+            <a:ext cx="636713" cy="461665"/>
+          </a:xfrm>
+          <a:prstGeom prst="rect">
+            <a:avLst/>
+          </a:prstGeom>
+          <a:noFill/>
+        </p:spPr>
+        <p:txBody>
+          <a:bodyPr wrap="none" rtlCol="0">
+            <a:spAutoFit/>
+          </a:bodyPr>
+          <a:lstStyle/>
+          <a:p>
+            <a:r>
+              <a:rPr lang="de-DE" sz="1200" dirty="0" err="1" smtClean="0">
+                <a:latin typeface="Arial" panose="020B0604020202020204" pitchFamily="34" charset="0"/>
+                <a:cs typeface="Arial" panose="020B0604020202020204" pitchFamily="34" charset="0"/>
+              </a:rPr>
+              <a:t>moves</a:t>
+            </a:r>
+            <a:r>
+              <a:rPr lang="de-DE" sz="1200" dirty="0" smtClean="0">
+                <a:latin typeface="Arial" panose="020B0604020202020204" pitchFamily="34" charset="0"/>
+                <a:cs typeface="Arial" panose="020B0604020202020204" pitchFamily="34" charset="0"/>
+              </a:rPr>
+              <a:t/>
+            </a:r>
+            <a:br>
+              <a:rPr lang="de-DE" sz="1200" dirty="0" smtClean="0">
+                <a:latin typeface="Arial" panose="020B0604020202020204" pitchFamily="34" charset="0"/>
+                <a:cs typeface="Arial" panose="020B0604020202020204" pitchFamily="34" charset="0"/>
+              </a:rPr>
+            </a:br>
+            <a:r>
+              <a:rPr lang="de-DE" sz="1200" dirty="0" err="1" smtClean="0">
+                <a:latin typeface="Arial" panose="020B0604020202020204" pitchFamily="34" charset="0"/>
+                <a:cs typeface="Arial" panose="020B0604020202020204" pitchFamily="34" charset="0"/>
+              </a:rPr>
+              <a:t>Right</a:t>
+            </a:r>
+            <a:endParaRPr lang="de-DE" sz="1200" dirty="0" smtClean="0">
+              <a:latin typeface="Arial" panose="020B0604020202020204" pitchFamily="34" charset="0"/>
+              <a:cs typeface="Arial" panose="020B0604020202020204" pitchFamily="34" charset="0"/>
+            </a:endParaRPr>
+          </a:p>
+        </p:txBody>
+      </p:sp>
+      <p:sp>
+        <p:nvSpPr>
+          <p:cNvPr id="77" name="Textfeld 76"/>
+          <p:cNvSpPr txBox="1"/>
+          <p:nvPr/>
+        </p:nvSpPr>
+        <p:spPr>
+          <a:xfrm>
+            <a:off x="2973498" y="3901883"/>
+            <a:ext cx="893193" cy="276999"/>
+          </a:xfrm>
+          <a:prstGeom prst="rect">
+            <a:avLst/>
+          </a:prstGeom>
+          <a:noFill/>
+        </p:spPr>
+        <p:txBody>
+          <a:bodyPr wrap="none" rtlCol="0">
+            <a:spAutoFit/>
+          </a:bodyPr>
+          <a:lstStyle/>
+          <a:p>
+            <a:r>
+              <a:rPr lang="de-DE" sz="1200" dirty="0" err="1" smtClean="0">
+                <a:solidFill>
+                  <a:srgbClr val="0070C0"/>
+                </a:solidFill>
+                <a:latin typeface="Arial" panose="020B0604020202020204" pitchFamily="34" charset="0"/>
+                <a:cs typeface="Arial" panose="020B0604020202020204" pitchFamily="34" charset="0"/>
+              </a:rPr>
+              <a:t>movesLeft</a:t>
+            </a:r>
+            <a:endParaRPr lang="de-DE" sz="1200" dirty="0" smtClean="0">
+              <a:solidFill>
+                <a:srgbClr val="0070C0"/>
+              </a:solidFill>
+              <a:latin typeface="Arial" panose="020B0604020202020204" pitchFamily="34" charset="0"/>
+              <a:cs typeface="Arial" panose="020B0604020202020204" pitchFamily="34" charset="0"/>
+            </a:endParaRPr>
+          </a:p>
+        </p:txBody>
+      </p:sp>
+      <p:sp>
+        <p:nvSpPr>
+          <p:cNvPr id="78" name="Rechteck 77"/>
+          <p:cNvSpPr/>
+          <p:nvPr/>
+        </p:nvSpPr>
+        <p:spPr>
+          <a:xfrm>
+            <a:off x="4341730" y="4766039"/>
+            <a:ext cx="720000" cy="540000"/>
+          </a:xfrm>
+          <a:prstGeom prst="rect">
+            <a:avLst/>
+          </a:prstGeom>
+          <a:noFill/>
+          <a:ln w="19050">
+            <a:solidFill>
+              <a:schemeClr val="tx1"/>
+            </a:solidFill>
+          </a:ln>
+        </p:spPr>
+        <p:style>
+          <a:lnRef idx="2">
+            <a:schemeClr val="accent1">
+              <a:shade val="50000"/>
+            </a:schemeClr>
+          </a:lnRef>
+          <a:fillRef idx="1">
+            <a:schemeClr val="accent1"/>
+          </a:fillRef>
+          <a:effectRef idx="0">
+            <a:schemeClr val="accent1"/>
+          </a:effectRef>
+          <a:fontRef idx="minor">
+            <a:schemeClr val="lt1"/>
+          </a:fontRef>
+        </p:style>
+        <p:txBody>
+          <a:bodyPr rtlCol="0" anchor="ctr"/>
+          <a:lstStyle/>
+          <a:p>
+            <a:pPr algn="ctr"/>
+            <a:endParaRPr lang="de-DE"/>
+          </a:p>
+        </p:txBody>
+      </p:sp>
+      <p:sp>
+        <p:nvSpPr>
+          <p:cNvPr id="79" name="Rechteck 78"/>
+          <p:cNvSpPr/>
+          <p:nvPr/>
+        </p:nvSpPr>
+        <p:spPr>
+          <a:xfrm>
+            <a:off x="2901490" y="4586039"/>
+            <a:ext cx="1440000" cy="720000"/>
+          </a:xfrm>
+          <a:prstGeom prst="rect">
+            <a:avLst/>
+          </a:prstGeom>
+          <a:noFill/>
+          <a:ln w="19050">
+            <a:solidFill>
+              <a:srgbClr val="0070C0"/>
+            </a:solidFill>
+          </a:ln>
+        </p:spPr>
+        <p:style>
+          <a:lnRef idx="2">
+            <a:schemeClr val="accent1">
+              <a:shade val="50000"/>
+            </a:schemeClr>
+          </a:lnRef>
+          <a:fillRef idx="1">
+            <a:schemeClr val="accent1"/>
+          </a:fillRef>
+          <a:effectRef idx="0">
+            <a:schemeClr val="accent1"/>
+          </a:effectRef>
+          <a:fontRef idx="minor">
+            <a:schemeClr val="lt1"/>
+          </a:fontRef>
+        </p:style>
+        <p:txBody>
+          <a:bodyPr rtlCol="0" anchor="ctr"/>
+          <a:lstStyle/>
+          <a:p>
+            <a:pPr algn="ctr"/>
+            <a:endParaRPr lang="de-DE"/>
+          </a:p>
+        </p:txBody>
+      </p:sp>
+      <p:sp>
+        <p:nvSpPr>
+          <p:cNvPr id="80" name="Rechteck 79"/>
+          <p:cNvSpPr/>
+          <p:nvPr/>
+        </p:nvSpPr>
+        <p:spPr>
+          <a:xfrm>
+            <a:off x="2684464" y="4566438"/>
+            <a:ext cx="2479282" cy="764492"/>
+          </a:xfrm>
+          <a:prstGeom prst="rect">
+            <a:avLst/>
+          </a:prstGeom>
+          <a:noFill/>
+          <a:ln w="38100">
+            <a:solidFill>
+              <a:srgbClr val="FF0000"/>
+            </a:solidFill>
+          </a:ln>
+        </p:spPr>
+        <p:style>
+          <a:lnRef idx="2">
+            <a:schemeClr val="accent1">
+              <a:shade val="50000"/>
+            </a:schemeClr>
+          </a:lnRef>
+          <a:fillRef idx="1">
+            <a:schemeClr val="accent1"/>
+          </a:fillRef>
+          <a:effectRef idx="0">
+            <a:schemeClr val="accent1"/>
+          </a:effectRef>
+          <a:fontRef idx="minor">
+            <a:schemeClr val="lt1"/>
+          </a:fontRef>
+        </p:style>
+        <p:txBody>
+          <a:bodyPr rtlCol="0" anchor="ctr"/>
+          <a:lstStyle/>
+          <a:p>
+            <a:pPr algn="ctr"/>
+            <a:endParaRPr lang="de-DE"/>
+          </a:p>
+        </p:txBody>
+      </p:sp>
+      <p:sp>
+        <p:nvSpPr>
+          <p:cNvPr id="81" name="Rechteck 80"/>
+          <p:cNvSpPr/>
+          <p:nvPr/>
+        </p:nvSpPr>
+        <p:spPr>
+          <a:xfrm>
+            <a:off x="4413738" y="4765979"/>
+            <a:ext cx="720000" cy="540000"/>
+          </a:xfrm>
+          <a:prstGeom prst="rect">
+            <a:avLst/>
+          </a:prstGeom>
+          <a:noFill/>
+          <a:ln w="38100">
+            <a:solidFill>
+              <a:schemeClr val="tx1"/>
+            </a:solidFill>
+          </a:ln>
+        </p:spPr>
+        <p:style>
+          <a:lnRef idx="2">
+            <a:schemeClr val="accent1">
+              <a:shade val="50000"/>
+            </a:schemeClr>
+          </a:lnRef>
+          <a:fillRef idx="1">
+            <a:schemeClr val="accent1"/>
+          </a:fillRef>
+          <a:effectRef idx="0">
+            <a:schemeClr val="accent1"/>
+          </a:effectRef>
+          <a:fontRef idx="minor">
+            <a:schemeClr val="lt1"/>
+          </a:fontRef>
+        </p:style>
+        <p:txBody>
+          <a:bodyPr rtlCol="0" anchor="ctr"/>
+          <a:lstStyle/>
+          <a:p>
+            <a:pPr algn="ctr"/>
+            <a:endParaRPr lang="de-DE"/>
+          </a:p>
+        </p:txBody>
+      </p:sp>
+      <p:sp>
+        <p:nvSpPr>
+          <p:cNvPr id="82" name="Rechteck 81"/>
+          <p:cNvSpPr/>
+          <p:nvPr/>
+        </p:nvSpPr>
+        <p:spPr>
+          <a:xfrm>
+            <a:off x="2721630" y="4585959"/>
+            <a:ext cx="1440000" cy="720000"/>
+          </a:xfrm>
+          <a:prstGeom prst="rect">
+            <a:avLst/>
+          </a:prstGeom>
+          <a:noFill/>
+          <a:ln w="38100">
+            <a:solidFill>
+              <a:srgbClr val="0070C0"/>
+            </a:solidFill>
+          </a:ln>
+        </p:spPr>
+        <p:style>
+          <a:lnRef idx="2">
+            <a:schemeClr val="accent1">
+              <a:shade val="50000"/>
+            </a:schemeClr>
+          </a:lnRef>
+          <a:fillRef idx="1">
+            <a:schemeClr val="accent1"/>
+          </a:fillRef>
+          <a:effectRef idx="0">
+            <a:schemeClr val="accent1"/>
+          </a:effectRef>
+          <a:fontRef idx="minor">
+            <a:schemeClr val="lt1"/>
+          </a:fontRef>
+        </p:style>
+        <p:txBody>
+          <a:bodyPr rtlCol="0" anchor="ctr"/>
+          <a:lstStyle/>
+          <a:p>
+            <a:pPr algn="ctr"/>
+            <a:endParaRPr lang="de-DE"/>
+          </a:p>
+        </p:txBody>
+      </p:sp>
+      <p:sp>
+        <p:nvSpPr>
+          <p:cNvPr id="83" name="Textfeld 82"/>
+          <p:cNvSpPr txBox="1"/>
+          <p:nvPr/>
+        </p:nvSpPr>
+        <p:spPr>
+          <a:xfrm>
+            <a:off x="3621570" y="5708285"/>
+            <a:ext cx="511679" cy="276999"/>
+          </a:xfrm>
+          <a:prstGeom prst="rect">
+            <a:avLst/>
+          </a:prstGeom>
+          <a:noFill/>
+          <a:ln w="38100">
+            <a:solidFill>
+              <a:srgbClr val="FF0000"/>
+            </a:solidFill>
+          </a:ln>
+        </p:spPr>
+        <p:txBody>
+          <a:bodyPr wrap="none" rtlCol="0">
+            <a:spAutoFit/>
+          </a:bodyPr>
+          <a:lstStyle/>
+          <a:p>
+            <a:r>
+              <a:rPr lang="de-DE" sz="1200" b="1" dirty="0" err="1" smtClean="0">
+                <a:solidFill>
+                  <a:srgbClr val="FF0000"/>
+                </a:solidFill>
+                <a:latin typeface="Arial" panose="020B0604020202020204" pitchFamily="34" charset="0"/>
+                <a:cs typeface="Arial" panose="020B0604020202020204" pitchFamily="34" charset="0"/>
+              </a:rPr>
+              <a:t>blob</a:t>
+            </a:r>
+            <a:endParaRPr lang="de-DE" sz="1200" b="1" dirty="0" smtClean="0">
+              <a:solidFill>
+                <a:srgbClr val="FF0000"/>
+              </a:solidFill>
+              <a:latin typeface="Arial" panose="020B0604020202020204" pitchFamily="34" charset="0"/>
+              <a:cs typeface="Arial" panose="020B0604020202020204" pitchFamily="34" charset="0"/>
+            </a:endParaRPr>
+          </a:p>
+        </p:txBody>
+      </p:sp>
+      <p:sp>
+        <p:nvSpPr>
+          <p:cNvPr id="84" name="Textfeld 83"/>
+          <p:cNvSpPr txBox="1"/>
+          <p:nvPr/>
+        </p:nvSpPr>
+        <p:spPr>
+          <a:xfrm>
+            <a:off x="5716097" y="5075848"/>
+            <a:ext cx="785793" cy="276999"/>
+          </a:xfrm>
+          <a:prstGeom prst="rect">
+            <a:avLst/>
+          </a:prstGeom>
+          <a:noFill/>
+          <a:ln w="19050">
+            <a:solidFill>
+              <a:schemeClr val="tx1"/>
+            </a:solidFill>
+          </a:ln>
+        </p:spPr>
+        <p:txBody>
+          <a:bodyPr wrap="none" rtlCol="0">
+            <a:spAutoFit/>
+          </a:bodyPr>
+          <a:lstStyle/>
+          <a:p>
+            <a:r>
+              <a:rPr lang="de-DE" sz="1200" dirty="0" err="1" smtClean="0">
+                <a:latin typeface="Arial" panose="020B0604020202020204" pitchFamily="34" charset="0"/>
+                <a:cs typeface="Arial" panose="020B0604020202020204" pitchFamily="34" charset="0"/>
+              </a:rPr>
+              <a:t>right</a:t>
+            </a:r>
+            <a:r>
+              <a:rPr lang="de-DE" sz="1200" dirty="0" smtClean="0">
+                <a:latin typeface="Arial" panose="020B0604020202020204" pitchFamily="34" charset="0"/>
+                <a:cs typeface="Arial" panose="020B0604020202020204" pitchFamily="34" charset="0"/>
+              </a:rPr>
+              <a:t> n+1</a:t>
+            </a:r>
+            <a:endParaRPr lang="de-DE" sz="1200" dirty="0" smtClean="0">
+              <a:latin typeface="Arial" panose="020B0604020202020204" pitchFamily="34" charset="0"/>
+              <a:cs typeface="Arial" panose="020B0604020202020204" pitchFamily="34" charset="0"/>
+            </a:endParaRPr>
+          </a:p>
+        </p:txBody>
+      </p:sp>
+      <p:sp>
+        <p:nvSpPr>
+          <p:cNvPr id="85" name="Textfeld 84"/>
+          <p:cNvSpPr txBox="1"/>
+          <p:nvPr/>
+        </p:nvSpPr>
+        <p:spPr>
+          <a:xfrm>
+            <a:off x="5791542" y="5511029"/>
+            <a:ext cx="1516762" cy="276999"/>
+          </a:xfrm>
+          <a:prstGeom prst="rect">
+            <a:avLst/>
+          </a:prstGeom>
+          <a:noFill/>
+          <a:ln w="38100">
+            <a:solidFill>
+              <a:schemeClr val="tx1"/>
+            </a:solidFill>
+          </a:ln>
+        </p:spPr>
+        <p:txBody>
+          <a:bodyPr wrap="none" rtlCol="0">
+            <a:spAutoFit/>
+          </a:bodyPr>
+          <a:lstStyle/>
+          <a:p>
+            <a:r>
+              <a:rPr lang="de-DE" sz="1200" b="1" dirty="0" err="1" smtClean="0">
+                <a:latin typeface="Arial" panose="020B0604020202020204" pitchFamily="34" charset="0"/>
+                <a:cs typeface="Arial" panose="020B0604020202020204" pitchFamily="34" charset="0"/>
+              </a:rPr>
+              <a:t>right</a:t>
+            </a:r>
+            <a:r>
+              <a:rPr lang="de-DE" sz="1200" b="1" dirty="0" smtClean="0">
+                <a:latin typeface="Arial" panose="020B0604020202020204" pitchFamily="34" charset="0"/>
+                <a:cs typeface="Arial" panose="020B0604020202020204" pitchFamily="34" charset="0"/>
+              </a:rPr>
+              <a:t> n+1 </a:t>
+            </a:r>
+            <a:r>
+              <a:rPr lang="de-DE" sz="1200" b="1" dirty="0" err="1" smtClean="0">
+                <a:latin typeface="Arial" panose="020B0604020202020204" pitchFamily="34" charset="0"/>
+                <a:cs typeface="Arial" panose="020B0604020202020204" pitchFamily="34" charset="0"/>
+              </a:rPr>
+              <a:t>adjusted</a:t>
+            </a:r>
+            <a:endParaRPr lang="de-DE" sz="1200" b="1" dirty="0" smtClean="0">
+              <a:latin typeface="Arial" panose="020B0604020202020204" pitchFamily="34" charset="0"/>
+              <a:cs typeface="Arial" panose="020B0604020202020204" pitchFamily="34" charset="0"/>
+            </a:endParaRPr>
+          </a:p>
+        </p:txBody>
+      </p:sp>
+      <p:cxnSp>
+        <p:nvCxnSpPr>
+          <p:cNvPr id="86" name="Gerade Verbindung mit Pfeil 85"/>
+          <p:cNvCxnSpPr/>
+          <p:nvPr/>
+        </p:nvCxnSpPr>
+        <p:spPr>
+          <a:xfrm flipH="1" flipV="1">
+            <a:off x="5163746" y="5305959"/>
+            <a:ext cx="633916" cy="380034"/>
+          </a:xfrm>
+          <a:prstGeom prst="straightConnector1">
+            <a:avLst/>
+          </a:prstGeom>
+          <a:ln w="19050">
+            <a:solidFill>
+              <a:schemeClr val="tx1"/>
+            </a:solidFill>
+            <a:headEnd type="none" w="med" len="med"/>
+            <a:tailEnd type="arrow"/>
+          </a:ln>
+        </p:spPr>
+        <p:style>
+          <a:lnRef idx="1">
+            <a:schemeClr val="accent1"/>
+          </a:lnRef>
+          <a:fillRef idx="0">
+            <a:schemeClr val="accent1"/>
+          </a:fillRef>
+          <a:effectRef idx="0">
+            <a:schemeClr val="accent1"/>
+          </a:effectRef>
+          <a:fontRef idx="minor">
+            <a:schemeClr val="tx1"/>
+          </a:fontRef>
+        </p:style>
+      </p:cxnSp>
+      <p:cxnSp>
+        <p:nvCxnSpPr>
+          <p:cNvPr id="87" name="Gerade Verbindung mit Pfeil 86"/>
+          <p:cNvCxnSpPr/>
+          <p:nvPr/>
+        </p:nvCxnSpPr>
+        <p:spPr>
+          <a:xfrm flipH="1">
+            <a:off x="4881710" y="4899076"/>
+            <a:ext cx="648072" cy="0"/>
+          </a:xfrm>
+          <a:prstGeom prst="straightConnector1">
+            <a:avLst/>
+          </a:prstGeom>
+          <a:ln w="19050">
+            <a:solidFill>
+              <a:schemeClr val="tx1"/>
+            </a:solidFill>
+            <a:headEnd type="none" w="med" len="med"/>
+            <a:tailEnd type="arrow"/>
+          </a:ln>
+        </p:spPr>
+        <p:style>
+          <a:lnRef idx="1">
+            <a:schemeClr val="accent1"/>
+          </a:lnRef>
+          <a:fillRef idx="0">
+            <a:schemeClr val="accent1"/>
+          </a:fillRef>
+          <a:effectRef idx="0">
+            <a:schemeClr val="accent1"/>
+          </a:effectRef>
+          <a:fontRef idx="minor">
+            <a:schemeClr val="tx1"/>
+          </a:fontRef>
+        </p:style>
+      </p:cxnSp>
+      <p:cxnSp>
+        <p:nvCxnSpPr>
+          <p:cNvPr id="88" name="Gerade Verbindung mit Pfeil 87"/>
+          <p:cNvCxnSpPr>
+            <a:stCxn id="83" idx="0"/>
+          </p:cNvCxnSpPr>
+          <p:nvPr/>
+        </p:nvCxnSpPr>
+        <p:spPr>
+          <a:xfrm flipH="1" flipV="1">
+            <a:off x="3875487" y="5326409"/>
+            <a:ext cx="1923" cy="381876"/>
+          </a:xfrm>
+          <a:prstGeom prst="straightConnector1">
+            <a:avLst/>
+          </a:prstGeom>
+          <a:ln w="19050">
+            <a:solidFill>
+              <a:srgbClr val="FF0000"/>
+            </a:solidFill>
+            <a:headEnd type="none" w="med" len="med"/>
+            <a:tailEnd type="arrow"/>
+          </a:ln>
+        </p:spPr>
+        <p:style>
+          <a:lnRef idx="1">
+            <a:schemeClr val="accent1"/>
+          </a:lnRef>
+          <a:fillRef idx="0">
+            <a:schemeClr val="accent1"/>
+          </a:fillRef>
+          <a:effectRef idx="0">
+            <a:schemeClr val="accent1"/>
+          </a:effectRef>
+          <a:fontRef idx="minor">
+            <a:schemeClr val="tx1"/>
+          </a:fontRef>
+        </p:style>
+      </p:cxnSp>
+      <p:sp>
+        <p:nvSpPr>
+          <p:cNvPr id="89" name="Textfeld 88"/>
+          <p:cNvSpPr txBox="1"/>
+          <p:nvPr/>
+        </p:nvSpPr>
+        <p:spPr>
+          <a:xfrm>
+            <a:off x="1596604" y="4899076"/>
+            <a:ext cx="692818" cy="276999"/>
+          </a:xfrm>
+          <a:prstGeom prst="rect">
+            <a:avLst/>
+          </a:prstGeom>
+          <a:noFill/>
+          <a:ln w="19050">
+            <a:solidFill>
+              <a:srgbClr val="0070C0"/>
+            </a:solidFill>
+          </a:ln>
+        </p:spPr>
+        <p:txBody>
+          <a:bodyPr wrap="none" rtlCol="0">
+            <a:spAutoFit/>
+          </a:bodyPr>
+          <a:lstStyle/>
+          <a:p>
+            <a:r>
+              <a:rPr lang="de-DE" sz="1200" dirty="0" err="1" smtClean="0">
+                <a:solidFill>
+                  <a:srgbClr val="0070C0"/>
+                </a:solidFill>
+                <a:latin typeface="Arial" panose="020B0604020202020204" pitchFamily="34" charset="0"/>
+                <a:cs typeface="Arial" panose="020B0604020202020204" pitchFamily="34" charset="0"/>
+              </a:rPr>
+              <a:t>lef</a:t>
+            </a:r>
+            <a:r>
+              <a:rPr lang="de-DE" sz="1200" dirty="0" err="1" smtClean="0">
+                <a:solidFill>
+                  <a:srgbClr val="0070C0"/>
+                </a:solidFill>
+                <a:latin typeface="Arial" panose="020B0604020202020204" pitchFamily="34" charset="0"/>
+                <a:cs typeface="Arial" panose="020B0604020202020204" pitchFamily="34" charset="0"/>
+              </a:rPr>
+              <a:t>t</a:t>
+            </a:r>
+            <a:r>
+              <a:rPr lang="de-DE" sz="1200" dirty="0" smtClean="0">
+                <a:solidFill>
+                  <a:srgbClr val="0070C0"/>
+                </a:solidFill>
+                <a:latin typeface="Arial" panose="020B0604020202020204" pitchFamily="34" charset="0"/>
+                <a:cs typeface="Arial" panose="020B0604020202020204" pitchFamily="34" charset="0"/>
+              </a:rPr>
+              <a:t> n+1</a:t>
+            </a:r>
+            <a:endParaRPr lang="de-DE" sz="1200" dirty="0" smtClean="0">
+              <a:solidFill>
+                <a:srgbClr val="0070C0"/>
+              </a:solidFill>
+              <a:latin typeface="Arial" panose="020B0604020202020204" pitchFamily="34" charset="0"/>
+              <a:cs typeface="Arial" panose="020B0604020202020204" pitchFamily="34" charset="0"/>
+            </a:endParaRPr>
+          </a:p>
+        </p:txBody>
+      </p:sp>
+      <p:sp>
+        <p:nvSpPr>
+          <p:cNvPr id="90" name="Textfeld 89"/>
+          <p:cNvSpPr txBox="1"/>
+          <p:nvPr/>
+        </p:nvSpPr>
+        <p:spPr>
+          <a:xfrm>
+            <a:off x="777254" y="5337212"/>
+            <a:ext cx="1404552" cy="276999"/>
+          </a:xfrm>
+          <a:prstGeom prst="rect">
+            <a:avLst/>
+          </a:prstGeom>
+          <a:noFill/>
+          <a:ln w="38100">
+            <a:solidFill>
+              <a:srgbClr val="0070C0"/>
+            </a:solidFill>
+          </a:ln>
+        </p:spPr>
+        <p:txBody>
+          <a:bodyPr wrap="none" rtlCol="0">
+            <a:spAutoFit/>
+          </a:bodyPr>
+          <a:lstStyle/>
+          <a:p>
+            <a:r>
+              <a:rPr lang="de-DE" sz="1200" b="1" dirty="0" err="1" smtClean="0">
+                <a:solidFill>
+                  <a:srgbClr val="0070C0"/>
+                </a:solidFill>
+                <a:latin typeface="Arial" panose="020B0604020202020204" pitchFamily="34" charset="0"/>
+                <a:cs typeface="Arial" panose="020B0604020202020204" pitchFamily="34" charset="0"/>
+              </a:rPr>
+              <a:t>left</a:t>
+            </a:r>
+            <a:r>
+              <a:rPr lang="de-DE" sz="1200" b="1" dirty="0" smtClean="0">
+                <a:solidFill>
+                  <a:srgbClr val="0070C0"/>
+                </a:solidFill>
+                <a:latin typeface="Arial" panose="020B0604020202020204" pitchFamily="34" charset="0"/>
+                <a:cs typeface="Arial" panose="020B0604020202020204" pitchFamily="34" charset="0"/>
+              </a:rPr>
+              <a:t> n+1 </a:t>
+            </a:r>
+            <a:r>
+              <a:rPr lang="de-DE" sz="1200" b="1" dirty="0" err="1" smtClean="0">
+                <a:solidFill>
+                  <a:srgbClr val="0070C0"/>
+                </a:solidFill>
+                <a:latin typeface="Arial" panose="020B0604020202020204" pitchFamily="34" charset="0"/>
+                <a:cs typeface="Arial" panose="020B0604020202020204" pitchFamily="34" charset="0"/>
+              </a:rPr>
+              <a:t>adjusted</a:t>
+            </a:r>
+            <a:endParaRPr lang="de-DE" sz="1200" b="1" dirty="0" smtClean="0">
+              <a:solidFill>
+                <a:srgbClr val="0070C0"/>
+              </a:solidFill>
+              <a:latin typeface="Arial" panose="020B0604020202020204" pitchFamily="34" charset="0"/>
+              <a:cs typeface="Arial" panose="020B0604020202020204" pitchFamily="34" charset="0"/>
+            </a:endParaRPr>
+          </a:p>
+        </p:txBody>
+      </p:sp>
+      <p:sp>
+        <p:nvSpPr>
+          <p:cNvPr id="91" name="Textfeld 90"/>
+          <p:cNvSpPr txBox="1"/>
+          <p:nvPr/>
+        </p:nvSpPr>
+        <p:spPr>
+          <a:xfrm>
+            <a:off x="5529782" y="4693971"/>
+            <a:ext cx="611065" cy="276999"/>
+          </a:xfrm>
+          <a:prstGeom prst="rect">
+            <a:avLst/>
+          </a:prstGeom>
+          <a:noFill/>
+          <a:ln w="19050">
+            <a:solidFill>
+              <a:schemeClr val="tx1"/>
+            </a:solidFill>
+            <a:prstDash val="dash"/>
+          </a:ln>
+        </p:spPr>
+        <p:txBody>
+          <a:bodyPr wrap="none" rtlCol="0">
+            <a:spAutoFit/>
+          </a:bodyPr>
+          <a:lstStyle/>
+          <a:p>
+            <a:r>
+              <a:rPr lang="de-DE" sz="1200" dirty="0" err="1" smtClean="0">
+                <a:latin typeface="Arial" panose="020B0604020202020204" pitchFamily="34" charset="0"/>
+                <a:cs typeface="Arial" panose="020B0604020202020204" pitchFamily="34" charset="0"/>
+              </a:rPr>
+              <a:t>right</a:t>
+            </a:r>
+            <a:r>
+              <a:rPr lang="de-DE" sz="1200" dirty="0" smtClean="0">
+                <a:latin typeface="Arial" panose="020B0604020202020204" pitchFamily="34" charset="0"/>
+                <a:cs typeface="Arial" panose="020B0604020202020204" pitchFamily="34" charset="0"/>
+              </a:rPr>
+              <a:t> n</a:t>
+            </a:r>
+            <a:endParaRPr lang="de-DE" sz="1200" dirty="0" smtClean="0">
+              <a:latin typeface="Arial" panose="020B0604020202020204" pitchFamily="34" charset="0"/>
+              <a:cs typeface="Arial" panose="020B0604020202020204" pitchFamily="34" charset="0"/>
+            </a:endParaRPr>
+          </a:p>
+        </p:txBody>
+      </p:sp>
+      <p:sp>
+        <p:nvSpPr>
+          <p:cNvPr id="92" name="Textfeld 91"/>
+          <p:cNvSpPr txBox="1"/>
+          <p:nvPr/>
+        </p:nvSpPr>
+        <p:spPr>
+          <a:xfrm>
+            <a:off x="1915347" y="4569638"/>
+            <a:ext cx="518091" cy="276999"/>
+          </a:xfrm>
+          <a:prstGeom prst="rect">
+            <a:avLst/>
+          </a:prstGeom>
+          <a:noFill/>
+          <a:ln w="19050">
+            <a:solidFill>
+              <a:srgbClr val="0070C0"/>
+            </a:solidFill>
+          </a:ln>
+        </p:spPr>
+        <p:txBody>
+          <a:bodyPr wrap="none" rtlCol="0">
+            <a:spAutoFit/>
+          </a:bodyPr>
+          <a:lstStyle/>
+          <a:p>
+            <a:r>
+              <a:rPr lang="de-DE" sz="1200" dirty="0" err="1" smtClean="0">
+                <a:solidFill>
+                  <a:srgbClr val="0070C0"/>
+                </a:solidFill>
+                <a:latin typeface="Arial" panose="020B0604020202020204" pitchFamily="34" charset="0"/>
+                <a:cs typeface="Arial" panose="020B0604020202020204" pitchFamily="34" charset="0"/>
+              </a:rPr>
+              <a:t>lef</a:t>
+            </a:r>
+            <a:r>
+              <a:rPr lang="de-DE" sz="1200" dirty="0" err="1" smtClean="0">
+                <a:solidFill>
+                  <a:srgbClr val="0070C0"/>
+                </a:solidFill>
+                <a:latin typeface="Arial" panose="020B0604020202020204" pitchFamily="34" charset="0"/>
+                <a:cs typeface="Arial" panose="020B0604020202020204" pitchFamily="34" charset="0"/>
+              </a:rPr>
+              <a:t>t</a:t>
+            </a:r>
+            <a:r>
+              <a:rPr lang="de-DE" sz="1200" dirty="0" smtClean="0">
+                <a:solidFill>
+                  <a:srgbClr val="0070C0"/>
+                </a:solidFill>
+                <a:latin typeface="Arial" panose="020B0604020202020204" pitchFamily="34" charset="0"/>
+                <a:cs typeface="Arial" panose="020B0604020202020204" pitchFamily="34" charset="0"/>
+              </a:rPr>
+              <a:t> n</a:t>
+            </a:r>
+            <a:endParaRPr lang="de-DE" sz="1200" dirty="0" smtClean="0">
+              <a:solidFill>
+                <a:srgbClr val="0070C0"/>
+              </a:solidFill>
+              <a:latin typeface="Arial" panose="020B0604020202020204" pitchFamily="34" charset="0"/>
+              <a:cs typeface="Arial" panose="020B0604020202020204" pitchFamily="34" charset="0"/>
+            </a:endParaRPr>
+          </a:p>
+        </p:txBody>
+      </p:sp>
+      <p:cxnSp>
+        <p:nvCxnSpPr>
+          <p:cNvPr id="93" name="Gerade Verbindung mit Pfeil 92"/>
+          <p:cNvCxnSpPr/>
+          <p:nvPr/>
+        </p:nvCxnSpPr>
+        <p:spPr>
+          <a:xfrm>
+            <a:off x="2289422" y="5049180"/>
+            <a:ext cx="612068" cy="0"/>
+          </a:xfrm>
+          <a:prstGeom prst="straightConnector1">
+            <a:avLst/>
+          </a:prstGeom>
+          <a:ln w="19050">
+            <a:solidFill>
+              <a:srgbClr val="0070C0"/>
+            </a:solidFill>
+            <a:headEnd type="none" w="med" len="med"/>
+            <a:tailEnd type="arrow"/>
+          </a:ln>
+        </p:spPr>
+        <p:style>
+          <a:lnRef idx="1">
+            <a:schemeClr val="accent1"/>
+          </a:lnRef>
+          <a:fillRef idx="0">
+            <a:schemeClr val="accent1"/>
+          </a:fillRef>
+          <a:effectRef idx="0">
+            <a:schemeClr val="accent1"/>
+          </a:effectRef>
+          <a:fontRef idx="minor">
+            <a:schemeClr val="tx1"/>
+          </a:fontRef>
+        </p:style>
+      </p:cxnSp>
+      <p:cxnSp>
+        <p:nvCxnSpPr>
+          <p:cNvPr id="94" name="Gerade Verbindung mit Pfeil 93"/>
+          <p:cNvCxnSpPr>
+            <a:stCxn id="92" idx="3"/>
+          </p:cNvCxnSpPr>
+          <p:nvPr/>
+        </p:nvCxnSpPr>
+        <p:spPr>
+          <a:xfrm flipV="1">
+            <a:off x="2433438" y="4708137"/>
+            <a:ext cx="839452" cy="1"/>
+          </a:xfrm>
+          <a:prstGeom prst="straightConnector1">
+            <a:avLst/>
+          </a:prstGeom>
+          <a:ln w="19050">
+            <a:solidFill>
+              <a:srgbClr val="0070C0"/>
+            </a:solidFill>
+            <a:headEnd type="none" w="med" len="med"/>
+            <a:tailEnd type="arrow"/>
+          </a:ln>
+        </p:spPr>
+        <p:style>
+          <a:lnRef idx="1">
+            <a:schemeClr val="accent1"/>
+          </a:lnRef>
+          <a:fillRef idx="0">
+            <a:schemeClr val="accent1"/>
+          </a:fillRef>
+          <a:effectRef idx="0">
+            <a:schemeClr val="accent1"/>
+          </a:effectRef>
+          <a:fontRef idx="minor">
+            <a:schemeClr val="tx1"/>
+          </a:fontRef>
+        </p:style>
+      </p:cxnSp>
+      <p:cxnSp>
+        <p:nvCxnSpPr>
+          <p:cNvPr id="95" name="Gerade Verbindung mit Pfeil 94"/>
+          <p:cNvCxnSpPr>
+            <a:stCxn id="90" idx="3"/>
+          </p:cNvCxnSpPr>
+          <p:nvPr/>
+        </p:nvCxnSpPr>
+        <p:spPr>
+          <a:xfrm flipV="1">
+            <a:off x="2181806" y="5214347"/>
+            <a:ext cx="502657" cy="261365"/>
+          </a:xfrm>
+          <a:prstGeom prst="straightConnector1">
+            <a:avLst/>
+          </a:prstGeom>
+          <a:ln w="19050">
+            <a:solidFill>
+              <a:srgbClr val="0070C0"/>
+            </a:solidFill>
+            <a:headEnd type="none" w="med" len="med"/>
+            <a:tailEnd type="arrow"/>
+          </a:ln>
+        </p:spPr>
+        <p:style>
+          <a:lnRef idx="1">
+            <a:schemeClr val="accent1"/>
+          </a:lnRef>
+          <a:fillRef idx="0">
+            <a:schemeClr val="accent1"/>
+          </a:fillRef>
+          <a:effectRef idx="0">
+            <a:schemeClr val="accent1"/>
+          </a:effectRef>
+          <a:fontRef idx="minor">
+            <a:schemeClr val="tx1"/>
+          </a:fontRef>
+        </p:style>
+      </p:cxnSp>
+      <p:cxnSp>
+        <p:nvCxnSpPr>
+          <p:cNvPr id="96" name="Gerade Verbindung mit Pfeil 95"/>
+          <p:cNvCxnSpPr/>
+          <p:nvPr/>
+        </p:nvCxnSpPr>
+        <p:spPr>
+          <a:xfrm flipH="1" flipV="1">
+            <a:off x="5061730" y="5193195"/>
+            <a:ext cx="654367" cy="1"/>
+          </a:xfrm>
+          <a:prstGeom prst="straightConnector1">
+            <a:avLst/>
+          </a:prstGeom>
+          <a:ln w="19050">
+            <a:solidFill>
+              <a:schemeClr val="tx1"/>
+            </a:solidFill>
+            <a:headEnd type="none" w="med" len="med"/>
+            <a:tailEnd type="arrow"/>
+          </a:ln>
+        </p:spPr>
+        <p:style>
+          <a:lnRef idx="1">
+            <a:schemeClr val="accent1"/>
+          </a:lnRef>
+          <a:fillRef idx="0">
+            <a:schemeClr val="accent1"/>
+          </a:fillRef>
+          <a:effectRef idx="0">
+            <a:schemeClr val="accent1"/>
+          </a:effectRef>
+          <a:fontRef idx="minor">
+            <a:schemeClr val="tx1"/>
+          </a:fontRef>
+        </p:style>
+      </p:cxnSp>
+    </p:spTree>
+    <p:extLst>
+      <p:ext uri="{BB962C8B-B14F-4D97-AF65-F5344CB8AC3E}">
+        <p14:creationId xmlns:p14="http://schemas.microsoft.com/office/powerpoint/2010/main" val="688529048"/>
       </p:ext>
     </p:extLst>
   </p:cSld>

</xml_diff>

<commit_message>
[Scene] test cases till #occ006
</commit_message>
<xml_diff>
--- a/utilities/occlusion.pptx
+++ b/utilities/occlusion.pptx
@@ -289,7 +289,7 @@
           <a:p>
             <a:fld id="{7F847C87-CECF-4A9A-88F5-87615B577ED8}" type="datetimeFigureOut">
               <a:rPr lang="de-DE" smtClean="0"/>
-              <a:t>13.01.2019</a:t>
+              <a:t>16.01.2019</a:t>
             </a:fld>
             <a:endParaRPr lang="de-DE"/>
           </a:p>
@@ -468,7 +468,7 @@
           <a:p>
             <a:fld id="{7F847C87-CECF-4A9A-88F5-87615B577ED8}" type="datetimeFigureOut">
               <a:rPr lang="de-DE" smtClean="0"/>
-              <a:t>13.01.2019</a:t>
+              <a:t>16.01.2019</a:t>
             </a:fld>
             <a:endParaRPr lang="de-DE"/>
           </a:p>
@@ -648,7 +648,7 @@
           <a:p>
             <a:fld id="{7F847C87-CECF-4A9A-88F5-87615B577ED8}" type="datetimeFigureOut">
               <a:rPr lang="de-DE" smtClean="0"/>
-              <a:t>13.01.2019</a:t>
+              <a:t>16.01.2019</a:t>
             </a:fld>
             <a:endParaRPr lang="de-DE"/>
           </a:p>
@@ -882,7 +882,7 @@
           <a:p>
             <a:fld id="{7F847C87-CECF-4A9A-88F5-87615B577ED8}" type="datetimeFigureOut">
               <a:rPr lang="de-DE" smtClean="0"/>
-              <a:t>13.01.2019</a:t>
+              <a:t>16.01.2019</a:t>
             </a:fld>
             <a:endParaRPr lang="de-DE"/>
           </a:p>
@@ -1135,7 +1135,7 @@
           <a:p>
             <a:fld id="{7F847C87-CECF-4A9A-88F5-87615B577ED8}" type="datetimeFigureOut">
               <a:rPr lang="de-DE" smtClean="0"/>
-              <a:t>13.01.2019</a:t>
+              <a:t>16.01.2019</a:t>
             </a:fld>
             <a:endParaRPr lang="de-DE"/>
           </a:p>
@@ -1423,7 +1423,7 @@
           <a:p>
             <a:fld id="{7F847C87-CECF-4A9A-88F5-87615B577ED8}" type="datetimeFigureOut">
               <a:rPr lang="de-DE" smtClean="0"/>
-              <a:t>13.01.2019</a:t>
+              <a:t>16.01.2019</a:t>
             </a:fld>
             <a:endParaRPr lang="de-DE"/>
           </a:p>
@@ -1845,7 +1845,7 @@
           <a:p>
             <a:fld id="{7F847C87-CECF-4A9A-88F5-87615B577ED8}" type="datetimeFigureOut">
               <a:rPr lang="de-DE" smtClean="0"/>
-              <a:t>13.01.2019</a:t>
+              <a:t>16.01.2019</a:t>
             </a:fld>
             <a:endParaRPr lang="de-DE"/>
           </a:p>
@@ -1963,7 +1963,7 @@
           <a:p>
             <a:fld id="{7F847C87-CECF-4A9A-88F5-87615B577ED8}" type="datetimeFigureOut">
               <a:rPr lang="de-DE" smtClean="0"/>
-              <a:t>13.01.2019</a:t>
+              <a:t>16.01.2019</a:t>
             </a:fld>
             <a:endParaRPr lang="de-DE"/>
           </a:p>
@@ -2058,7 +2058,7 @@
           <a:p>
             <a:fld id="{7F847C87-CECF-4A9A-88F5-87615B577ED8}" type="datetimeFigureOut">
               <a:rPr lang="de-DE" smtClean="0"/>
-              <a:t>13.01.2019</a:t>
+              <a:t>16.01.2019</a:t>
             </a:fld>
             <a:endParaRPr lang="de-DE"/>
           </a:p>
@@ -2335,7 +2335,7 @@
           <a:p>
             <a:fld id="{7F847C87-CECF-4A9A-88F5-87615B577ED8}" type="datetimeFigureOut">
               <a:rPr lang="de-DE" smtClean="0"/>
-              <a:t>13.01.2019</a:t>
+              <a:t>16.01.2019</a:t>
             </a:fld>
             <a:endParaRPr lang="de-DE"/>
           </a:p>
@@ -2588,7 +2588,7 @@
           <a:p>
             <a:fld id="{7F847C87-CECF-4A9A-88F5-87615B577ED8}" type="datetimeFigureOut">
               <a:rPr lang="de-DE" smtClean="0"/>
-              <a:t>13.01.2019</a:t>
+              <a:t>16.01.2019</a:t>
             </a:fld>
             <a:endParaRPr lang="de-DE"/>
           </a:p>
@@ -2794,7 +2794,7 @@
           <a:p>
             <a:fld id="{7F847C87-CECF-4A9A-88F5-87615B577ED8}" type="datetimeFigureOut">
               <a:rPr lang="de-DE" smtClean="0"/>
-              <a:t>13.01.2019</a:t>
+              <a:t>16.01.2019</a:t>
             </a:fld>
             <a:endParaRPr lang="de-DE"/>
           </a:p>
@@ -6547,6 +6547,22 @@
               <a:rPr lang="de-DE" dirty="0" err="1" smtClean="0"/>
               <a:t>edges</a:t>
             </a:r>
+            <a:r>
+              <a:rPr lang="de-DE" dirty="0" smtClean="0"/>
+              <a:t> (</a:t>
+            </a:r>
+            <a:r>
+              <a:rPr lang="de-DE" dirty="0" err="1" smtClean="0"/>
+              <a:t>adjust</a:t>
+            </a:r>
+            <a:r>
+              <a:rPr lang="de-DE" dirty="0" err="1" smtClean="0"/>
+              <a:t>SubstPos</a:t>
+            </a:r>
+            <a:r>
+              <a:rPr lang="de-DE" dirty="0" smtClean="0"/>
+              <a:t>)</a:t>
+            </a:r>
             <a:endParaRPr lang="de-DE" dirty="0"/>
           </a:p>
         </p:txBody>
@@ -7236,10 +7252,6 @@
               </a:rPr>
               <a:t> n+1</a:t>
             </a:r>
-            <a:endParaRPr lang="de-DE" sz="1200" dirty="0" smtClean="0">
-              <a:latin typeface="Arial" panose="020B0604020202020204" pitchFamily="34" charset="0"/>
-              <a:cs typeface="Arial" panose="020B0604020202020204" pitchFamily="34" charset="0"/>
-            </a:endParaRPr>
           </a:p>
         </p:txBody>
       </p:sp>
@@ -7446,17 +7458,7 @@
                 <a:latin typeface="Arial" panose="020B0604020202020204" pitchFamily="34" charset="0"/>
                 <a:cs typeface="Arial" panose="020B0604020202020204" pitchFamily="34" charset="0"/>
               </a:rPr>
-              <a:t>lef</a:t>
-            </a:r>
-            <a:r>
-              <a:rPr lang="de-DE" sz="1200" dirty="0" err="1" smtClean="0">
-                <a:solidFill>
-                  <a:srgbClr val="0070C0"/>
-                </a:solidFill>
-                <a:latin typeface="Arial" panose="020B0604020202020204" pitchFamily="34" charset="0"/>
-                <a:cs typeface="Arial" panose="020B0604020202020204" pitchFamily="34" charset="0"/>
-              </a:rPr>
-              <a:t>t</a:t>
+              <a:t>left</a:t>
             </a:r>
             <a:r>
               <a:rPr lang="de-DE" sz="1200" dirty="0" smtClean="0">
@@ -7468,13 +7470,6 @@
               </a:rPr>
               <a:t> n+1</a:t>
             </a:r>
-            <a:endParaRPr lang="de-DE" sz="1200" dirty="0" smtClean="0">
-              <a:solidFill>
-                <a:srgbClr val="0070C0"/>
-              </a:solidFill>
-              <a:latin typeface="Arial" panose="020B0604020202020204" pitchFamily="34" charset="0"/>
-              <a:cs typeface="Arial" panose="020B0604020202020204" pitchFamily="34" charset="0"/>
-            </a:endParaRPr>
           </a:p>
         </p:txBody>
       </p:sp>
@@ -7587,10 +7582,6 @@
               </a:rPr>
               <a:t> n</a:t>
             </a:r>
-            <a:endParaRPr lang="de-DE" sz="1200" dirty="0" smtClean="0">
-              <a:latin typeface="Arial" panose="020B0604020202020204" pitchFamily="34" charset="0"/>
-              <a:cs typeface="Arial" panose="020B0604020202020204" pitchFamily="34" charset="0"/>
-            </a:endParaRPr>
           </a:p>
         </p:txBody>
       </p:sp>
@@ -7629,17 +7620,7 @@
                 <a:latin typeface="Arial" panose="020B0604020202020204" pitchFamily="34" charset="0"/>
                 <a:cs typeface="Arial" panose="020B0604020202020204" pitchFamily="34" charset="0"/>
               </a:rPr>
-              <a:t>lef</a:t>
-            </a:r>
-            <a:r>
-              <a:rPr lang="de-DE" sz="1200" dirty="0" err="1" smtClean="0">
-                <a:solidFill>
-                  <a:srgbClr val="0070C0"/>
-                </a:solidFill>
-                <a:latin typeface="Arial" panose="020B0604020202020204" pitchFamily="34" charset="0"/>
-                <a:cs typeface="Arial" panose="020B0604020202020204" pitchFamily="34" charset="0"/>
-              </a:rPr>
-              <a:t>t</a:t>
+              <a:t>left</a:t>
             </a:r>
             <a:r>
               <a:rPr lang="de-DE" sz="1200" dirty="0" smtClean="0">
@@ -7651,13 +7632,6 @@
               </a:rPr>
               <a:t> n</a:t>
             </a:r>
-            <a:endParaRPr lang="de-DE" sz="1200" dirty="0" smtClean="0">
-              <a:solidFill>
-                <a:srgbClr val="0070C0"/>
-              </a:solidFill>
-              <a:latin typeface="Arial" panose="020B0604020202020204" pitchFamily="34" charset="0"/>
-              <a:cs typeface="Arial" panose="020B0604020202020204" pitchFamily="34" charset="0"/>
-            </a:endParaRPr>
           </a:p>
         </p:txBody>
       </p:sp>
@@ -8500,10 +8474,6 @@
               </a:rPr>
               <a:t> n+1</a:t>
             </a:r>
-            <a:endParaRPr lang="de-DE" sz="1200" dirty="0" smtClean="0">
-              <a:latin typeface="Arial" panose="020B0604020202020204" pitchFamily="34" charset="0"/>
-              <a:cs typeface="Arial" panose="020B0604020202020204" pitchFamily="34" charset="0"/>
-            </a:endParaRPr>
           </a:p>
         </p:txBody>
       </p:sp>
@@ -8710,17 +8680,7 @@
                 <a:latin typeface="Arial" panose="020B0604020202020204" pitchFamily="34" charset="0"/>
                 <a:cs typeface="Arial" panose="020B0604020202020204" pitchFamily="34" charset="0"/>
               </a:rPr>
-              <a:t>lef</a:t>
-            </a:r>
-            <a:r>
-              <a:rPr lang="de-DE" sz="1200" dirty="0" err="1" smtClean="0">
-                <a:solidFill>
-                  <a:srgbClr val="0070C0"/>
-                </a:solidFill>
-                <a:latin typeface="Arial" panose="020B0604020202020204" pitchFamily="34" charset="0"/>
-                <a:cs typeface="Arial" panose="020B0604020202020204" pitchFamily="34" charset="0"/>
-              </a:rPr>
-              <a:t>t</a:t>
+              <a:t>left</a:t>
             </a:r>
             <a:r>
               <a:rPr lang="de-DE" sz="1200" dirty="0" smtClean="0">
@@ -8732,13 +8692,6 @@
               </a:rPr>
               <a:t> n+1</a:t>
             </a:r>
-            <a:endParaRPr lang="de-DE" sz="1200" dirty="0" smtClean="0">
-              <a:solidFill>
-                <a:srgbClr val="0070C0"/>
-              </a:solidFill>
-              <a:latin typeface="Arial" panose="020B0604020202020204" pitchFamily="34" charset="0"/>
-              <a:cs typeface="Arial" panose="020B0604020202020204" pitchFamily="34" charset="0"/>
-            </a:endParaRPr>
           </a:p>
         </p:txBody>
       </p:sp>
@@ -8851,10 +8804,6 @@
               </a:rPr>
               <a:t> n</a:t>
             </a:r>
-            <a:endParaRPr lang="de-DE" sz="1200" dirty="0" smtClean="0">
-              <a:latin typeface="Arial" panose="020B0604020202020204" pitchFamily="34" charset="0"/>
-              <a:cs typeface="Arial" panose="020B0604020202020204" pitchFamily="34" charset="0"/>
-            </a:endParaRPr>
           </a:p>
         </p:txBody>
       </p:sp>
@@ -8893,17 +8842,7 @@
                 <a:latin typeface="Arial" panose="020B0604020202020204" pitchFamily="34" charset="0"/>
                 <a:cs typeface="Arial" panose="020B0604020202020204" pitchFamily="34" charset="0"/>
               </a:rPr>
-              <a:t>lef</a:t>
-            </a:r>
-            <a:r>
-              <a:rPr lang="de-DE" sz="1200" dirty="0" err="1" smtClean="0">
-                <a:solidFill>
-                  <a:srgbClr val="0070C0"/>
-                </a:solidFill>
-                <a:latin typeface="Arial" panose="020B0604020202020204" pitchFamily="34" charset="0"/>
-                <a:cs typeface="Arial" panose="020B0604020202020204" pitchFamily="34" charset="0"/>
-              </a:rPr>
-              <a:t>t</a:t>
+              <a:t>left</a:t>
             </a:r>
             <a:r>
               <a:rPr lang="de-DE" sz="1200" dirty="0" smtClean="0">
@@ -8915,13 +8854,6 @@
               </a:rPr>
               <a:t> n</a:t>
             </a:r>
-            <a:endParaRPr lang="de-DE" sz="1200" dirty="0" smtClean="0">
-              <a:solidFill>
-                <a:srgbClr val="0070C0"/>
-              </a:solidFill>
-              <a:latin typeface="Arial" panose="020B0604020202020204" pitchFamily="34" charset="0"/>
-              <a:cs typeface="Arial" panose="020B0604020202020204" pitchFamily="34" charset="0"/>
-            </a:endParaRPr>
           </a:p>
         </p:txBody>
       </p:sp>

</xml_diff>

<commit_message>
[Scene] test cases till #occ007
</commit_message>
<xml_diff>
--- a/utilities/occlusion.pptx
+++ b/utilities/occlusion.pptx
@@ -7,6 +7,8 @@
   <p:sldIdLst>
     <p:sldId id="276" r:id="rId2"/>
     <p:sldId id="277" r:id="rId3"/>
+    <p:sldId id="278" r:id="rId4"/>
+    <p:sldId id="279" r:id="rId5"/>
   </p:sldIdLst>
   <p:sldSz cx="9144000" cy="6858000" type="screen4x3"/>
   <p:notesSz cx="6865938" cy="9996488"/>
@@ -289,7 +291,7 @@
           <a:p>
             <a:fld id="{7F847C87-CECF-4A9A-88F5-87615B577ED8}" type="datetimeFigureOut">
               <a:rPr lang="de-DE" smtClean="0"/>
-              <a:t>16.01.2019</a:t>
+              <a:t>18.01.2019</a:t>
             </a:fld>
             <a:endParaRPr lang="de-DE"/>
           </a:p>
@@ -468,7 +470,7 @@
           <a:p>
             <a:fld id="{7F847C87-CECF-4A9A-88F5-87615B577ED8}" type="datetimeFigureOut">
               <a:rPr lang="de-DE" smtClean="0"/>
-              <a:t>16.01.2019</a:t>
+              <a:t>18.01.2019</a:t>
             </a:fld>
             <a:endParaRPr lang="de-DE"/>
           </a:p>
@@ -648,7 +650,7 @@
           <a:p>
             <a:fld id="{7F847C87-CECF-4A9A-88F5-87615B577ED8}" type="datetimeFigureOut">
               <a:rPr lang="de-DE" smtClean="0"/>
-              <a:t>16.01.2019</a:t>
+              <a:t>18.01.2019</a:t>
             </a:fld>
             <a:endParaRPr lang="de-DE"/>
           </a:p>
@@ -882,7 +884,7 @@
           <a:p>
             <a:fld id="{7F847C87-CECF-4A9A-88F5-87615B577ED8}" type="datetimeFigureOut">
               <a:rPr lang="de-DE" smtClean="0"/>
-              <a:t>16.01.2019</a:t>
+              <a:t>18.01.2019</a:t>
             </a:fld>
             <a:endParaRPr lang="de-DE"/>
           </a:p>
@@ -1135,7 +1137,7 @@
           <a:p>
             <a:fld id="{7F847C87-CECF-4A9A-88F5-87615B577ED8}" type="datetimeFigureOut">
               <a:rPr lang="de-DE" smtClean="0"/>
-              <a:t>16.01.2019</a:t>
+              <a:t>18.01.2019</a:t>
             </a:fld>
             <a:endParaRPr lang="de-DE"/>
           </a:p>
@@ -1423,7 +1425,7 @@
           <a:p>
             <a:fld id="{7F847C87-CECF-4A9A-88F5-87615B577ED8}" type="datetimeFigureOut">
               <a:rPr lang="de-DE" smtClean="0"/>
-              <a:t>16.01.2019</a:t>
+              <a:t>18.01.2019</a:t>
             </a:fld>
             <a:endParaRPr lang="de-DE"/>
           </a:p>
@@ -1845,7 +1847,7 @@
           <a:p>
             <a:fld id="{7F847C87-CECF-4A9A-88F5-87615B577ED8}" type="datetimeFigureOut">
               <a:rPr lang="de-DE" smtClean="0"/>
-              <a:t>16.01.2019</a:t>
+              <a:t>18.01.2019</a:t>
             </a:fld>
             <a:endParaRPr lang="de-DE"/>
           </a:p>
@@ -1963,7 +1965,7 @@
           <a:p>
             <a:fld id="{7F847C87-CECF-4A9A-88F5-87615B577ED8}" type="datetimeFigureOut">
               <a:rPr lang="de-DE" smtClean="0"/>
-              <a:t>16.01.2019</a:t>
+              <a:t>18.01.2019</a:t>
             </a:fld>
             <a:endParaRPr lang="de-DE"/>
           </a:p>
@@ -2058,7 +2060,7 @@
           <a:p>
             <a:fld id="{7F847C87-CECF-4A9A-88F5-87615B577ED8}" type="datetimeFigureOut">
               <a:rPr lang="de-DE" smtClean="0"/>
-              <a:t>16.01.2019</a:t>
+              <a:t>18.01.2019</a:t>
             </a:fld>
             <a:endParaRPr lang="de-DE"/>
           </a:p>
@@ -2335,7 +2337,7 @@
           <a:p>
             <a:fld id="{7F847C87-CECF-4A9A-88F5-87615B577ED8}" type="datetimeFigureOut">
               <a:rPr lang="de-DE" smtClean="0"/>
-              <a:t>16.01.2019</a:t>
+              <a:t>18.01.2019</a:t>
             </a:fld>
             <a:endParaRPr lang="de-DE"/>
           </a:p>
@@ -2588,7 +2590,7 @@
           <a:p>
             <a:fld id="{7F847C87-CECF-4A9A-88F5-87615B577ED8}" type="datetimeFigureOut">
               <a:rPr lang="de-DE" smtClean="0"/>
-              <a:t>16.01.2019</a:t>
+              <a:t>18.01.2019</a:t>
             </a:fld>
             <a:endParaRPr lang="de-DE"/>
           </a:p>
@@ -2794,7 +2796,7 @@
           <a:p>
             <a:fld id="{7F847C87-CECF-4A9A-88F5-87615B577ED8}" type="datetimeFigureOut">
               <a:rPr lang="de-DE" smtClean="0"/>
-              <a:t>16.01.2019</a:t>
+              <a:t>18.01.2019</a:t>
             </a:fld>
             <a:endParaRPr lang="de-DE"/>
           </a:p>
@@ -6505,6 +6507,14 @@
           <a:p>
             <a:r>
               <a:rPr lang="de-DE" dirty="0" err="1" smtClean="0"/>
+              <a:t>adjustSubstPos</a:t>
+            </a:r>
+            <a:r>
+              <a:rPr lang="de-DE" dirty="0" smtClean="0"/>
+              <a:t>: </a:t>
+            </a:r>
+            <a:r>
+              <a:rPr lang="de-DE" dirty="0" err="1" smtClean="0"/>
               <a:t>adjust</a:t>
             </a:r>
             <a:r>
@@ -6546,22 +6556,6 @@
             <a:r>
               <a:rPr lang="de-DE" dirty="0" err="1" smtClean="0"/>
               <a:t>edges</a:t>
-            </a:r>
-            <a:r>
-              <a:rPr lang="de-DE" dirty="0" smtClean="0"/>
-              <a:t> (</a:t>
-            </a:r>
-            <a:r>
-              <a:rPr lang="de-DE" dirty="0" err="1" smtClean="0"/>
-              <a:t>adjust</a:t>
-            </a:r>
-            <a:r>
-              <a:rPr lang="de-DE" dirty="0" err="1" smtClean="0"/>
-              <a:t>SubstPos</a:t>
-            </a:r>
-            <a:r>
-              <a:rPr lang="de-DE" dirty="0" smtClean="0"/>
-              <a:t>)</a:t>
             </a:r>
             <a:endParaRPr lang="de-DE" dirty="0"/>
           </a:p>
@@ -9013,6 +9007,3464 @@
     <p:extLst>
       <p:ext uri="{BB962C8B-B14F-4D97-AF65-F5344CB8AC3E}">
         <p14:creationId xmlns:p14="http://schemas.microsoft.com/office/powerpoint/2010/main" val="688529048"/>
+      </p:ext>
+    </p:extLst>
+  </p:cSld>
+  <p:clrMapOvr>
+    <a:masterClrMapping/>
+  </p:clrMapOvr>
+  <p:timing>
+    <p:tnLst>
+      <p:par>
+        <p:cTn id="1" dur="indefinite" restart="never" nodeType="tmRoot"/>
+      </p:par>
+    </p:tnLst>
+  </p:timing>
+</p:sld>
+</file>
+
+<file path=ppt/slides/slide3.xml><?xml version="1.0" encoding="utf-8"?>
+<p:sld xmlns:a="http://schemas.openxmlformats.org/drawingml/2006/main" xmlns:r="http://schemas.openxmlformats.org/officeDocument/2006/relationships" xmlns:p="http://schemas.openxmlformats.org/presentationml/2006/main">
+  <p:cSld>
+    <p:spTree>
+      <p:nvGrpSpPr>
+        <p:cNvPr id="1" name=""/>
+        <p:cNvGrpSpPr/>
+        <p:nvPr/>
+      </p:nvGrpSpPr>
+      <p:grpSpPr>
+        <a:xfrm>
+          <a:off x="0" y="0"/>
+          <a:ext cx="0" cy="0"/>
+          <a:chOff x="0" y="0"/>
+          <a:chExt cx="0" cy="0"/>
+        </a:xfrm>
+      </p:grpSpPr>
+      <p:sp>
+        <p:nvSpPr>
+          <p:cNvPr id="2" name="Titel 1"/>
+          <p:cNvSpPr>
+            <a:spLocks noGrp="1"/>
+          </p:cNvSpPr>
+          <p:nvPr>
+            <p:ph type="title"/>
+          </p:nvPr>
+        </p:nvSpPr>
+        <p:spPr/>
+        <p:txBody>
+          <a:bodyPr/>
+          <a:lstStyle/>
+          <a:p>
+            <a:r>
+              <a:rPr lang="de-DE" dirty="0" err="1" smtClean="0"/>
+              <a:t>assignBlobsInOcclusion</a:t>
+            </a:r>
+            <a:r>
+              <a:rPr lang="de-DE" dirty="0" smtClean="0"/>
+              <a:t>: </a:t>
+            </a:r>
+            <a:r>
+              <a:rPr lang="de-DE" dirty="0" err="1"/>
+              <a:t>test</a:t>
+            </a:r>
+            <a:r>
+              <a:rPr lang="de-DE" dirty="0"/>
+              <a:t> </a:t>
+            </a:r>
+            <a:r>
+              <a:rPr lang="de-DE" dirty="0" err="1"/>
+              <a:t>cases</a:t>
+            </a:r>
+            <a:r>
+              <a:rPr lang="de-DE" dirty="0"/>
+              <a:t> </a:t>
+            </a:r>
+          </a:p>
+        </p:txBody>
+      </p:sp>
+      <p:cxnSp>
+        <p:nvCxnSpPr>
+          <p:cNvPr id="11" name="Gerade Verbindung mit Pfeil 10"/>
+          <p:cNvCxnSpPr/>
+          <p:nvPr/>
+        </p:nvCxnSpPr>
+        <p:spPr>
+          <a:xfrm>
+            <a:off x="2036642" y="1260900"/>
+            <a:ext cx="540000" cy="0"/>
+          </a:xfrm>
+          <a:prstGeom prst="straightConnector1">
+            <a:avLst/>
+          </a:prstGeom>
+          <a:ln w="19050">
+            <a:solidFill>
+              <a:schemeClr val="tx1"/>
+            </a:solidFill>
+            <a:headEnd type="none" w="med" len="med"/>
+            <a:tailEnd type="triangle" w="med" len="med"/>
+          </a:ln>
+        </p:spPr>
+        <p:style>
+          <a:lnRef idx="1">
+            <a:schemeClr val="accent1"/>
+          </a:lnRef>
+          <a:fillRef idx="0">
+            <a:schemeClr val="accent1"/>
+          </a:fillRef>
+          <a:effectRef idx="0">
+            <a:schemeClr val="accent1"/>
+          </a:effectRef>
+          <a:fontRef idx="minor">
+            <a:schemeClr val="tx1"/>
+          </a:fontRef>
+        </p:style>
+      </p:cxnSp>
+      <p:cxnSp>
+        <p:nvCxnSpPr>
+          <p:cNvPr id="12" name="Gerade Verbindung mit Pfeil 11"/>
+          <p:cNvCxnSpPr/>
+          <p:nvPr/>
+        </p:nvCxnSpPr>
+        <p:spPr>
+          <a:xfrm flipH="1">
+            <a:off x="3962172" y="1268760"/>
+            <a:ext cx="540000" cy="0"/>
+          </a:xfrm>
+          <a:prstGeom prst="straightConnector1">
+            <a:avLst/>
+          </a:prstGeom>
+          <a:ln w="19050">
+            <a:solidFill>
+              <a:srgbClr val="0070C0"/>
+            </a:solidFill>
+            <a:headEnd type="none" w="med" len="med"/>
+            <a:tailEnd type="triangle" w="med" len="med"/>
+          </a:ln>
+        </p:spPr>
+        <p:style>
+          <a:lnRef idx="1">
+            <a:schemeClr val="accent1"/>
+          </a:lnRef>
+          <a:fillRef idx="0">
+            <a:schemeClr val="accent1"/>
+          </a:fillRef>
+          <a:effectRef idx="0">
+            <a:schemeClr val="accent1"/>
+          </a:effectRef>
+          <a:fontRef idx="minor">
+            <a:schemeClr val="tx1"/>
+          </a:fontRef>
+        </p:style>
+      </p:cxnSp>
+      <p:sp>
+        <p:nvSpPr>
+          <p:cNvPr id="15" name="Rechteck 14"/>
+          <p:cNvSpPr/>
+          <p:nvPr/>
+        </p:nvSpPr>
+        <p:spPr>
+          <a:xfrm>
+            <a:off x="2151928" y="2129129"/>
+            <a:ext cx="1088044" cy="362488"/>
+          </a:xfrm>
+          <a:prstGeom prst="rect">
+            <a:avLst/>
+          </a:prstGeom>
+          <a:noFill/>
+          <a:ln w="38100">
+            <a:solidFill>
+              <a:schemeClr val="tx1"/>
+            </a:solidFill>
+          </a:ln>
+        </p:spPr>
+        <p:style>
+          <a:lnRef idx="2">
+            <a:schemeClr val="accent1">
+              <a:shade val="50000"/>
+            </a:schemeClr>
+          </a:lnRef>
+          <a:fillRef idx="1">
+            <a:schemeClr val="accent1"/>
+          </a:fillRef>
+          <a:effectRef idx="0">
+            <a:schemeClr val="accent1"/>
+          </a:effectRef>
+          <a:fontRef idx="minor">
+            <a:schemeClr val="lt1"/>
+          </a:fontRef>
+        </p:style>
+        <p:txBody>
+          <a:bodyPr rtlCol="0" anchor="ctr"/>
+          <a:lstStyle/>
+          <a:p>
+            <a:pPr algn="ctr"/>
+            <a:endParaRPr lang="de-DE"/>
+          </a:p>
+        </p:txBody>
+      </p:sp>
+      <p:sp>
+        <p:nvSpPr>
+          <p:cNvPr id="18" name="Textfeld 17"/>
+          <p:cNvSpPr txBox="1"/>
+          <p:nvPr/>
+        </p:nvSpPr>
+        <p:spPr>
+          <a:xfrm>
+            <a:off x="2012768" y="980728"/>
+            <a:ext cx="651140" cy="276999"/>
+          </a:xfrm>
+          <a:prstGeom prst="rect">
+            <a:avLst/>
+          </a:prstGeom>
+          <a:noFill/>
+        </p:spPr>
+        <p:txBody>
+          <a:bodyPr wrap="none" rtlCol="0">
+            <a:spAutoFit/>
+          </a:bodyPr>
+          <a:lstStyle/>
+          <a:p>
+            <a:r>
+              <a:rPr lang="de-DE" sz="1200" i="1" dirty="0" err="1" smtClean="0">
+                <a:latin typeface="Times New Roman" panose="02020603050405020304" pitchFamily="18" charset="0"/>
+                <a:cs typeface="Times New Roman" panose="02020603050405020304" pitchFamily="18" charset="0"/>
+              </a:rPr>
+              <a:t>v</a:t>
+            </a:r>
+            <a:r>
+              <a:rPr lang="de-DE" sz="1200" i="1" baseline="-25000" dirty="0" err="1" smtClean="0">
+                <a:latin typeface="Times New Roman" panose="02020603050405020304" pitchFamily="18" charset="0"/>
+                <a:cs typeface="Times New Roman" panose="02020603050405020304" pitchFamily="18" charset="0"/>
+              </a:rPr>
+              <a:t>R</a:t>
+            </a:r>
+            <a:r>
+              <a:rPr lang="de-DE" sz="1200" i="1" dirty="0" smtClean="0">
+                <a:latin typeface="Times New Roman" panose="02020603050405020304" pitchFamily="18" charset="0"/>
+                <a:cs typeface="Times New Roman" panose="02020603050405020304" pitchFamily="18" charset="0"/>
+              </a:rPr>
+              <a:t> = </a:t>
+            </a:r>
+            <a:r>
+              <a:rPr lang="de-DE" sz="1200" i="1" dirty="0" smtClean="0">
+                <a:latin typeface="Times New Roman" panose="02020603050405020304" pitchFamily="18" charset="0"/>
+                <a:cs typeface="Times New Roman" panose="02020603050405020304" pitchFamily="18" charset="0"/>
+              </a:rPr>
+              <a:t>10</a:t>
+            </a:r>
+            <a:endParaRPr lang="de-DE" sz="1200" i="1" dirty="0" smtClean="0">
+              <a:latin typeface="Times New Roman" panose="02020603050405020304" pitchFamily="18" charset="0"/>
+              <a:cs typeface="Times New Roman" panose="02020603050405020304" pitchFamily="18" charset="0"/>
+            </a:endParaRPr>
+          </a:p>
+        </p:txBody>
+      </p:sp>
+      <p:sp>
+        <p:nvSpPr>
+          <p:cNvPr id="19" name="Textfeld 18"/>
+          <p:cNvSpPr txBox="1"/>
+          <p:nvPr/>
+        </p:nvSpPr>
+        <p:spPr>
+          <a:xfrm>
+            <a:off x="3912356" y="988588"/>
+            <a:ext cx="695768" cy="276999"/>
+          </a:xfrm>
+          <a:prstGeom prst="rect">
+            <a:avLst/>
+          </a:prstGeom>
+          <a:noFill/>
+        </p:spPr>
+        <p:txBody>
+          <a:bodyPr wrap="none" rtlCol="0">
+            <a:spAutoFit/>
+          </a:bodyPr>
+          <a:lstStyle/>
+          <a:p>
+            <a:r>
+              <a:rPr lang="de-DE" sz="1200" i="1" dirty="0" err="1" smtClean="0">
+                <a:solidFill>
+                  <a:srgbClr val="0070C0"/>
+                </a:solidFill>
+                <a:latin typeface="Times New Roman" panose="02020603050405020304" pitchFamily="18" charset="0"/>
+                <a:cs typeface="Times New Roman" panose="02020603050405020304" pitchFamily="18" charset="0"/>
+              </a:rPr>
+              <a:t>v</a:t>
+            </a:r>
+            <a:r>
+              <a:rPr lang="de-DE" sz="1200" i="1" baseline="-25000" dirty="0" err="1" smtClean="0">
+                <a:solidFill>
+                  <a:srgbClr val="0070C0"/>
+                </a:solidFill>
+                <a:latin typeface="Times New Roman" panose="02020603050405020304" pitchFamily="18" charset="0"/>
+                <a:cs typeface="Times New Roman" panose="02020603050405020304" pitchFamily="18" charset="0"/>
+              </a:rPr>
+              <a:t>L</a:t>
+            </a:r>
+            <a:r>
+              <a:rPr lang="de-DE" sz="1200" i="1" dirty="0" smtClean="0">
+                <a:solidFill>
+                  <a:srgbClr val="0070C0"/>
+                </a:solidFill>
+                <a:latin typeface="Times New Roman" panose="02020603050405020304" pitchFamily="18" charset="0"/>
+                <a:cs typeface="Times New Roman" panose="02020603050405020304" pitchFamily="18" charset="0"/>
+              </a:rPr>
+              <a:t> = </a:t>
+            </a:r>
+            <a:r>
+              <a:rPr lang="de-DE" sz="1200" i="1" dirty="0" smtClean="0">
+                <a:solidFill>
+                  <a:srgbClr val="0070C0"/>
+                </a:solidFill>
+                <a:latin typeface="Times New Roman" panose="02020603050405020304" pitchFamily="18" charset="0"/>
+                <a:cs typeface="Times New Roman" panose="02020603050405020304" pitchFamily="18" charset="0"/>
+              </a:rPr>
+              <a:t>-10</a:t>
+            </a:r>
+            <a:endParaRPr lang="de-DE" sz="1200" i="1" dirty="0" smtClean="0">
+              <a:solidFill>
+                <a:srgbClr val="0070C0"/>
+              </a:solidFill>
+              <a:latin typeface="Times New Roman" panose="02020603050405020304" pitchFamily="18" charset="0"/>
+              <a:cs typeface="Times New Roman" panose="02020603050405020304" pitchFamily="18" charset="0"/>
+            </a:endParaRPr>
+          </a:p>
+        </p:txBody>
+      </p:sp>
+      <p:sp>
+        <p:nvSpPr>
+          <p:cNvPr id="20" name="Rechteck 19"/>
+          <p:cNvSpPr/>
+          <p:nvPr/>
+        </p:nvSpPr>
+        <p:spPr>
+          <a:xfrm>
+            <a:off x="3384028" y="2095863"/>
+            <a:ext cx="1094668" cy="362634"/>
+          </a:xfrm>
+          <a:prstGeom prst="rect">
+            <a:avLst/>
+          </a:prstGeom>
+          <a:noFill/>
+          <a:ln w="38100">
+            <a:solidFill>
+              <a:srgbClr val="0070C0"/>
+            </a:solidFill>
+          </a:ln>
+        </p:spPr>
+        <p:style>
+          <a:lnRef idx="2">
+            <a:schemeClr val="accent1">
+              <a:shade val="50000"/>
+            </a:schemeClr>
+          </a:lnRef>
+          <a:fillRef idx="1">
+            <a:schemeClr val="accent1"/>
+          </a:fillRef>
+          <a:effectRef idx="0">
+            <a:schemeClr val="accent1"/>
+          </a:effectRef>
+          <a:fontRef idx="minor">
+            <a:schemeClr val="lt1"/>
+          </a:fontRef>
+        </p:style>
+        <p:txBody>
+          <a:bodyPr rtlCol="0" anchor="ctr"/>
+          <a:lstStyle/>
+          <a:p>
+            <a:pPr algn="ctr"/>
+            <a:endParaRPr lang="de-DE"/>
+          </a:p>
+        </p:txBody>
+      </p:sp>
+      <p:sp>
+        <p:nvSpPr>
+          <p:cNvPr id="21" name="Textfeld 20"/>
+          <p:cNvSpPr txBox="1"/>
+          <p:nvPr/>
+        </p:nvSpPr>
+        <p:spPr>
+          <a:xfrm>
+            <a:off x="1619792" y="1628800"/>
+            <a:ext cx="316112" cy="276999"/>
+          </a:xfrm>
+          <a:prstGeom prst="rect">
+            <a:avLst/>
+          </a:prstGeom>
+          <a:noFill/>
+        </p:spPr>
+        <p:txBody>
+          <a:bodyPr wrap="none" rtlCol="0">
+            <a:spAutoFit/>
+          </a:bodyPr>
+          <a:lstStyle/>
+          <a:p>
+            <a:r>
+              <a:rPr lang="de-DE" sz="1200" i="1" dirty="0" err="1" smtClean="0">
+                <a:latin typeface="Times New Roman" panose="02020603050405020304" pitchFamily="18" charset="0"/>
+                <a:cs typeface="Times New Roman" panose="02020603050405020304" pitchFamily="18" charset="0"/>
+              </a:rPr>
+              <a:t>x</a:t>
+            </a:r>
+            <a:r>
+              <a:rPr lang="de-DE" sz="1200" i="1" baseline="-25000" dirty="0" err="1" smtClean="0">
+                <a:latin typeface="Times New Roman" panose="02020603050405020304" pitchFamily="18" charset="0"/>
+                <a:cs typeface="Times New Roman" panose="02020603050405020304" pitchFamily="18" charset="0"/>
+              </a:rPr>
+              <a:t>R</a:t>
+            </a:r>
+            <a:endParaRPr lang="de-DE" sz="1200" i="1" dirty="0" smtClean="0">
+              <a:latin typeface="Times New Roman" panose="02020603050405020304" pitchFamily="18" charset="0"/>
+              <a:cs typeface="Times New Roman" panose="02020603050405020304" pitchFamily="18" charset="0"/>
+            </a:endParaRPr>
+          </a:p>
+        </p:txBody>
+      </p:sp>
+      <p:sp>
+        <p:nvSpPr>
+          <p:cNvPr id="22" name="Textfeld 21"/>
+          <p:cNvSpPr txBox="1"/>
+          <p:nvPr/>
+        </p:nvSpPr>
+        <p:spPr>
+          <a:xfrm>
+            <a:off x="3577405" y="1650866"/>
+            <a:ext cx="311304" cy="276999"/>
+          </a:xfrm>
+          <a:prstGeom prst="rect">
+            <a:avLst/>
+          </a:prstGeom>
+          <a:noFill/>
+        </p:spPr>
+        <p:txBody>
+          <a:bodyPr wrap="none" rtlCol="0">
+            <a:spAutoFit/>
+          </a:bodyPr>
+          <a:lstStyle/>
+          <a:p>
+            <a:r>
+              <a:rPr lang="de-DE" sz="1200" i="1" dirty="0" err="1" smtClean="0">
+                <a:latin typeface="Times New Roman" panose="02020603050405020304" pitchFamily="18" charset="0"/>
+                <a:cs typeface="Times New Roman" panose="02020603050405020304" pitchFamily="18" charset="0"/>
+              </a:rPr>
+              <a:t>x</a:t>
+            </a:r>
+            <a:r>
+              <a:rPr lang="de-DE" sz="1200" i="1" baseline="-25000" dirty="0" err="1" smtClean="0">
+                <a:latin typeface="Times New Roman" panose="02020603050405020304" pitchFamily="18" charset="0"/>
+                <a:cs typeface="Times New Roman" panose="02020603050405020304" pitchFamily="18" charset="0"/>
+              </a:rPr>
+              <a:t>L</a:t>
+            </a:r>
+            <a:endParaRPr lang="de-DE" sz="1200" i="1" dirty="0" smtClean="0">
+              <a:latin typeface="Times New Roman" panose="02020603050405020304" pitchFamily="18" charset="0"/>
+              <a:cs typeface="Times New Roman" panose="02020603050405020304" pitchFamily="18" charset="0"/>
+            </a:endParaRPr>
+          </a:p>
+        </p:txBody>
+      </p:sp>
+      <p:sp>
+        <p:nvSpPr>
+          <p:cNvPr id="9" name="Rechteck 8"/>
+          <p:cNvSpPr/>
+          <p:nvPr/>
+        </p:nvSpPr>
+        <p:spPr>
+          <a:xfrm>
+            <a:off x="3744188" y="1340768"/>
+            <a:ext cx="1079840" cy="362634"/>
+          </a:xfrm>
+          <a:prstGeom prst="rect">
+            <a:avLst/>
+          </a:prstGeom>
+          <a:noFill/>
+          <a:ln w="38100">
+            <a:solidFill>
+              <a:srgbClr val="0070C0"/>
+            </a:solidFill>
+          </a:ln>
+        </p:spPr>
+        <p:style>
+          <a:lnRef idx="2">
+            <a:schemeClr val="accent1">
+              <a:shade val="50000"/>
+            </a:schemeClr>
+          </a:lnRef>
+          <a:fillRef idx="1">
+            <a:schemeClr val="accent1"/>
+          </a:fillRef>
+          <a:effectRef idx="0">
+            <a:schemeClr val="accent1"/>
+          </a:effectRef>
+          <a:fontRef idx="minor">
+            <a:schemeClr val="lt1"/>
+          </a:fontRef>
+        </p:style>
+        <p:txBody>
+          <a:bodyPr rtlCol="0" anchor="ctr"/>
+          <a:lstStyle/>
+          <a:p>
+            <a:pPr algn="ctr"/>
+            <a:endParaRPr lang="de-DE"/>
+          </a:p>
+        </p:txBody>
+      </p:sp>
+      <p:sp>
+        <p:nvSpPr>
+          <p:cNvPr id="10" name="Rechteck 9"/>
+          <p:cNvSpPr/>
+          <p:nvPr/>
+        </p:nvSpPr>
+        <p:spPr>
+          <a:xfrm>
+            <a:off x="1800048" y="1371726"/>
+            <a:ext cx="1071880" cy="359836"/>
+          </a:xfrm>
+          <a:prstGeom prst="rect">
+            <a:avLst/>
+          </a:prstGeom>
+          <a:noFill/>
+          <a:ln w="38100">
+            <a:solidFill>
+              <a:schemeClr val="tx1"/>
+            </a:solidFill>
+          </a:ln>
+        </p:spPr>
+        <p:style>
+          <a:lnRef idx="2">
+            <a:schemeClr val="accent1">
+              <a:shade val="50000"/>
+            </a:schemeClr>
+          </a:lnRef>
+          <a:fillRef idx="1">
+            <a:schemeClr val="accent1"/>
+          </a:fillRef>
+          <a:effectRef idx="0">
+            <a:schemeClr val="accent1"/>
+          </a:effectRef>
+          <a:fontRef idx="minor">
+            <a:schemeClr val="lt1"/>
+          </a:fontRef>
+        </p:style>
+        <p:txBody>
+          <a:bodyPr rtlCol="0" anchor="ctr"/>
+          <a:lstStyle/>
+          <a:p>
+            <a:pPr algn="ctr"/>
+            <a:endParaRPr lang="de-DE"/>
+          </a:p>
+        </p:txBody>
+      </p:sp>
+      <p:sp>
+        <p:nvSpPr>
+          <p:cNvPr id="13" name="Textfeld 12"/>
+          <p:cNvSpPr txBox="1"/>
+          <p:nvPr/>
+        </p:nvSpPr>
+        <p:spPr>
+          <a:xfrm>
+            <a:off x="1871820" y="1387805"/>
+            <a:ext cx="994183" cy="276999"/>
+          </a:xfrm>
+          <a:prstGeom prst="rect">
+            <a:avLst/>
+          </a:prstGeom>
+          <a:noFill/>
+        </p:spPr>
+        <p:txBody>
+          <a:bodyPr wrap="none" rtlCol="0">
+            <a:spAutoFit/>
+          </a:bodyPr>
+          <a:lstStyle/>
+          <a:p>
+            <a:r>
+              <a:rPr lang="de-DE" sz="1200" dirty="0" err="1" smtClean="0">
+                <a:latin typeface="Arial" panose="020B0604020202020204" pitchFamily="34" charset="0"/>
+                <a:cs typeface="Arial" panose="020B0604020202020204" pitchFamily="34" charset="0"/>
+              </a:rPr>
+              <a:t>movesRight</a:t>
+            </a:r>
+            <a:endParaRPr lang="de-DE" sz="1200" dirty="0" smtClean="0">
+              <a:latin typeface="Arial" panose="020B0604020202020204" pitchFamily="34" charset="0"/>
+              <a:cs typeface="Arial" panose="020B0604020202020204" pitchFamily="34" charset="0"/>
+            </a:endParaRPr>
+          </a:p>
+        </p:txBody>
+      </p:sp>
+      <p:sp>
+        <p:nvSpPr>
+          <p:cNvPr id="14" name="Textfeld 13"/>
+          <p:cNvSpPr txBox="1"/>
+          <p:nvPr/>
+        </p:nvSpPr>
+        <p:spPr>
+          <a:xfrm>
+            <a:off x="3852040" y="1376788"/>
+            <a:ext cx="893193" cy="276999"/>
+          </a:xfrm>
+          <a:prstGeom prst="rect">
+            <a:avLst/>
+          </a:prstGeom>
+          <a:noFill/>
+        </p:spPr>
+        <p:txBody>
+          <a:bodyPr wrap="none" rtlCol="0">
+            <a:spAutoFit/>
+          </a:bodyPr>
+          <a:lstStyle/>
+          <a:p>
+            <a:r>
+              <a:rPr lang="de-DE" sz="1200" dirty="0" err="1" smtClean="0">
+                <a:solidFill>
+                  <a:srgbClr val="0070C0"/>
+                </a:solidFill>
+                <a:latin typeface="Arial" panose="020B0604020202020204" pitchFamily="34" charset="0"/>
+                <a:cs typeface="Arial" panose="020B0604020202020204" pitchFamily="34" charset="0"/>
+              </a:rPr>
+              <a:t>movesLeft</a:t>
+            </a:r>
+            <a:endParaRPr lang="de-DE" sz="1200" dirty="0" smtClean="0">
+              <a:solidFill>
+                <a:srgbClr val="0070C0"/>
+              </a:solidFill>
+              <a:latin typeface="Arial" panose="020B0604020202020204" pitchFamily="34" charset="0"/>
+              <a:cs typeface="Arial" panose="020B0604020202020204" pitchFamily="34" charset="0"/>
+            </a:endParaRPr>
+          </a:p>
+        </p:txBody>
+      </p:sp>
+      <p:sp>
+        <p:nvSpPr>
+          <p:cNvPr id="23" name="Rechteck 22"/>
+          <p:cNvSpPr/>
+          <p:nvPr/>
+        </p:nvSpPr>
+        <p:spPr>
+          <a:xfrm>
+            <a:off x="2497380" y="2930356"/>
+            <a:ext cx="1088044" cy="362488"/>
+          </a:xfrm>
+          <a:prstGeom prst="rect">
+            <a:avLst/>
+          </a:prstGeom>
+          <a:noFill/>
+          <a:ln w="19050">
+            <a:solidFill>
+              <a:schemeClr val="tx1"/>
+            </a:solidFill>
+          </a:ln>
+        </p:spPr>
+        <p:style>
+          <a:lnRef idx="2">
+            <a:schemeClr val="accent1">
+              <a:shade val="50000"/>
+            </a:schemeClr>
+          </a:lnRef>
+          <a:fillRef idx="1">
+            <a:schemeClr val="accent1"/>
+          </a:fillRef>
+          <a:effectRef idx="0">
+            <a:schemeClr val="accent1"/>
+          </a:effectRef>
+          <a:fontRef idx="minor">
+            <a:schemeClr val="lt1"/>
+          </a:fontRef>
+        </p:style>
+        <p:txBody>
+          <a:bodyPr rtlCol="0" anchor="ctr"/>
+          <a:lstStyle/>
+          <a:p>
+            <a:pPr algn="ctr"/>
+            <a:endParaRPr lang="de-DE"/>
+          </a:p>
+        </p:txBody>
+      </p:sp>
+      <p:sp>
+        <p:nvSpPr>
+          <p:cNvPr id="24" name="Rechteck 23"/>
+          <p:cNvSpPr/>
+          <p:nvPr/>
+        </p:nvSpPr>
+        <p:spPr>
+          <a:xfrm>
+            <a:off x="3009400" y="2897090"/>
+            <a:ext cx="1094668" cy="362634"/>
+          </a:xfrm>
+          <a:prstGeom prst="rect">
+            <a:avLst/>
+          </a:prstGeom>
+          <a:noFill/>
+          <a:ln w="19050">
+            <a:solidFill>
+              <a:srgbClr val="0070C0"/>
+            </a:solidFill>
+          </a:ln>
+        </p:spPr>
+        <p:style>
+          <a:lnRef idx="2">
+            <a:schemeClr val="accent1">
+              <a:shade val="50000"/>
+            </a:schemeClr>
+          </a:lnRef>
+          <a:fillRef idx="1">
+            <a:schemeClr val="accent1"/>
+          </a:fillRef>
+          <a:effectRef idx="0">
+            <a:schemeClr val="accent1"/>
+          </a:effectRef>
+          <a:fontRef idx="minor">
+            <a:schemeClr val="lt1"/>
+          </a:fontRef>
+        </p:style>
+        <p:txBody>
+          <a:bodyPr rtlCol="0" anchor="ctr"/>
+          <a:lstStyle/>
+          <a:p>
+            <a:pPr algn="ctr"/>
+            <a:endParaRPr lang="de-DE"/>
+          </a:p>
+        </p:txBody>
+      </p:sp>
+      <p:sp>
+        <p:nvSpPr>
+          <p:cNvPr id="26" name="Rechteck 25"/>
+          <p:cNvSpPr/>
+          <p:nvPr/>
+        </p:nvSpPr>
+        <p:spPr>
+          <a:xfrm>
+            <a:off x="2339872" y="2932804"/>
+            <a:ext cx="1088044" cy="362488"/>
+          </a:xfrm>
+          <a:prstGeom prst="rect">
+            <a:avLst/>
+          </a:prstGeom>
+          <a:noFill/>
+          <a:ln w="38100">
+            <a:solidFill>
+              <a:schemeClr val="tx1"/>
+            </a:solidFill>
+          </a:ln>
+        </p:spPr>
+        <p:style>
+          <a:lnRef idx="2">
+            <a:schemeClr val="accent1">
+              <a:shade val="50000"/>
+            </a:schemeClr>
+          </a:lnRef>
+          <a:fillRef idx="1">
+            <a:schemeClr val="accent1"/>
+          </a:fillRef>
+          <a:effectRef idx="0">
+            <a:schemeClr val="accent1"/>
+          </a:effectRef>
+          <a:fontRef idx="minor">
+            <a:schemeClr val="lt1"/>
+          </a:fontRef>
+        </p:style>
+        <p:txBody>
+          <a:bodyPr rtlCol="0" anchor="ctr"/>
+          <a:lstStyle/>
+          <a:p>
+            <a:pPr algn="ctr"/>
+            <a:endParaRPr lang="de-DE"/>
+          </a:p>
+        </p:txBody>
+      </p:sp>
+      <p:sp>
+        <p:nvSpPr>
+          <p:cNvPr id="27" name="Rechteck 26"/>
+          <p:cNvSpPr/>
+          <p:nvPr/>
+        </p:nvSpPr>
+        <p:spPr>
+          <a:xfrm>
+            <a:off x="3189420" y="2896800"/>
+            <a:ext cx="1094668" cy="362634"/>
+          </a:xfrm>
+          <a:prstGeom prst="rect">
+            <a:avLst/>
+          </a:prstGeom>
+          <a:noFill/>
+          <a:ln w="38100">
+            <a:solidFill>
+              <a:srgbClr val="0070C0"/>
+            </a:solidFill>
+          </a:ln>
+        </p:spPr>
+        <p:style>
+          <a:lnRef idx="2">
+            <a:schemeClr val="accent1">
+              <a:shade val="50000"/>
+            </a:schemeClr>
+          </a:lnRef>
+          <a:fillRef idx="1">
+            <a:schemeClr val="accent1"/>
+          </a:fillRef>
+          <a:effectRef idx="0">
+            <a:schemeClr val="accent1"/>
+          </a:effectRef>
+          <a:fontRef idx="minor">
+            <a:schemeClr val="lt1"/>
+          </a:fontRef>
+        </p:style>
+        <p:txBody>
+          <a:bodyPr rtlCol="0" anchor="ctr"/>
+          <a:lstStyle/>
+          <a:p>
+            <a:pPr algn="ctr"/>
+            <a:endParaRPr lang="de-DE"/>
+          </a:p>
+        </p:txBody>
+      </p:sp>
+      <p:sp>
+        <p:nvSpPr>
+          <p:cNvPr id="28" name="Textfeld 27"/>
+          <p:cNvSpPr txBox="1"/>
+          <p:nvPr/>
+        </p:nvSpPr>
+        <p:spPr>
+          <a:xfrm>
+            <a:off x="647564" y="2215897"/>
+            <a:ext cx="444352" cy="276999"/>
+          </a:xfrm>
+          <a:prstGeom prst="rect">
+            <a:avLst/>
+          </a:prstGeom>
+          <a:noFill/>
+        </p:spPr>
+        <p:txBody>
+          <a:bodyPr wrap="none" rtlCol="0">
+            <a:spAutoFit/>
+          </a:bodyPr>
+          <a:lstStyle/>
+          <a:p>
+            <a:r>
+              <a:rPr lang="de-DE" sz="1200" dirty="0" smtClean="0">
+                <a:latin typeface="Arial" panose="020B0604020202020204" pitchFamily="34" charset="0"/>
+                <a:cs typeface="Arial" panose="020B0604020202020204" pitchFamily="34" charset="0"/>
+              </a:rPr>
+              <a:t>n+</a:t>
+            </a:r>
+            <a:r>
+              <a:rPr lang="de-DE" sz="1200" dirty="0" smtClean="0">
+                <a:latin typeface="Arial" panose="020B0604020202020204" pitchFamily="34" charset="0"/>
+                <a:cs typeface="Arial" panose="020B0604020202020204" pitchFamily="34" charset="0"/>
+              </a:rPr>
+              <a:t>1</a:t>
+            </a:r>
+            <a:endParaRPr lang="de-DE" sz="1200" dirty="0" smtClean="0">
+              <a:latin typeface="Arial" panose="020B0604020202020204" pitchFamily="34" charset="0"/>
+              <a:cs typeface="Arial" panose="020B0604020202020204" pitchFamily="34" charset="0"/>
+            </a:endParaRPr>
+          </a:p>
+        </p:txBody>
+      </p:sp>
+      <p:cxnSp>
+        <p:nvCxnSpPr>
+          <p:cNvPr id="29" name="Gerade Verbindung mit Pfeil 28"/>
+          <p:cNvCxnSpPr/>
+          <p:nvPr/>
+        </p:nvCxnSpPr>
+        <p:spPr>
+          <a:xfrm>
+            <a:off x="2540578" y="2780928"/>
+            <a:ext cx="540000" cy="0"/>
+          </a:xfrm>
+          <a:prstGeom prst="straightConnector1">
+            <a:avLst/>
+          </a:prstGeom>
+          <a:ln w="19050">
+            <a:solidFill>
+              <a:schemeClr val="tx1"/>
+            </a:solidFill>
+            <a:headEnd type="none" w="med" len="med"/>
+            <a:tailEnd type="triangle" w="med" len="med"/>
+          </a:ln>
+        </p:spPr>
+        <p:style>
+          <a:lnRef idx="1">
+            <a:schemeClr val="accent1"/>
+          </a:lnRef>
+          <a:fillRef idx="0">
+            <a:schemeClr val="accent1"/>
+          </a:fillRef>
+          <a:effectRef idx="0">
+            <a:schemeClr val="accent1"/>
+          </a:effectRef>
+          <a:fontRef idx="minor">
+            <a:schemeClr val="tx1"/>
+          </a:fontRef>
+        </p:style>
+      </p:cxnSp>
+      <p:cxnSp>
+        <p:nvCxnSpPr>
+          <p:cNvPr id="30" name="Gerade Verbindung mit Pfeil 29"/>
+          <p:cNvCxnSpPr/>
+          <p:nvPr/>
+        </p:nvCxnSpPr>
+        <p:spPr>
+          <a:xfrm flipH="1">
+            <a:off x="3541696" y="2788788"/>
+            <a:ext cx="540000" cy="0"/>
+          </a:xfrm>
+          <a:prstGeom prst="straightConnector1">
+            <a:avLst/>
+          </a:prstGeom>
+          <a:ln w="19050">
+            <a:solidFill>
+              <a:srgbClr val="0070C0"/>
+            </a:solidFill>
+            <a:headEnd type="none" w="med" len="med"/>
+            <a:tailEnd type="triangle" w="med" len="med"/>
+          </a:ln>
+        </p:spPr>
+        <p:style>
+          <a:lnRef idx="1">
+            <a:schemeClr val="accent1"/>
+          </a:lnRef>
+          <a:fillRef idx="0">
+            <a:schemeClr val="accent1"/>
+          </a:fillRef>
+          <a:effectRef idx="0">
+            <a:schemeClr val="accent1"/>
+          </a:effectRef>
+          <a:fontRef idx="minor">
+            <a:schemeClr val="tx1"/>
+          </a:fontRef>
+        </p:style>
+      </p:cxnSp>
+      <p:sp>
+        <p:nvSpPr>
+          <p:cNvPr id="31" name="Textfeld 30"/>
+          <p:cNvSpPr txBox="1"/>
+          <p:nvPr/>
+        </p:nvSpPr>
+        <p:spPr>
+          <a:xfrm>
+            <a:off x="2516704" y="2528900"/>
+            <a:ext cx="574196" cy="276999"/>
+          </a:xfrm>
+          <a:prstGeom prst="rect">
+            <a:avLst/>
+          </a:prstGeom>
+          <a:noFill/>
+        </p:spPr>
+        <p:txBody>
+          <a:bodyPr wrap="none" rtlCol="0">
+            <a:spAutoFit/>
+          </a:bodyPr>
+          <a:lstStyle/>
+          <a:p>
+            <a:r>
+              <a:rPr lang="de-DE" sz="1200" i="1" dirty="0" err="1" smtClean="0">
+                <a:latin typeface="Times New Roman" panose="02020603050405020304" pitchFamily="18" charset="0"/>
+                <a:cs typeface="Times New Roman" panose="02020603050405020304" pitchFamily="18" charset="0"/>
+              </a:rPr>
+              <a:t>v</a:t>
+            </a:r>
+            <a:r>
+              <a:rPr lang="de-DE" sz="1200" i="1" baseline="-25000" dirty="0" err="1" smtClean="0">
+                <a:latin typeface="Times New Roman" panose="02020603050405020304" pitchFamily="18" charset="0"/>
+                <a:cs typeface="Times New Roman" panose="02020603050405020304" pitchFamily="18" charset="0"/>
+              </a:rPr>
+              <a:t>R</a:t>
+            </a:r>
+            <a:r>
+              <a:rPr lang="de-DE" sz="1200" i="1" dirty="0" smtClean="0">
+                <a:latin typeface="Times New Roman" panose="02020603050405020304" pitchFamily="18" charset="0"/>
+                <a:cs typeface="Times New Roman" panose="02020603050405020304" pitchFamily="18" charset="0"/>
+              </a:rPr>
+              <a:t> = </a:t>
+            </a:r>
+            <a:r>
+              <a:rPr lang="de-DE" sz="1200" i="1" dirty="0" smtClean="0">
+                <a:latin typeface="Times New Roman" panose="02020603050405020304" pitchFamily="18" charset="0"/>
+                <a:cs typeface="Times New Roman" panose="02020603050405020304" pitchFamily="18" charset="0"/>
+              </a:rPr>
+              <a:t>5</a:t>
+            </a:r>
+            <a:endParaRPr lang="de-DE" sz="1200" i="1" dirty="0" smtClean="0">
+              <a:latin typeface="Times New Roman" panose="02020603050405020304" pitchFamily="18" charset="0"/>
+              <a:cs typeface="Times New Roman" panose="02020603050405020304" pitchFamily="18" charset="0"/>
+            </a:endParaRPr>
+          </a:p>
+        </p:txBody>
+      </p:sp>
+      <p:sp>
+        <p:nvSpPr>
+          <p:cNvPr id="32" name="Textfeld 31"/>
+          <p:cNvSpPr txBox="1"/>
+          <p:nvPr/>
+        </p:nvSpPr>
+        <p:spPr>
+          <a:xfrm>
+            <a:off x="3491880" y="2536760"/>
+            <a:ext cx="618824" cy="276999"/>
+          </a:xfrm>
+          <a:prstGeom prst="rect">
+            <a:avLst/>
+          </a:prstGeom>
+          <a:noFill/>
+        </p:spPr>
+        <p:txBody>
+          <a:bodyPr wrap="none" rtlCol="0">
+            <a:spAutoFit/>
+          </a:bodyPr>
+          <a:lstStyle/>
+          <a:p>
+            <a:r>
+              <a:rPr lang="de-DE" sz="1200" i="1" dirty="0" err="1" smtClean="0">
+                <a:solidFill>
+                  <a:srgbClr val="0070C0"/>
+                </a:solidFill>
+                <a:latin typeface="Times New Roman" panose="02020603050405020304" pitchFamily="18" charset="0"/>
+                <a:cs typeface="Times New Roman" panose="02020603050405020304" pitchFamily="18" charset="0"/>
+              </a:rPr>
+              <a:t>v</a:t>
+            </a:r>
+            <a:r>
+              <a:rPr lang="de-DE" sz="1200" i="1" baseline="-25000" dirty="0" err="1" smtClean="0">
+                <a:solidFill>
+                  <a:srgbClr val="0070C0"/>
+                </a:solidFill>
+                <a:latin typeface="Times New Roman" panose="02020603050405020304" pitchFamily="18" charset="0"/>
+                <a:cs typeface="Times New Roman" panose="02020603050405020304" pitchFamily="18" charset="0"/>
+              </a:rPr>
+              <a:t>L</a:t>
+            </a:r>
+            <a:r>
+              <a:rPr lang="de-DE" sz="1200" i="1" dirty="0" smtClean="0">
+                <a:solidFill>
+                  <a:srgbClr val="0070C0"/>
+                </a:solidFill>
+                <a:latin typeface="Times New Roman" panose="02020603050405020304" pitchFamily="18" charset="0"/>
+                <a:cs typeface="Times New Roman" panose="02020603050405020304" pitchFamily="18" charset="0"/>
+              </a:rPr>
+              <a:t> = </a:t>
+            </a:r>
+            <a:r>
+              <a:rPr lang="de-DE" sz="1200" i="1" dirty="0" smtClean="0">
+                <a:solidFill>
+                  <a:srgbClr val="0070C0"/>
+                </a:solidFill>
+                <a:latin typeface="Times New Roman" panose="02020603050405020304" pitchFamily="18" charset="0"/>
+                <a:cs typeface="Times New Roman" panose="02020603050405020304" pitchFamily="18" charset="0"/>
+              </a:rPr>
+              <a:t>-5</a:t>
+            </a:r>
+            <a:endParaRPr lang="de-DE" sz="1200" i="1" dirty="0" smtClean="0">
+              <a:solidFill>
+                <a:srgbClr val="0070C0"/>
+              </a:solidFill>
+              <a:latin typeface="Times New Roman" panose="02020603050405020304" pitchFamily="18" charset="0"/>
+              <a:cs typeface="Times New Roman" panose="02020603050405020304" pitchFamily="18" charset="0"/>
+            </a:endParaRPr>
+          </a:p>
+        </p:txBody>
+      </p:sp>
+      <p:sp>
+        <p:nvSpPr>
+          <p:cNvPr id="33" name="Rechteck 32"/>
+          <p:cNvSpPr/>
+          <p:nvPr/>
+        </p:nvSpPr>
+        <p:spPr>
+          <a:xfrm>
+            <a:off x="1763688" y="1304764"/>
+            <a:ext cx="3118188" cy="468436"/>
+          </a:xfrm>
+          <a:prstGeom prst="rect">
+            <a:avLst/>
+          </a:prstGeom>
+          <a:noFill/>
+          <a:ln w="19050">
+            <a:solidFill>
+              <a:schemeClr val="accent3">
+                <a:lumMod val="75000"/>
+              </a:schemeClr>
+            </a:solidFill>
+            <a:prstDash val="dash"/>
+          </a:ln>
+        </p:spPr>
+        <p:style>
+          <a:lnRef idx="2">
+            <a:schemeClr val="accent1">
+              <a:shade val="50000"/>
+            </a:schemeClr>
+          </a:lnRef>
+          <a:fillRef idx="1">
+            <a:schemeClr val="accent1"/>
+          </a:fillRef>
+          <a:effectRef idx="0">
+            <a:schemeClr val="accent1"/>
+          </a:effectRef>
+          <a:fontRef idx="minor">
+            <a:schemeClr val="lt1"/>
+          </a:fontRef>
+        </p:style>
+        <p:txBody>
+          <a:bodyPr rtlCol="0" anchor="ctr"/>
+          <a:lstStyle/>
+          <a:p>
+            <a:pPr algn="ctr"/>
+            <a:endParaRPr lang="de-DE"/>
+          </a:p>
+        </p:txBody>
+      </p:sp>
+      <p:sp>
+        <p:nvSpPr>
+          <p:cNvPr id="34" name="Rechteck 33"/>
+          <p:cNvSpPr/>
+          <p:nvPr/>
+        </p:nvSpPr>
+        <p:spPr>
+          <a:xfrm>
+            <a:off x="2123728" y="5300824"/>
+            <a:ext cx="1094668" cy="362634"/>
+          </a:xfrm>
+          <a:prstGeom prst="rect">
+            <a:avLst/>
+          </a:prstGeom>
+          <a:noFill/>
+          <a:ln w="38100">
+            <a:solidFill>
+              <a:srgbClr val="0070C0"/>
+            </a:solidFill>
+          </a:ln>
+        </p:spPr>
+        <p:style>
+          <a:lnRef idx="2">
+            <a:schemeClr val="accent1">
+              <a:shade val="50000"/>
+            </a:schemeClr>
+          </a:lnRef>
+          <a:fillRef idx="1">
+            <a:schemeClr val="accent1"/>
+          </a:fillRef>
+          <a:effectRef idx="0">
+            <a:schemeClr val="accent1"/>
+          </a:effectRef>
+          <a:fontRef idx="minor">
+            <a:schemeClr val="lt1"/>
+          </a:fontRef>
+        </p:style>
+        <p:txBody>
+          <a:bodyPr rtlCol="0" anchor="ctr"/>
+          <a:lstStyle/>
+          <a:p>
+            <a:pPr algn="ctr"/>
+            <a:endParaRPr lang="de-DE"/>
+          </a:p>
+        </p:txBody>
+      </p:sp>
+      <p:sp>
+        <p:nvSpPr>
+          <p:cNvPr id="35" name="Rechteck 34"/>
+          <p:cNvSpPr/>
+          <p:nvPr/>
+        </p:nvSpPr>
+        <p:spPr>
+          <a:xfrm>
+            <a:off x="3411948" y="5334380"/>
+            <a:ext cx="1088044" cy="362488"/>
+          </a:xfrm>
+          <a:prstGeom prst="rect">
+            <a:avLst/>
+          </a:prstGeom>
+          <a:noFill/>
+          <a:ln w="38100">
+            <a:solidFill>
+              <a:schemeClr val="tx1"/>
+            </a:solidFill>
+          </a:ln>
+        </p:spPr>
+        <p:style>
+          <a:lnRef idx="2">
+            <a:schemeClr val="accent1">
+              <a:shade val="50000"/>
+            </a:schemeClr>
+          </a:lnRef>
+          <a:fillRef idx="1">
+            <a:schemeClr val="accent1"/>
+          </a:fillRef>
+          <a:effectRef idx="0">
+            <a:schemeClr val="accent1"/>
+          </a:effectRef>
+          <a:fontRef idx="minor">
+            <a:schemeClr val="lt1"/>
+          </a:fontRef>
+        </p:style>
+        <p:txBody>
+          <a:bodyPr rtlCol="0" anchor="ctr"/>
+          <a:lstStyle/>
+          <a:p>
+            <a:pPr algn="ctr"/>
+            <a:endParaRPr lang="de-DE"/>
+          </a:p>
+        </p:txBody>
+      </p:sp>
+      <p:sp>
+        <p:nvSpPr>
+          <p:cNvPr id="36" name="Rechteck 35"/>
+          <p:cNvSpPr/>
+          <p:nvPr/>
+        </p:nvSpPr>
+        <p:spPr>
+          <a:xfrm>
+            <a:off x="1763688" y="5264820"/>
+            <a:ext cx="3118188" cy="468436"/>
+          </a:xfrm>
+          <a:prstGeom prst="rect">
+            <a:avLst/>
+          </a:prstGeom>
+          <a:noFill/>
+          <a:ln w="19050">
+            <a:solidFill>
+              <a:schemeClr val="accent3">
+                <a:lumMod val="75000"/>
+              </a:schemeClr>
+            </a:solidFill>
+            <a:prstDash val="dash"/>
+          </a:ln>
+        </p:spPr>
+        <p:style>
+          <a:lnRef idx="2">
+            <a:schemeClr val="accent1">
+              <a:shade val="50000"/>
+            </a:schemeClr>
+          </a:lnRef>
+          <a:fillRef idx="1">
+            <a:schemeClr val="accent1"/>
+          </a:fillRef>
+          <a:effectRef idx="0">
+            <a:schemeClr val="accent1"/>
+          </a:effectRef>
+          <a:fontRef idx="minor">
+            <a:schemeClr val="lt1"/>
+          </a:fontRef>
+        </p:style>
+        <p:txBody>
+          <a:bodyPr rtlCol="0" anchor="ctr"/>
+          <a:lstStyle/>
+          <a:p>
+            <a:pPr algn="ctr"/>
+            <a:endParaRPr lang="de-DE"/>
+          </a:p>
+        </p:txBody>
+      </p:sp>
+      <p:sp>
+        <p:nvSpPr>
+          <p:cNvPr id="37" name="Textfeld 36"/>
+          <p:cNvSpPr txBox="1"/>
+          <p:nvPr/>
+        </p:nvSpPr>
+        <p:spPr>
+          <a:xfrm>
+            <a:off x="647564" y="2956130"/>
+            <a:ext cx="444352" cy="276999"/>
+          </a:xfrm>
+          <a:prstGeom prst="rect">
+            <a:avLst/>
+          </a:prstGeom>
+          <a:noFill/>
+        </p:spPr>
+        <p:txBody>
+          <a:bodyPr wrap="none" rtlCol="0">
+            <a:spAutoFit/>
+          </a:bodyPr>
+          <a:lstStyle/>
+          <a:p>
+            <a:r>
+              <a:rPr lang="de-DE" sz="1200" dirty="0" smtClean="0">
+                <a:latin typeface="Arial" panose="020B0604020202020204" pitchFamily="34" charset="0"/>
+                <a:cs typeface="Arial" panose="020B0604020202020204" pitchFamily="34" charset="0"/>
+              </a:rPr>
+              <a:t>n+</a:t>
+            </a:r>
+            <a:r>
+              <a:rPr lang="de-DE" sz="1200" dirty="0" smtClean="0">
+                <a:latin typeface="Arial" panose="020B0604020202020204" pitchFamily="34" charset="0"/>
+                <a:cs typeface="Arial" panose="020B0604020202020204" pitchFamily="34" charset="0"/>
+              </a:rPr>
+              <a:t>2</a:t>
+            </a:r>
+            <a:endParaRPr lang="de-DE" sz="1200" dirty="0" smtClean="0">
+              <a:latin typeface="Arial" panose="020B0604020202020204" pitchFamily="34" charset="0"/>
+              <a:cs typeface="Arial" panose="020B0604020202020204" pitchFamily="34" charset="0"/>
+            </a:endParaRPr>
+          </a:p>
+        </p:txBody>
+      </p:sp>
+      <p:sp>
+        <p:nvSpPr>
+          <p:cNvPr id="38" name="Textfeld 37"/>
+          <p:cNvSpPr txBox="1"/>
+          <p:nvPr/>
+        </p:nvSpPr>
+        <p:spPr>
+          <a:xfrm>
+            <a:off x="647564" y="5360538"/>
+            <a:ext cx="444352" cy="276999"/>
+          </a:xfrm>
+          <a:prstGeom prst="rect">
+            <a:avLst/>
+          </a:prstGeom>
+          <a:noFill/>
+        </p:spPr>
+        <p:txBody>
+          <a:bodyPr wrap="none" rtlCol="0">
+            <a:spAutoFit/>
+          </a:bodyPr>
+          <a:lstStyle/>
+          <a:p>
+            <a:r>
+              <a:rPr lang="de-DE" sz="1200" dirty="0" smtClean="0">
+                <a:latin typeface="Arial" panose="020B0604020202020204" pitchFamily="34" charset="0"/>
+                <a:cs typeface="Arial" panose="020B0604020202020204" pitchFamily="34" charset="0"/>
+              </a:rPr>
+              <a:t>n+</a:t>
+            </a:r>
+            <a:r>
+              <a:rPr lang="de-DE" sz="1200" dirty="0" smtClean="0">
+                <a:latin typeface="Arial" panose="020B0604020202020204" pitchFamily="34" charset="0"/>
+                <a:cs typeface="Arial" panose="020B0604020202020204" pitchFamily="34" charset="0"/>
+              </a:rPr>
+              <a:t>8</a:t>
+            </a:r>
+            <a:endParaRPr lang="de-DE" sz="1200" dirty="0" smtClean="0">
+              <a:latin typeface="Arial" panose="020B0604020202020204" pitchFamily="34" charset="0"/>
+              <a:cs typeface="Arial" panose="020B0604020202020204" pitchFamily="34" charset="0"/>
+            </a:endParaRPr>
+          </a:p>
+        </p:txBody>
+      </p:sp>
+      <p:sp>
+        <p:nvSpPr>
+          <p:cNvPr id="39" name="Textfeld 38"/>
+          <p:cNvSpPr txBox="1"/>
+          <p:nvPr/>
+        </p:nvSpPr>
+        <p:spPr>
+          <a:xfrm>
+            <a:off x="647564" y="1400482"/>
+            <a:ext cx="269626" cy="276999"/>
+          </a:xfrm>
+          <a:prstGeom prst="rect">
+            <a:avLst/>
+          </a:prstGeom>
+          <a:noFill/>
+        </p:spPr>
+        <p:txBody>
+          <a:bodyPr wrap="none" rtlCol="0">
+            <a:spAutoFit/>
+          </a:bodyPr>
+          <a:lstStyle/>
+          <a:p>
+            <a:r>
+              <a:rPr lang="de-DE" sz="1200" dirty="0">
+                <a:latin typeface="Arial" panose="020B0604020202020204" pitchFamily="34" charset="0"/>
+                <a:cs typeface="Arial" panose="020B0604020202020204" pitchFamily="34" charset="0"/>
+              </a:rPr>
+              <a:t>n</a:t>
+            </a:r>
+            <a:endParaRPr lang="de-DE" sz="1200" dirty="0" smtClean="0">
+              <a:latin typeface="Arial" panose="020B0604020202020204" pitchFamily="34" charset="0"/>
+              <a:cs typeface="Arial" panose="020B0604020202020204" pitchFamily="34" charset="0"/>
+            </a:endParaRPr>
+          </a:p>
+        </p:txBody>
+      </p:sp>
+      <p:sp>
+        <p:nvSpPr>
+          <p:cNvPr id="41" name="Textfeld 40"/>
+          <p:cNvSpPr txBox="1"/>
+          <p:nvPr/>
+        </p:nvSpPr>
+        <p:spPr>
+          <a:xfrm>
+            <a:off x="5112060" y="1311151"/>
+            <a:ext cx="3204356" cy="646331"/>
+          </a:xfrm>
+          <a:prstGeom prst="rect">
+            <a:avLst/>
+          </a:prstGeom>
+          <a:noFill/>
+        </p:spPr>
+        <p:txBody>
+          <a:bodyPr wrap="square" rtlCol="0">
+            <a:spAutoFit/>
+          </a:bodyPr>
+          <a:lstStyle/>
+          <a:p>
+            <a:pPr>
+              <a:tabLst>
+                <a:tab pos="2330450" algn="l"/>
+              </a:tabLst>
+            </a:pPr>
+            <a:r>
+              <a:rPr lang="de-DE" sz="1200" dirty="0" err="1" smtClean="0">
+                <a:latin typeface="Arial" panose="020B0604020202020204" pitchFamily="34" charset="0"/>
+                <a:cs typeface="Arial" panose="020B0604020202020204" pitchFamily="34" charset="0"/>
+              </a:rPr>
+              <a:t>isNexUpdateOccluded</a:t>
+            </a:r>
+            <a:r>
+              <a:rPr lang="de-DE" sz="1200" dirty="0" smtClean="0">
+                <a:latin typeface="Arial" panose="020B0604020202020204" pitchFamily="34" charset="0"/>
+                <a:cs typeface="Arial" panose="020B0604020202020204" pitchFamily="34" charset="0"/>
+              </a:rPr>
+              <a:t>:	</a:t>
+            </a:r>
+            <a:r>
+              <a:rPr lang="de-DE" sz="1200" dirty="0" err="1" smtClean="0">
+                <a:latin typeface="Arial" panose="020B0604020202020204" pitchFamily="34" charset="0"/>
+                <a:cs typeface="Arial" panose="020B0604020202020204" pitchFamily="34" charset="0"/>
+              </a:rPr>
+              <a:t>true</a:t>
+            </a:r>
+            <a:endParaRPr lang="de-DE" sz="1200" dirty="0" smtClean="0">
+              <a:latin typeface="Arial" panose="020B0604020202020204" pitchFamily="34" charset="0"/>
+              <a:cs typeface="Arial" panose="020B0604020202020204" pitchFamily="34" charset="0"/>
+            </a:endParaRPr>
+          </a:p>
+          <a:p>
+            <a:pPr>
+              <a:tabLst>
+                <a:tab pos="2330450" algn="l"/>
+              </a:tabLst>
+            </a:pPr>
+            <a:r>
+              <a:rPr lang="de-DE" sz="1200" dirty="0" err="1" smtClean="0">
+                <a:latin typeface="Arial" panose="020B0604020202020204" pitchFamily="34" charset="0"/>
+                <a:cs typeface="Arial" panose="020B0604020202020204" pitchFamily="34" charset="0"/>
+              </a:rPr>
+              <a:t>re</a:t>
+            </a:r>
+            <a:r>
+              <a:rPr lang="de-DE" sz="1200" dirty="0" err="1" smtClean="0">
+                <a:latin typeface="Arial" panose="020B0604020202020204" pitchFamily="34" charset="0"/>
+                <a:cs typeface="Arial" panose="020B0604020202020204" pitchFamily="34" charset="0"/>
+              </a:rPr>
+              <a:t>mainingOccludedUpdateSteps</a:t>
+            </a:r>
+            <a:r>
+              <a:rPr lang="de-DE" sz="1200" dirty="0" smtClean="0">
+                <a:latin typeface="Arial" panose="020B0604020202020204" pitchFamily="34" charset="0"/>
+                <a:cs typeface="Arial" panose="020B0604020202020204" pitchFamily="34" charset="0"/>
+              </a:rPr>
+              <a:t>:	5</a:t>
+            </a:r>
+          </a:p>
+          <a:p>
+            <a:pPr>
+              <a:tabLst>
+                <a:tab pos="2330450" algn="l"/>
+              </a:tabLst>
+            </a:pPr>
+            <a:r>
+              <a:rPr lang="de-DE" sz="1200" dirty="0" smtClean="0">
+                <a:latin typeface="Arial" panose="020B0604020202020204" pitchFamily="34" charset="0"/>
+                <a:cs typeface="Arial" panose="020B0604020202020204" pitchFamily="34" charset="0"/>
+              </a:rPr>
+              <a:t>84 / 20 = 4.2	</a:t>
+            </a:r>
+            <a:endParaRPr lang="de-DE" sz="1200" dirty="0" smtClean="0">
+              <a:latin typeface="Arial" panose="020B0604020202020204" pitchFamily="34" charset="0"/>
+              <a:cs typeface="Arial" panose="020B0604020202020204" pitchFamily="34" charset="0"/>
+            </a:endParaRPr>
+          </a:p>
+        </p:txBody>
+      </p:sp>
+      <p:sp>
+        <p:nvSpPr>
+          <p:cNvPr id="42" name="Geschweifte Klammer rechts 41"/>
+          <p:cNvSpPr/>
+          <p:nvPr/>
+        </p:nvSpPr>
+        <p:spPr>
+          <a:xfrm rot="16200000">
+            <a:off x="3234559" y="686959"/>
+            <a:ext cx="143754" cy="853246"/>
+          </a:xfrm>
+          <a:prstGeom prst="rightBrace">
+            <a:avLst/>
+          </a:prstGeom>
+          <a:ln w="9525">
+            <a:solidFill>
+              <a:schemeClr val="tx1"/>
+            </a:solidFill>
+            <a:headEnd type="none" w="med" len="med"/>
+            <a:tailEnd type="none" w="med" len="med"/>
+          </a:ln>
+        </p:spPr>
+        <p:style>
+          <a:lnRef idx="1">
+            <a:schemeClr val="accent1"/>
+          </a:lnRef>
+          <a:fillRef idx="0">
+            <a:schemeClr val="accent1"/>
+          </a:fillRef>
+          <a:effectRef idx="0">
+            <a:schemeClr val="accent1"/>
+          </a:effectRef>
+          <a:fontRef idx="minor">
+            <a:schemeClr val="tx1"/>
+          </a:fontRef>
+        </p:style>
+        <p:txBody>
+          <a:bodyPr rtlCol="0" anchor="ctr"/>
+          <a:lstStyle/>
+          <a:p>
+            <a:pPr algn="ctr"/>
+            <a:endParaRPr lang="de-DE"/>
+          </a:p>
+        </p:txBody>
+      </p:sp>
+      <p:sp>
+        <p:nvSpPr>
+          <p:cNvPr id="43" name="Textfeld 42"/>
+          <p:cNvSpPr txBox="1"/>
+          <p:nvPr/>
+        </p:nvSpPr>
+        <p:spPr>
+          <a:xfrm>
+            <a:off x="3112382" y="764705"/>
+            <a:ext cx="354584" cy="276999"/>
+          </a:xfrm>
+          <a:prstGeom prst="rect">
+            <a:avLst/>
+          </a:prstGeom>
+          <a:noFill/>
+        </p:spPr>
+        <p:txBody>
+          <a:bodyPr wrap="none" rtlCol="0">
+            <a:spAutoFit/>
+          </a:bodyPr>
+          <a:lstStyle/>
+          <a:p>
+            <a:r>
+              <a:rPr lang="de-DE" sz="1200" dirty="0" smtClean="0">
+                <a:latin typeface="Arial" panose="020B0604020202020204" pitchFamily="34" charset="0"/>
+                <a:cs typeface="Arial" panose="020B0604020202020204" pitchFamily="34" charset="0"/>
+              </a:rPr>
+              <a:t>24</a:t>
+            </a:r>
+            <a:endParaRPr lang="de-DE" sz="1200" dirty="0" smtClean="0">
+              <a:latin typeface="Arial" panose="020B0604020202020204" pitchFamily="34" charset="0"/>
+              <a:cs typeface="Arial" panose="020B0604020202020204" pitchFamily="34" charset="0"/>
+            </a:endParaRPr>
+          </a:p>
+        </p:txBody>
+      </p:sp>
+      <p:sp>
+        <p:nvSpPr>
+          <p:cNvPr id="44" name="Textfeld 43"/>
+          <p:cNvSpPr txBox="1"/>
+          <p:nvPr/>
+        </p:nvSpPr>
+        <p:spPr>
+          <a:xfrm>
+            <a:off x="647564" y="4160113"/>
+            <a:ext cx="444352" cy="276999"/>
+          </a:xfrm>
+          <a:prstGeom prst="rect">
+            <a:avLst/>
+          </a:prstGeom>
+          <a:noFill/>
+        </p:spPr>
+        <p:txBody>
+          <a:bodyPr wrap="none" rtlCol="0">
+            <a:spAutoFit/>
+          </a:bodyPr>
+          <a:lstStyle/>
+          <a:p>
+            <a:r>
+              <a:rPr lang="de-DE" sz="1200" dirty="0" smtClean="0">
+                <a:latin typeface="Arial" panose="020B0604020202020204" pitchFamily="34" charset="0"/>
+                <a:cs typeface="Arial" panose="020B0604020202020204" pitchFamily="34" charset="0"/>
+              </a:rPr>
+              <a:t>n+</a:t>
+            </a:r>
+            <a:r>
+              <a:rPr lang="de-DE" sz="1200" dirty="0">
+                <a:latin typeface="Arial" panose="020B0604020202020204" pitchFamily="34" charset="0"/>
+                <a:cs typeface="Arial" panose="020B0604020202020204" pitchFamily="34" charset="0"/>
+              </a:rPr>
+              <a:t>5</a:t>
+            </a:r>
+            <a:endParaRPr lang="de-DE" sz="1200" dirty="0" smtClean="0">
+              <a:latin typeface="Arial" panose="020B0604020202020204" pitchFamily="34" charset="0"/>
+              <a:cs typeface="Arial" panose="020B0604020202020204" pitchFamily="34" charset="0"/>
+            </a:endParaRPr>
+          </a:p>
+        </p:txBody>
+      </p:sp>
+      <p:sp>
+        <p:nvSpPr>
+          <p:cNvPr id="45" name="Rechteck 44"/>
+          <p:cNvSpPr/>
+          <p:nvPr/>
+        </p:nvSpPr>
+        <p:spPr>
+          <a:xfrm>
+            <a:off x="3591968" y="4146632"/>
+            <a:ext cx="1088044" cy="362488"/>
+          </a:xfrm>
+          <a:prstGeom prst="rect">
+            <a:avLst/>
+          </a:prstGeom>
+          <a:noFill/>
+          <a:ln w="19050">
+            <a:solidFill>
+              <a:schemeClr val="tx1"/>
+            </a:solidFill>
+          </a:ln>
+        </p:spPr>
+        <p:style>
+          <a:lnRef idx="2">
+            <a:schemeClr val="accent1">
+              <a:shade val="50000"/>
+            </a:schemeClr>
+          </a:lnRef>
+          <a:fillRef idx="1">
+            <a:schemeClr val="accent1"/>
+          </a:fillRef>
+          <a:effectRef idx="0">
+            <a:schemeClr val="accent1"/>
+          </a:effectRef>
+          <a:fontRef idx="minor">
+            <a:schemeClr val="lt1"/>
+          </a:fontRef>
+        </p:style>
+        <p:txBody>
+          <a:bodyPr rtlCol="0" anchor="ctr"/>
+          <a:lstStyle/>
+          <a:p>
+            <a:pPr algn="ctr"/>
+            <a:endParaRPr lang="de-DE"/>
+          </a:p>
+        </p:txBody>
+      </p:sp>
+      <p:sp>
+        <p:nvSpPr>
+          <p:cNvPr id="46" name="Rechteck 45"/>
+          <p:cNvSpPr/>
+          <p:nvPr/>
+        </p:nvSpPr>
+        <p:spPr>
+          <a:xfrm>
+            <a:off x="1943708" y="4113366"/>
+            <a:ext cx="1080480" cy="362634"/>
+          </a:xfrm>
+          <a:prstGeom prst="rect">
+            <a:avLst/>
+          </a:prstGeom>
+          <a:noFill/>
+          <a:ln w="19050">
+            <a:solidFill>
+              <a:srgbClr val="0070C0"/>
+            </a:solidFill>
+          </a:ln>
+        </p:spPr>
+        <p:style>
+          <a:lnRef idx="2">
+            <a:schemeClr val="accent1">
+              <a:shade val="50000"/>
+            </a:schemeClr>
+          </a:lnRef>
+          <a:fillRef idx="1">
+            <a:schemeClr val="accent1"/>
+          </a:fillRef>
+          <a:effectRef idx="0">
+            <a:schemeClr val="accent1"/>
+          </a:effectRef>
+          <a:fontRef idx="minor">
+            <a:schemeClr val="lt1"/>
+          </a:fontRef>
+        </p:style>
+        <p:txBody>
+          <a:bodyPr rtlCol="0" anchor="ctr"/>
+          <a:lstStyle/>
+          <a:p>
+            <a:pPr algn="ctr"/>
+            <a:endParaRPr lang="de-DE"/>
+          </a:p>
+        </p:txBody>
+      </p:sp>
+      <p:sp>
+        <p:nvSpPr>
+          <p:cNvPr id="49" name="Rechteck 48"/>
+          <p:cNvSpPr/>
+          <p:nvPr/>
+        </p:nvSpPr>
+        <p:spPr>
+          <a:xfrm>
+            <a:off x="3159920" y="4146632"/>
+            <a:ext cx="1088044" cy="362488"/>
+          </a:xfrm>
+          <a:prstGeom prst="rect">
+            <a:avLst/>
+          </a:prstGeom>
+          <a:noFill/>
+          <a:ln w="38100">
+            <a:solidFill>
+              <a:schemeClr val="tx1"/>
+            </a:solidFill>
+          </a:ln>
+        </p:spPr>
+        <p:style>
+          <a:lnRef idx="2">
+            <a:schemeClr val="accent1">
+              <a:shade val="50000"/>
+            </a:schemeClr>
+          </a:lnRef>
+          <a:fillRef idx="1">
+            <a:schemeClr val="accent1"/>
+          </a:fillRef>
+          <a:effectRef idx="0">
+            <a:schemeClr val="accent1"/>
+          </a:effectRef>
+          <a:fontRef idx="minor">
+            <a:schemeClr val="lt1"/>
+          </a:fontRef>
+        </p:style>
+        <p:txBody>
+          <a:bodyPr rtlCol="0" anchor="ctr"/>
+          <a:lstStyle/>
+          <a:p>
+            <a:pPr algn="ctr"/>
+            <a:endParaRPr lang="de-DE"/>
+          </a:p>
+        </p:txBody>
+      </p:sp>
+      <p:sp>
+        <p:nvSpPr>
+          <p:cNvPr id="48" name="Rechteck 47"/>
+          <p:cNvSpPr/>
+          <p:nvPr/>
+        </p:nvSpPr>
+        <p:spPr>
+          <a:xfrm>
+            <a:off x="2591780" y="4113076"/>
+            <a:ext cx="1094668" cy="362634"/>
+          </a:xfrm>
+          <a:prstGeom prst="rect">
+            <a:avLst/>
+          </a:prstGeom>
+          <a:noFill/>
+          <a:ln w="38100">
+            <a:solidFill>
+              <a:srgbClr val="0070C0"/>
+            </a:solidFill>
+          </a:ln>
+        </p:spPr>
+        <p:style>
+          <a:lnRef idx="2">
+            <a:schemeClr val="accent1">
+              <a:shade val="50000"/>
+            </a:schemeClr>
+          </a:lnRef>
+          <a:fillRef idx="1">
+            <a:schemeClr val="accent1"/>
+          </a:fillRef>
+          <a:effectRef idx="0">
+            <a:schemeClr val="accent1"/>
+          </a:effectRef>
+          <a:fontRef idx="minor">
+            <a:schemeClr val="lt1"/>
+          </a:fontRef>
+        </p:style>
+        <p:txBody>
+          <a:bodyPr rtlCol="0" anchor="ctr"/>
+          <a:lstStyle/>
+          <a:p>
+            <a:pPr algn="ctr"/>
+            <a:endParaRPr lang="de-DE"/>
+          </a:p>
+        </p:txBody>
+      </p:sp>
+      <p:sp>
+        <p:nvSpPr>
+          <p:cNvPr id="47" name="Rechteck 46"/>
+          <p:cNvSpPr/>
+          <p:nvPr/>
+        </p:nvSpPr>
+        <p:spPr>
+          <a:xfrm>
+            <a:off x="2592388" y="4076688"/>
+            <a:ext cx="1655762" cy="468436"/>
+          </a:xfrm>
+          <a:prstGeom prst="rect">
+            <a:avLst/>
+          </a:prstGeom>
+          <a:noFill/>
+          <a:ln w="19050">
+            <a:solidFill>
+              <a:srgbClr val="FF0000"/>
+            </a:solidFill>
+          </a:ln>
+        </p:spPr>
+        <p:style>
+          <a:lnRef idx="2">
+            <a:schemeClr val="accent1">
+              <a:shade val="50000"/>
+            </a:schemeClr>
+          </a:lnRef>
+          <a:fillRef idx="1">
+            <a:schemeClr val="accent1"/>
+          </a:fillRef>
+          <a:effectRef idx="0">
+            <a:schemeClr val="accent1"/>
+          </a:effectRef>
+          <a:fontRef idx="minor">
+            <a:schemeClr val="lt1"/>
+          </a:fontRef>
+        </p:style>
+        <p:txBody>
+          <a:bodyPr rtlCol="0" anchor="ctr"/>
+          <a:lstStyle/>
+          <a:p>
+            <a:pPr algn="ctr"/>
+            <a:endParaRPr lang="de-DE"/>
+          </a:p>
+        </p:txBody>
+      </p:sp>
+      <p:sp>
+        <p:nvSpPr>
+          <p:cNvPr id="25" name="Rechteck 24"/>
+          <p:cNvSpPr/>
+          <p:nvPr/>
+        </p:nvSpPr>
+        <p:spPr>
+          <a:xfrm>
+            <a:off x="2335988" y="2860412"/>
+            <a:ext cx="1948120" cy="468436"/>
+          </a:xfrm>
+          <a:prstGeom prst="rect">
+            <a:avLst/>
+          </a:prstGeom>
+          <a:noFill/>
+          <a:ln w="19050">
+            <a:solidFill>
+              <a:srgbClr val="FF0000"/>
+            </a:solidFill>
+          </a:ln>
+        </p:spPr>
+        <p:style>
+          <a:lnRef idx="2">
+            <a:schemeClr val="accent1">
+              <a:shade val="50000"/>
+            </a:schemeClr>
+          </a:lnRef>
+          <a:fillRef idx="1">
+            <a:schemeClr val="accent1"/>
+          </a:fillRef>
+          <a:effectRef idx="0">
+            <a:schemeClr val="accent1"/>
+          </a:effectRef>
+          <a:fontRef idx="minor">
+            <a:schemeClr val="lt1"/>
+          </a:fontRef>
+        </p:style>
+        <p:txBody>
+          <a:bodyPr rtlCol="0" anchor="ctr"/>
+          <a:lstStyle/>
+          <a:p>
+            <a:pPr algn="ctr"/>
+            <a:endParaRPr lang="de-DE"/>
+          </a:p>
+        </p:txBody>
+      </p:sp>
+      <p:sp>
+        <p:nvSpPr>
+          <p:cNvPr id="50" name="Textfeld 49"/>
+          <p:cNvSpPr txBox="1"/>
+          <p:nvPr/>
+        </p:nvSpPr>
+        <p:spPr>
+          <a:xfrm rot="5400000">
+            <a:off x="3193782" y="3391177"/>
+            <a:ext cx="396262" cy="400110"/>
+          </a:xfrm>
+          <a:prstGeom prst="rect">
+            <a:avLst/>
+          </a:prstGeom>
+          <a:noFill/>
+        </p:spPr>
+        <p:txBody>
+          <a:bodyPr wrap="none" rtlCol="0">
+            <a:spAutoFit/>
+          </a:bodyPr>
+          <a:lstStyle/>
+          <a:p>
+            <a:r>
+              <a:rPr lang="de-DE" sz="2000" dirty="0" smtClean="0">
+                <a:latin typeface="Arial" panose="020B0604020202020204" pitchFamily="34" charset="0"/>
+                <a:cs typeface="Arial" panose="020B0604020202020204" pitchFamily="34" charset="0"/>
+              </a:rPr>
+              <a:t>...</a:t>
+            </a:r>
+            <a:endParaRPr lang="de-DE" sz="2000" dirty="0" smtClean="0">
+              <a:latin typeface="Arial" panose="020B0604020202020204" pitchFamily="34" charset="0"/>
+              <a:cs typeface="Arial" panose="020B0604020202020204" pitchFamily="34" charset="0"/>
+            </a:endParaRPr>
+          </a:p>
+        </p:txBody>
+      </p:sp>
+      <p:sp>
+        <p:nvSpPr>
+          <p:cNvPr id="51" name="Textfeld 50"/>
+          <p:cNvSpPr txBox="1"/>
+          <p:nvPr/>
+        </p:nvSpPr>
+        <p:spPr>
+          <a:xfrm rot="5400000">
+            <a:off x="3201706" y="4650994"/>
+            <a:ext cx="396262" cy="400110"/>
+          </a:xfrm>
+          <a:prstGeom prst="rect">
+            <a:avLst/>
+          </a:prstGeom>
+          <a:noFill/>
+        </p:spPr>
+        <p:txBody>
+          <a:bodyPr wrap="none" rtlCol="0">
+            <a:spAutoFit/>
+          </a:bodyPr>
+          <a:lstStyle/>
+          <a:p>
+            <a:r>
+              <a:rPr lang="de-DE" sz="2000" dirty="0" smtClean="0">
+                <a:latin typeface="Arial" panose="020B0604020202020204" pitchFamily="34" charset="0"/>
+                <a:cs typeface="Arial" panose="020B0604020202020204" pitchFamily="34" charset="0"/>
+              </a:rPr>
+              <a:t>...</a:t>
+            </a:r>
+            <a:endParaRPr lang="de-DE" sz="2000" dirty="0" smtClean="0">
+              <a:latin typeface="Arial" panose="020B0604020202020204" pitchFamily="34" charset="0"/>
+              <a:cs typeface="Arial" panose="020B0604020202020204" pitchFamily="34" charset="0"/>
+            </a:endParaRPr>
+          </a:p>
+        </p:txBody>
+      </p:sp>
+      <p:cxnSp>
+        <p:nvCxnSpPr>
+          <p:cNvPr id="52" name="Gerade Verbindung mit Pfeil 51"/>
+          <p:cNvCxnSpPr/>
+          <p:nvPr/>
+        </p:nvCxnSpPr>
+        <p:spPr>
+          <a:xfrm flipH="1">
+            <a:off x="1835696" y="5481228"/>
+            <a:ext cx="540000" cy="0"/>
+          </a:xfrm>
+          <a:prstGeom prst="straightConnector1">
+            <a:avLst/>
+          </a:prstGeom>
+          <a:ln w="19050">
+            <a:solidFill>
+              <a:srgbClr val="0070C0"/>
+            </a:solidFill>
+            <a:headEnd type="none" w="med" len="med"/>
+            <a:tailEnd type="triangle" w="med" len="med"/>
+          </a:ln>
+        </p:spPr>
+        <p:style>
+          <a:lnRef idx="1">
+            <a:schemeClr val="accent1"/>
+          </a:lnRef>
+          <a:fillRef idx="0">
+            <a:schemeClr val="accent1"/>
+          </a:fillRef>
+          <a:effectRef idx="0">
+            <a:schemeClr val="accent1"/>
+          </a:effectRef>
+          <a:fontRef idx="minor">
+            <a:schemeClr val="tx1"/>
+          </a:fontRef>
+        </p:style>
+      </p:cxnSp>
+      <p:cxnSp>
+        <p:nvCxnSpPr>
+          <p:cNvPr id="53" name="Gerade Verbindung mit Pfeil 52"/>
+          <p:cNvCxnSpPr/>
+          <p:nvPr/>
+        </p:nvCxnSpPr>
+        <p:spPr>
+          <a:xfrm>
+            <a:off x="4248024" y="5517232"/>
+            <a:ext cx="540000" cy="0"/>
+          </a:xfrm>
+          <a:prstGeom prst="straightConnector1">
+            <a:avLst/>
+          </a:prstGeom>
+          <a:ln w="19050">
+            <a:solidFill>
+              <a:schemeClr val="tx1"/>
+            </a:solidFill>
+            <a:headEnd type="none" w="med" len="med"/>
+            <a:tailEnd type="triangle" w="med" len="med"/>
+          </a:ln>
+        </p:spPr>
+        <p:style>
+          <a:lnRef idx="1">
+            <a:schemeClr val="accent1"/>
+          </a:lnRef>
+          <a:fillRef idx="0">
+            <a:schemeClr val="accent1"/>
+          </a:fillRef>
+          <a:effectRef idx="0">
+            <a:schemeClr val="accent1"/>
+          </a:effectRef>
+          <a:fontRef idx="minor">
+            <a:schemeClr val="tx1"/>
+          </a:fontRef>
+        </p:style>
+      </p:cxnSp>
+      <p:sp>
+        <p:nvSpPr>
+          <p:cNvPr id="54" name="Rechteck 53"/>
+          <p:cNvSpPr/>
+          <p:nvPr/>
+        </p:nvSpPr>
+        <p:spPr>
+          <a:xfrm>
+            <a:off x="1763688" y="4076688"/>
+            <a:ext cx="3118188" cy="468436"/>
+          </a:xfrm>
+          <a:prstGeom prst="rect">
+            <a:avLst/>
+          </a:prstGeom>
+          <a:noFill/>
+          <a:ln w="19050">
+            <a:solidFill>
+              <a:schemeClr val="accent3">
+                <a:lumMod val="75000"/>
+              </a:schemeClr>
+            </a:solidFill>
+            <a:prstDash val="dash"/>
+          </a:ln>
+        </p:spPr>
+        <p:style>
+          <a:lnRef idx="2">
+            <a:schemeClr val="accent1">
+              <a:shade val="50000"/>
+            </a:schemeClr>
+          </a:lnRef>
+          <a:fillRef idx="1">
+            <a:schemeClr val="accent1"/>
+          </a:fillRef>
+          <a:effectRef idx="0">
+            <a:schemeClr val="accent1"/>
+          </a:effectRef>
+          <a:fontRef idx="minor">
+            <a:schemeClr val="lt1"/>
+          </a:fontRef>
+        </p:style>
+        <p:txBody>
+          <a:bodyPr rtlCol="0" anchor="ctr"/>
+          <a:lstStyle/>
+          <a:p>
+            <a:pPr algn="ctr"/>
+            <a:endParaRPr lang="de-DE"/>
+          </a:p>
+        </p:txBody>
+      </p:sp>
+      <p:sp>
+        <p:nvSpPr>
+          <p:cNvPr id="55" name="Textfeld 54"/>
+          <p:cNvSpPr txBox="1"/>
+          <p:nvPr/>
+        </p:nvSpPr>
+        <p:spPr>
+          <a:xfrm>
+            <a:off x="5112060" y="2926685"/>
+            <a:ext cx="3204356" cy="276999"/>
+          </a:xfrm>
+          <a:prstGeom prst="rect">
+            <a:avLst/>
+          </a:prstGeom>
+          <a:noFill/>
+        </p:spPr>
+        <p:txBody>
+          <a:bodyPr wrap="square" rtlCol="0">
+            <a:spAutoFit/>
+          </a:bodyPr>
+          <a:lstStyle/>
+          <a:p>
+            <a:pPr>
+              <a:tabLst>
+                <a:tab pos="2330450" algn="l"/>
+              </a:tabLst>
+            </a:pPr>
+            <a:r>
+              <a:rPr lang="de-DE" sz="1200" dirty="0" err="1" smtClean="0">
+                <a:latin typeface="Arial" panose="020B0604020202020204" pitchFamily="34" charset="0"/>
+                <a:cs typeface="Arial" panose="020B0604020202020204" pitchFamily="34" charset="0"/>
+              </a:rPr>
+              <a:t>reduce</a:t>
+            </a:r>
+            <a:r>
+              <a:rPr lang="de-DE" sz="1200" dirty="0" smtClean="0">
+                <a:latin typeface="Arial" panose="020B0604020202020204" pitchFamily="34" charset="0"/>
+                <a:cs typeface="Arial" panose="020B0604020202020204" pitchFamily="34" charset="0"/>
+              </a:rPr>
+              <a:t> </a:t>
+            </a:r>
+            <a:r>
+              <a:rPr lang="de-DE" sz="1200" dirty="0" err="1" smtClean="0">
+                <a:latin typeface="Arial" panose="020B0604020202020204" pitchFamily="34" charset="0"/>
+                <a:cs typeface="Arial" panose="020B0604020202020204" pitchFamily="34" charset="0"/>
+              </a:rPr>
+              <a:t>track</a:t>
+            </a:r>
+            <a:r>
+              <a:rPr lang="de-DE" sz="1200" dirty="0" smtClean="0">
+                <a:latin typeface="Arial" panose="020B0604020202020204" pitchFamily="34" charset="0"/>
+                <a:cs typeface="Arial" panose="020B0604020202020204" pitchFamily="34" charset="0"/>
+              </a:rPr>
+              <a:t> </a:t>
+            </a:r>
+            <a:r>
+              <a:rPr lang="de-DE" sz="1200" dirty="0" err="1" smtClean="0">
+                <a:latin typeface="Arial" panose="020B0604020202020204" pitchFamily="34" charset="0"/>
+                <a:cs typeface="Arial" panose="020B0604020202020204" pitchFamily="34" charset="0"/>
+              </a:rPr>
+              <a:t>velocity</a:t>
+            </a:r>
+            <a:r>
+              <a:rPr lang="de-DE" sz="1200" dirty="0" smtClean="0">
+                <a:latin typeface="Arial" panose="020B0604020202020204" pitchFamily="34" charset="0"/>
+                <a:cs typeface="Arial" panose="020B0604020202020204" pitchFamily="34" charset="0"/>
+              </a:rPr>
+              <a:t>: 10 </a:t>
+            </a:r>
+            <a:r>
+              <a:rPr lang="de-DE" sz="1200" dirty="0" smtClean="0">
+                <a:latin typeface="Arial" panose="020B0604020202020204" pitchFamily="34" charset="0"/>
+                <a:cs typeface="Arial" panose="020B0604020202020204" pitchFamily="34" charset="0"/>
+                <a:sym typeface="Wingdings" panose="05000000000000000000" pitchFamily="2" charset="2"/>
+              </a:rPr>
+              <a:t> 5</a:t>
+            </a:r>
+            <a:r>
+              <a:rPr lang="de-DE" sz="1200" dirty="0" smtClean="0">
+                <a:latin typeface="Arial" panose="020B0604020202020204" pitchFamily="34" charset="0"/>
+                <a:cs typeface="Arial" panose="020B0604020202020204" pitchFamily="34" charset="0"/>
+              </a:rPr>
+              <a:t>	</a:t>
+            </a:r>
+            <a:endParaRPr lang="de-DE" sz="1200" dirty="0" smtClean="0">
+              <a:latin typeface="Arial" panose="020B0604020202020204" pitchFamily="34" charset="0"/>
+              <a:cs typeface="Arial" panose="020B0604020202020204" pitchFamily="34" charset="0"/>
+            </a:endParaRPr>
+          </a:p>
+        </p:txBody>
+      </p:sp>
+    </p:spTree>
+    <p:extLst>
+      <p:ext uri="{BB962C8B-B14F-4D97-AF65-F5344CB8AC3E}">
+        <p14:creationId xmlns:p14="http://schemas.microsoft.com/office/powerpoint/2010/main" val="3565234657"/>
+      </p:ext>
+    </p:extLst>
+  </p:cSld>
+  <p:clrMapOvr>
+    <a:masterClrMapping/>
+  </p:clrMapOvr>
+  <p:timing>
+    <p:tnLst>
+      <p:par>
+        <p:cTn id="1" dur="indefinite" restart="never" nodeType="tmRoot"/>
+      </p:par>
+    </p:tnLst>
+  </p:timing>
+</p:sld>
+</file>
+
+<file path=ppt/slides/slide4.xml><?xml version="1.0" encoding="utf-8"?>
+<p:sld xmlns:a="http://schemas.openxmlformats.org/drawingml/2006/main" xmlns:r="http://schemas.openxmlformats.org/officeDocument/2006/relationships" xmlns:p="http://schemas.openxmlformats.org/presentationml/2006/main">
+  <p:cSld>
+    <p:spTree>
+      <p:nvGrpSpPr>
+        <p:cNvPr id="1" name=""/>
+        <p:cNvGrpSpPr/>
+        <p:nvPr/>
+      </p:nvGrpSpPr>
+      <p:grpSpPr>
+        <a:xfrm>
+          <a:off x="0" y="0"/>
+          <a:ext cx="0" cy="0"/>
+          <a:chOff x="0" y="0"/>
+          <a:chExt cx="0" cy="0"/>
+        </a:xfrm>
+      </p:grpSpPr>
+      <p:sp>
+        <p:nvSpPr>
+          <p:cNvPr id="2" name="Titel 1"/>
+          <p:cNvSpPr>
+            <a:spLocks noGrp="1"/>
+          </p:cNvSpPr>
+          <p:nvPr>
+            <p:ph type="title"/>
+          </p:nvPr>
+        </p:nvSpPr>
+        <p:spPr/>
+        <p:txBody>
+          <a:bodyPr/>
+          <a:lstStyle/>
+          <a:p>
+            <a:r>
+              <a:rPr lang="de-DE" dirty="0" err="1" smtClean="0"/>
+              <a:t>updateTracksIntersect</a:t>
+            </a:r>
+            <a:r>
+              <a:rPr lang="de-DE" dirty="0" smtClean="0"/>
+              <a:t>: </a:t>
+            </a:r>
+            <a:r>
+              <a:rPr lang="de-DE" dirty="0" err="1" smtClean="0"/>
+              <a:t>test</a:t>
+            </a:r>
+            <a:r>
+              <a:rPr lang="de-DE" dirty="0" smtClean="0"/>
+              <a:t> </a:t>
+            </a:r>
+            <a:r>
+              <a:rPr lang="de-DE" dirty="0" err="1" smtClean="0"/>
+              <a:t>cases</a:t>
+            </a:r>
+            <a:endParaRPr lang="de-DE" dirty="0"/>
+          </a:p>
+        </p:txBody>
+      </p:sp>
+      <p:cxnSp>
+        <p:nvCxnSpPr>
+          <p:cNvPr id="3" name="Gerade Verbindung mit Pfeil 2"/>
+          <p:cNvCxnSpPr/>
+          <p:nvPr/>
+        </p:nvCxnSpPr>
+        <p:spPr>
+          <a:xfrm>
+            <a:off x="3527944" y="2024844"/>
+            <a:ext cx="540000" cy="0"/>
+          </a:xfrm>
+          <a:prstGeom prst="straightConnector1">
+            <a:avLst/>
+          </a:prstGeom>
+          <a:ln w="19050">
+            <a:solidFill>
+              <a:schemeClr val="tx1"/>
+            </a:solidFill>
+            <a:headEnd type="none" w="med" len="med"/>
+            <a:tailEnd type="triangle" w="med" len="med"/>
+          </a:ln>
+        </p:spPr>
+        <p:style>
+          <a:lnRef idx="1">
+            <a:schemeClr val="accent1"/>
+          </a:lnRef>
+          <a:fillRef idx="0">
+            <a:schemeClr val="accent1"/>
+          </a:fillRef>
+          <a:effectRef idx="0">
+            <a:schemeClr val="accent1"/>
+          </a:effectRef>
+          <a:fontRef idx="minor">
+            <a:schemeClr val="tx1"/>
+          </a:fontRef>
+        </p:style>
+      </p:cxnSp>
+      <p:cxnSp>
+        <p:nvCxnSpPr>
+          <p:cNvPr id="4" name="Gerade Verbindung mit Pfeil 3"/>
+          <p:cNvCxnSpPr/>
+          <p:nvPr/>
+        </p:nvCxnSpPr>
+        <p:spPr>
+          <a:xfrm flipH="1">
+            <a:off x="7394404" y="1980980"/>
+            <a:ext cx="540000" cy="0"/>
+          </a:xfrm>
+          <a:prstGeom prst="straightConnector1">
+            <a:avLst/>
+          </a:prstGeom>
+          <a:ln w="19050">
+            <a:solidFill>
+              <a:srgbClr val="0070C0"/>
+            </a:solidFill>
+            <a:headEnd type="none" w="med" len="med"/>
+            <a:tailEnd type="triangle" w="med" len="med"/>
+          </a:ln>
+        </p:spPr>
+        <p:style>
+          <a:lnRef idx="1">
+            <a:schemeClr val="accent1"/>
+          </a:lnRef>
+          <a:fillRef idx="0">
+            <a:schemeClr val="accent1"/>
+          </a:fillRef>
+          <a:effectRef idx="0">
+            <a:schemeClr val="accent1"/>
+          </a:effectRef>
+          <a:fontRef idx="minor">
+            <a:schemeClr val="tx1"/>
+          </a:fontRef>
+        </p:style>
+      </p:cxnSp>
+      <p:sp>
+        <p:nvSpPr>
+          <p:cNvPr id="5" name="Textfeld 4"/>
+          <p:cNvSpPr txBox="1"/>
+          <p:nvPr/>
+        </p:nvSpPr>
+        <p:spPr>
+          <a:xfrm>
+            <a:off x="3704836" y="1747845"/>
+            <a:ext cx="651140" cy="276999"/>
+          </a:xfrm>
+          <a:prstGeom prst="rect">
+            <a:avLst/>
+          </a:prstGeom>
+          <a:noFill/>
+        </p:spPr>
+        <p:txBody>
+          <a:bodyPr wrap="none" rtlCol="0">
+            <a:spAutoFit/>
+          </a:bodyPr>
+          <a:lstStyle/>
+          <a:p>
+            <a:r>
+              <a:rPr lang="de-DE" sz="1200" i="1" dirty="0" err="1" smtClean="0">
+                <a:latin typeface="Times New Roman" panose="02020603050405020304" pitchFamily="18" charset="0"/>
+                <a:cs typeface="Times New Roman" panose="02020603050405020304" pitchFamily="18" charset="0"/>
+              </a:rPr>
+              <a:t>v</a:t>
+            </a:r>
+            <a:r>
+              <a:rPr lang="de-DE" sz="1200" i="1" baseline="-25000" dirty="0" err="1" smtClean="0">
+                <a:latin typeface="Times New Roman" panose="02020603050405020304" pitchFamily="18" charset="0"/>
+                <a:cs typeface="Times New Roman" panose="02020603050405020304" pitchFamily="18" charset="0"/>
+              </a:rPr>
+              <a:t>R</a:t>
+            </a:r>
+            <a:r>
+              <a:rPr lang="de-DE" sz="1200" i="1" dirty="0" smtClean="0">
+                <a:latin typeface="Times New Roman" panose="02020603050405020304" pitchFamily="18" charset="0"/>
+                <a:cs typeface="Times New Roman" panose="02020603050405020304" pitchFamily="18" charset="0"/>
+              </a:rPr>
+              <a:t> = </a:t>
+            </a:r>
+            <a:r>
+              <a:rPr lang="de-DE" sz="1200" i="1" dirty="0" smtClean="0">
+                <a:latin typeface="Times New Roman" panose="02020603050405020304" pitchFamily="18" charset="0"/>
+                <a:cs typeface="Times New Roman" panose="02020603050405020304" pitchFamily="18" charset="0"/>
+              </a:rPr>
+              <a:t>10</a:t>
+            </a:r>
+            <a:endParaRPr lang="de-DE" sz="1200" i="1" dirty="0" smtClean="0">
+              <a:latin typeface="Times New Roman" panose="02020603050405020304" pitchFamily="18" charset="0"/>
+              <a:cs typeface="Times New Roman" panose="02020603050405020304" pitchFamily="18" charset="0"/>
+            </a:endParaRPr>
+          </a:p>
+        </p:txBody>
+      </p:sp>
+      <p:sp>
+        <p:nvSpPr>
+          <p:cNvPr id="6" name="Textfeld 5"/>
+          <p:cNvSpPr txBox="1"/>
+          <p:nvPr/>
+        </p:nvSpPr>
+        <p:spPr>
+          <a:xfrm>
+            <a:off x="7092280" y="1711841"/>
+            <a:ext cx="695768" cy="276999"/>
+          </a:xfrm>
+          <a:prstGeom prst="rect">
+            <a:avLst/>
+          </a:prstGeom>
+          <a:noFill/>
+        </p:spPr>
+        <p:txBody>
+          <a:bodyPr wrap="none" rtlCol="0">
+            <a:spAutoFit/>
+          </a:bodyPr>
+          <a:lstStyle/>
+          <a:p>
+            <a:r>
+              <a:rPr lang="de-DE" sz="1200" i="1" dirty="0" err="1" smtClean="0">
+                <a:solidFill>
+                  <a:srgbClr val="0070C0"/>
+                </a:solidFill>
+                <a:latin typeface="Times New Roman" panose="02020603050405020304" pitchFamily="18" charset="0"/>
+                <a:cs typeface="Times New Roman" panose="02020603050405020304" pitchFamily="18" charset="0"/>
+              </a:rPr>
+              <a:t>v</a:t>
+            </a:r>
+            <a:r>
+              <a:rPr lang="de-DE" sz="1200" i="1" baseline="-25000" dirty="0" err="1" smtClean="0">
+                <a:solidFill>
+                  <a:srgbClr val="0070C0"/>
+                </a:solidFill>
+                <a:latin typeface="Times New Roman" panose="02020603050405020304" pitchFamily="18" charset="0"/>
+                <a:cs typeface="Times New Roman" panose="02020603050405020304" pitchFamily="18" charset="0"/>
+              </a:rPr>
+              <a:t>L</a:t>
+            </a:r>
+            <a:r>
+              <a:rPr lang="de-DE" sz="1200" i="1" dirty="0" smtClean="0">
+                <a:solidFill>
+                  <a:srgbClr val="0070C0"/>
+                </a:solidFill>
+                <a:latin typeface="Times New Roman" panose="02020603050405020304" pitchFamily="18" charset="0"/>
+                <a:cs typeface="Times New Roman" panose="02020603050405020304" pitchFamily="18" charset="0"/>
+              </a:rPr>
+              <a:t> = </a:t>
+            </a:r>
+            <a:r>
+              <a:rPr lang="de-DE" sz="1200" i="1" dirty="0" smtClean="0">
+                <a:solidFill>
+                  <a:srgbClr val="0070C0"/>
+                </a:solidFill>
+                <a:latin typeface="Times New Roman" panose="02020603050405020304" pitchFamily="18" charset="0"/>
+                <a:cs typeface="Times New Roman" panose="02020603050405020304" pitchFamily="18" charset="0"/>
+              </a:rPr>
+              <a:t>-10</a:t>
+            </a:r>
+            <a:endParaRPr lang="de-DE" sz="1200" i="1" dirty="0" smtClean="0">
+              <a:solidFill>
+                <a:srgbClr val="0070C0"/>
+              </a:solidFill>
+              <a:latin typeface="Times New Roman" panose="02020603050405020304" pitchFamily="18" charset="0"/>
+              <a:cs typeface="Times New Roman" panose="02020603050405020304" pitchFamily="18" charset="0"/>
+            </a:endParaRPr>
+          </a:p>
+        </p:txBody>
+      </p:sp>
+      <p:sp>
+        <p:nvSpPr>
+          <p:cNvPr id="9" name="Rechteck 8"/>
+          <p:cNvSpPr/>
+          <p:nvPr/>
+        </p:nvSpPr>
+        <p:spPr>
+          <a:xfrm>
+            <a:off x="7812640" y="1791558"/>
+            <a:ext cx="1079840" cy="362634"/>
+          </a:xfrm>
+          <a:prstGeom prst="rect">
+            <a:avLst/>
+          </a:prstGeom>
+          <a:noFill/>
+          <a:ln w="38100">
+            <a:solidFill>
+              <a:srgbClr val="0070C0"/>
+            </a:solidFill>
+          </a:ln>
+        </p:spPr>
+        <p:style>
+          <a:lnRef idx="2">
+            <a:schemeClr val="accent1">
+              <a:shade val="50000"/>
+            </a:schemeClr>
+          </a:lnRef>
+          <a:fillRef idx="1">
+            <a:schemeClr val="accent1"/>
+          </a:fillRef>
+          <a:effectRef idx="0">
+            <a:schemeClr val="accent1"/>
+          </a:effectRef>
+          <a:fontRef idx="minor">
+            <a:schemeClr val="lt1"/>
+          </a:fontRef>
+        </p:style>
+        <p:txBody>
+          <a:bodyPr rtlCol="0" anchor="ctr"/>
+          <a:lstStyle/>
+          <a:p>
+            <a:pPr algn="ctr"/>
+            <a:endParaRPr lang="de-DE"/>
+          </a:p>
+        </p:txBody>
+      </p:sp>
+      <p:sp>
+        <p:nvSpPr>
+          <p:cNvPr id="13" name="Rechteck 12"/>
+          <p:cNvSpPr/>
+          <p:nvPr/>
+        </p:nvSpPr>
+        <p:spPr>
+          <a:xfrm>
+            <a:off x="4203558" y="2456892"/>
+            <a:ext cx="3118188" cy="540059"/>
+          </a:xfrm>
+          <a:prstGeom prst="rect">
+            <a:avLst/>
+          </a:prstGeom>
+          <a:noFill/>
+          <a:ln w="19050">
+            <a:solidFill>
+              <a:schemeClr val="accent3">
+                <a:lumMod val="75000"/>
+              </a:schemeClr>
+            </a:solidFill>
+            <a:prstDash val="dash"/>
+          </a:ln>
+        </p:spPr>
+        <p:style>
+          <a:lnRef idx="2">
+            <a:schemeClr val="accent1">
+              <a:shade val="50000"/>
+            </a:schemeClr>
+          </a:lnRef>
+          <a:fillRef idx="1">
+            <a:schemeClr val="accent1"/>
+          </a:fillRef>
+          <a:effectRef idx="0">
+            <a:schemeClr val="accent1"/>
+          </a:effectRef>
+          <a:fontRef idx="minor">
+            <a:schemeClr val="lt1"/>
+          </a:fontRef>
+        </p:style>
+        <p:txBody>
+          <a:bodyPr rtlCol="0" anchor="ctr"/>
+          <a:lstStyle/>
+          <a:p>
+            <a:pPr algn="ctr"/>
+            <a:endParaRPr lang="de-DE"/>
+          </a:p>
+        </p:txBody>
+      </p:sp>
+      <p:sp>
+        <p:nvSpPr>
+          <p:cNvPr id="14" name="Textfeld 13"/>
+          <p:cNvSpPr txBox="1"/>
+          <p:nvPr/>
+        </p:nvSpPr>
+        <p:spPr>
+          <a:xfrm>
+            <a:off x="971549" y="1959136"/>
+            <a:ext cx="1069524" cy="276999"/>
+          </a:xfrm>
+          <a:prstGeom prst="rect">
+            <a:avLst/>
+          </a:prstGeom>
+          <a:noFill/>
+        </p:spPr>
+        <p:txBody>
+          <a:bodyPr wrap="square" rtlCol="0">
+            <a:spAutoFit/>
+          </a:bodyPr>
+          <a:lstStyle/>
+          <a:p>
+            <a:r>
+              <a:rPr lang="de-DE" sz="1200" dirty="0" err="1" smtClean="0">
+                <a:latin typeface="Arial" panose="020B0604020202020204" pitchFamily="34" charset="0"/>
+                <a:cs typeface="Arial" panose="020B0604020202020204" pitchFamily="34" charset="0"/>
+              </a:rPr>
+              <a:t>assign</a:t>
+            </a:r>
+            <a:r>
+              <a:rPr lang="de-DE" sz="1200" dirty="0" smtClean="0">
+                <a:latin typeface="Arial" panose="020B0604020202020204" pitchFamily="34" charset="0"/>
+                <a:cs typeface="Arial" panose="020B0604020202020204" pitchFamily="34" charset="0"/>
+              </a:rPr>
+              <a:t> </a:t>
+            </a:r>
+            <a:r>
+              <a:rPr lang="de-DE" sz="1200" dirty="0" err="1" smtClean="0">
+                <a:latin typeface="Arial" panose="020B0604020202020204" pitchFamily="34" charset="0"/>
+                <a:cs typeface="Arial" panose="020B0604020202020204" pitchFamily="34" charset="0"/>
+              </a:rPr>
+              <a:t>blobs</a:t>
+            </a:r>
+            <a:endParaRPr lang="de-DE" sz="1200" dirty="0" smtClean="0">
+              <a:latin typeface="Arial" panose="020B0604020202020204" pitchFamily="34" charset="0"/>
+              <a:cs typeface="Arial" panose="020B0604020202020204" pitchFamily="34" charset="0"/>
+            </a:endParaRPr>
+          </a:p>
+        </p:txBody>
+      </p:sp>
+      <p:cxnSp>
+        <p:nvCxnSpPr>
+          <p:cNvPr id="18" name="Gerade Verbindung 17"/>
+          <p:cNvCxnSpPr/>
+          <p:nvPr/>
+        </p:nvCxnSpPr>
+        <p:spPr>
+          <a:xfrm>
+            <a:off x="8172450" y="1545760"/>
+            <a:ext cx="0" cy="4619544"/>
+          </a:xfrm>
+          <a:prstGeom prst="line">
+            <a:avLst/>
+          </a:prstGeom>
+          <a:ln w="19050">
+            <a:solidFill>
+              <a:schemeClr val="tx1"/>
+            </a:solidFill>
+            <a:headEnd type="none" w="med" len="med"/>
+            <a:tailEnd type="none" w="med" len="med"/>
+          </a:ln>
+        </p:spPr>
+        <p:style>
+          <a:lnRef idx="1">
+            <a:schemeClr val="accent1"/>
+          </a:lnRef>
+          <a:fillRef idx="0">
+            <a:schemeClr val="accent1"/>
+          </a:fillRef>
+          <a:effectRef idx="0">
+            <a:schemeClr val="accent1"/>
+          </a:effectRef>
+          <a:fontRef idx="minor">
+            <a:schemeClr val="tx1"/>
+          </a:fontRef>
+        </p:style>
+      </p:cxnSp>
+      <p:sp>
+        <p:nvSpPr>
+          <p:cNvPr id="20" name="Textfeld 19"/>
+          <p:cNvSpPr txBox="1"/>
+          <p:nvPr/>
+        </p:nvSpPr>
+        <p:spPr>
+          <a:xfrm>
+            <a:off x="7920372" y="1029136"/>
+            <a:ext cx="968535" cy="461665"/>
+          </a:xfrm>
+          <a:prstGeom prst="rect">
+            <a:avLst/>
+          </a:prstGeom>
+          <a:noFill/>
+        </p:spPr>
+        <p:txBody>
+          <a:bodyPr wrap="none" rtlCol="0">
+            <a:spAutoFit/>
+          </a:bodyPr>
+          <a:lstStyle/>
+          <a:p>
+            <a:r>
+              <a:rPr lang="de-DE" sz="1200" dirty="0" smtClean="0">
+                <a:latin typeface="Arial" panose="020B0604020202020204" pitchFamily="34" charset="0"/>
+                <a:cs typeface="Arial" panose="020B0604020202020204" pitchFamily="34" charset="0"/>
+              </a:rPr>
+              <a:t>ROI</a:t>
+            </a:r>
+          </a:p>
+          <a:p>
+            <a:r>
+              <a:rPr lang="de-DE" sz="1200" dirty="0" err="1" smtClean="0">
+                <a:latin typeface="Arial" panose="020B0604020202020204" pitchFamily="34" charset="0"/>
+                <a:cs typeface="Arial" panose="020B0604020202020204" pitchFamily="34" charset="0"/>
+              </a:rPr>
+              <a:t>right</a:t>
+            </a:r>
+            <a:r>
+              <a:rPr lang="de-DE" sz="1200" dirty="0" smtClean="0">
+                <a:latin typeface="Arial" panose="020B0604020202020204" pitchFamily="34" charset="0"/>
+                <a:cs typeface="Arial" panose="020B0604020202020204" pitchFamily="34" charset="0"/>
+              </a:rPr>
+              <a:t> </a:t>
+            </a:r>
+            <a:r>
+              <a:rPr lang="de-DE" sz="1200" dirty="0" err="1" smtClean="0">
+                <a:latin typeface="Arial" panose="020B0604020202020204" pitchFamily="34" charset="0"/>
+                <a:cs typeface="Arial" panose="020B0604020202020204" pitchFamily="34" charset="0"/>
+              </a:rPr>
+              <a:t>border</a:t>
+            </a:r>
+            <a:endParaRPr lang="de-DE" sz="1200" dirty="0" smtClean="0">
+              <a:latin typeface="Arial" panose="020B0604020202020204" pitchFamily="34" charset="0"/>
+              <a:cs typeface="Arial" panose="020B0604020202020204" pitchFamily="34" charset="0"/>
+            </a:endParaRPr>
+          </a:p>
+        </p:txBody>
+      </p:sp>
+      <p:cxnSp>
+        <p:nvCxnSpPr>
+          <p:cNvPr id="21" name="Gerade Verbindung 20"/>
+          <p:cNvCxnSpPr/>
+          <p:nvPr/>
+        </p:nvCxnSpPr>
+        <p:spPr>
+          <a:xfrm>
+            <a:off x="2227718" y="1556792"/>
+            <a:ext cx="0" cy="4619544"/>
+          </a:xfrm>
+          <a:prstGeom prst="line">
+            <a:avLst/>
+          </a:prstGeom>
+          <a:ln w="19050">
+            <a:solidFill>
+              <a:schemeClr val="tx1"/>
+            </a:solidFill>
+            <a:headEnd type="none" w="med" len="med"/>
+            <a:tailEnd type="none" w="med" len="med"/>
+          </a:ln>
+        </p:spPr>
+        <p:style>
+          <a:lnRef idx="1">
+            <a:schemeClr val="accent1"/>
+          </a:lnRef>
+          <a:fillRef idx="0">
+            <a:schemeClr val="accent1"/>
+          </a:fillRef>
+          <a:effectRef idx="0">
+            <a:schemeClr val="accent1"/>
+          </a:effectRef>
+          <a:fontRef idx="minor">
+            <a:schemeClr val="tx1"/>
+          </a:fontRef>
+        </p:style>
+      </p:cxnSp>
+      <p:sp>
+        <p:nvSpPr>
+          <p:cNvPr id="22" name="Textfeld 21"/>
+          <p:cNvSpPr txBox="1"/>
+          <p:nvPr/>
+        </p:nvSpPr>
+        <p:spPr>
+          <a:xfrm>
+            <a:off x="1500195" y="1029136"/>
+            <a:ext cx="875561" cy="461665"/>
+          </a:xfrm>
+          <a:prstGeom prst="rect">
+            <a:avLst/>
+          </a:prstGeom>
+          <a:noFill/>
+        </p:spPr>
+        <p:txBody>
+          <a:bodyPr wrap="none" rtlCol="0">
+            <a:spAutoFit/>
+          </a:bodyPr>
+          <a:lstStyle/>
+          <a:p>
+            <a:pPr algn="r"/>
+            <a:r>
+              <a:rPr lang="de-DE" sz="1200" dirty="0" smtClean="0">
+                <a:latin typeface="Arial" panose="020B0604020202020204" pitchFamily="34" charset="0"/>
+                <a:cs typeface="Arial" panose="020B0604020202020204" pitchFamily="34" charset="0"/>
+              </a:rPr>
+              <a:t>ROI</a:t>
+            </a:r>
+          </a:p>
+          <a:p>
+            <a:pPr algn="r"/>
+            <a:r>
+              <a:rPr lang="de-DE" sz="1200" dirty="0" err="1" smtClean="0">
+                <a:latin typeface="Arial" panose="020B0604020202020204" pitchFamily="34" charset="0"/>
+                <a:cs typeface="Arial" panose="020B0604020202020204" pitchFamily="34" charset="0"/>
+              </a:rPr>
+              <a:t>left</a:t>
+            </a:r>
+            <a:r>
+              <a:rPr lang="de-DE" sz="1200" dirty="0" smtClean="0">
+                <a:latin typeface="Arial" panose="020B0604020202020204" pitchFamily="34" charset="0"/>
+                <a:cs typeface="Arial" panose="020B0604020202020204" pitchFamily="34" charset="0"/>
+              </a:rPr>
+              <a:t> </a:t>
+            </a:r>
+            <a:r>
+              <a:rPr lang="de-DE" sz="1200" dirty="0" err="1" smtClean="0">
+                <a:latin typeface="Arial" panose="020B0604020202020204" pitchFamily="34" charset="0"/>
+                <a:cs typeface="Arial" panose="020B0604020202020204" pitchFamily="34" charset="0"/>
+              </a:rPr>
+              <a:t>border</a:t>
+            </a:r>
+            <a:endParaRPr lang="de-DE" sz="1200" dirty="0" smtClean="0">
+              <a:latin typeface="Arial" panose="020B0604020202020204" pitchFamily="34" charset="0"/>
+              <a:cs typeface="Arial" panose="020B0604020202020204" pitchFamily="34" charset="0"/>
+            </a:endParaRPr>
+          </a:p>
+        </p:txBody>
+      </p:sp>
+      <p:sp>
+        <p:nvSpPr>
+          <p:cNvPr id="23" name="Rechteck 22"/>
+          <p:cNvSpPr/>
+          <p:nvPr/>
+        </p:nvSpPr>
+        <p:spPr>
+          <a:xfrm>
+            <a:off x="4220480" y="2565108"/>
+            <a:ext cx="1071880" cy="359836"/>
+          </a:xfrm>
+          <a:prstGeom prst="rect">
+            <a:avLst/>
+          </a:prstGeom>
+          <a:noFill/>
+          <a:ln w="38100">
+            <a:solidFill>
+              <a:schemeClr val="tx1"/>
+            </a:solidFill>
+          </a:ln>
+        </p:spPr>
+        <p:style>
+          <a:lnRef idx="2">
+            <a:schemeClr val="accent1">
+              <a:shade val="50000"/>
+            </a:schemeClr>
+          </a:lnRef>
+          <a:fillRef idx="1">
+            <a:schemeClr val="accent1"/>
+          </a:fillRef>
+          <a:effectRef idx="0">
+            <a:schemeClr val="accent1"/>
+          </a:effectRef>
+          <a:fontRef idx="minor">
+            <a:schemeClr val="lt1"/>
+          </a:fontRef>
+        </p:style>
+        <p:txBody>
+          <a:bodyPr rtlCol="0" anchor="ctr"/>
+          <a:lstStyle/>
+          <a:p>
+            <a:pPr algn="ctr"/>
+            <a:endParaRPr lang="de-DE"/>
+          </a:p>
+        </p:txBody>
+      </p:sp>
+      <p:sp>
+        <p:nvSpPr>
+          <p:cNvPr id="24" name="Rechteck 23"/>
+          <p:cNvSpPr/>
+          <p:nvPr/>
+        </p:nvSpPr>
+        <p:spPr>
+          <a:xfrm>
+            <a:off x="6192740" y="2531174"/>
+            <a:ext cx="1079840" cy="362634"/>
+          </a:xfrm>
+          <a:prstGeom prst="rect">
+            <a:avLst/>
+          </a:prstGeom>
+          <a:noFill/>
+          <a:ln w="38100">
+            <a:solidFill>
+              <a:srgbClr val="0070C0"/>
+            </a:solidFill>
+          </a:ln>
+        </p:spPr>
+        <p:style>
+          <a:lnRef idx="2">
+            <a:schemeClr val="accent1">
+              <a:shade val="50000"/>
+            </a:schemeClr>
+          </a:lnRef>
+          <a:fillRef idx="1">
+            <a:schemeClr val="accent1"/>
+          </a:fillRef>
+          <a:effectRef idx="0">
+            <a:schemeClr val="accent1"/>
+          </a:effectRef>
+          <a:fontRef idx="minor">
+            <a:schemeClr val="lt1"/>
+          </a:fontRef>
+        </p:style>
+        <p:txBody>
+          <a:bodyPr rtlCol="0" anchor="ctr"/>
+          <a:lstStyle/>
+          <a:p>
+            <a:pPr algn="ctr"/>
+            <a:endParaRPr lang="de-DE"/>
+          </a:p>
+        </p:txBody>
+      </p:sp>
+      <p:sp>
+        <p:nvSpPr>
+          <p:cNvPr id="25" name="Rechteck 24"/>
+          <p:cNvSpPr/>
+          <p:nvPr/>
+        </p:nvSpPr>
+        <p:spPr>
+          <a:xfrm>
+            <a:off x="4212240" y="3356992"/>
+            <a:ext cx="3118188" cy="540060"/>
+          </a:xfrm>
+          <a:prstGeom prst="rect">
+            <a:avLst/>
+          </a:prstGeom>
+          <a:noFill/>
+          <a:ln w="19050">
+            <a:solidFill>
+              <a:schemeClr val="accent3">
+                <a:lumMod val="75000"/>
+              </a:schemeClr>
+            </a:solidFill>
+            <a:prstDash val="dash"/>
+          </a:ln>
+        </p:spPr>
+        <p:style>
+          <a:lnRef idx="2">
+            <a:schemeClr val="accent1">
+              <a:shade val="50000"/>
+            </a:schemeClr>
+          </a:lnRef>
+          <a:fillRef idx="1">
+            <a:schemeClr val="accent1"/>
+          </a:fillRef>
+          <a:effectRef idx="0">
+            <a:schemeClr val="accent1"/>
+          </a:effectRef>
+          <a:fontRef idx="minor">
+            <a:schemeClr val="lt1"/>
+          </a:fontRef>
+        </p:style>
+        <p:txBody>
+          <a:bodyPr rtlCol="0" anchor="ctr"/>
+          <a:lstStyle/>
+          <a:p>
+            <a:pPr algn="ctr"/>
+            <a:endParaRPr lang="de-DE"/>
+          </a:p>
+        </p:txBody>
+      </p:sp>
+      <p:sp>
+        <p:nvSpPr>
+          <p:cNvPr id="26" name="Rechteck 25"/>
+          <p:cNvSpPr/>
+          <p:nvPr/>
+        </p:nvSpPr>
+        <p:spPr>
+          <a:xfrm>
+            <a:off x="5660640" y="3465208"/>
+            <a:ext cx="1071880" cy="359836"/>
+          </a:xfrm>
+          <a:prstGeom prst="rect">
+            <a:avLst/>
+          </a:prstGeom>
+          <a:noFill/>
+          <a:ln w="38100">
+            <a:solidFill>
+              <a:schemeClr val="tx1"/>
+            </a:solidFill>
+          </a:ln>
+        </p:spPr>
+        <p:style>
+          <a:lnRef idx="2">
+            <a:schemeClr val="accent1">
+              <a:shade val="50000"/>
+            </a:schemeClr>
+          </a:lnRef>
+          <a:fillRef idx="1">
+            <a:schemeClr val="accent1"/>
+          </a:fillRef>
+          <a:effectRef idx="0">
+            <a:schemeClr val="accent1"/>
+          </a:effectRef>
+          <a:fontRef idx="minor">
+            <a:schemeClr val="lt1"/>
+          </a:fontRef>
+        </p:style>
+        <p:txBody>
+          <a:bodyPr rtlCol="0" anchor="ctr"/>
+          <a:lstStyle/>
+          <a:p>
+            <a:pPr algn="ctr"/>
+            <a:endParaRPr lang="de-DE"/>
+          </a:p>
+        </p:txBody>
+      </p:sp>
+      <p:sp>
+        <p:nvSpPr>
+          <p:cNvPr id="27" name="Rechteck 26"/>
+          <p:cNvSpPr/>
+          <p:nvPr/>
+        </p:nvSpPr>
+        <p:spPr>
+          <a:xfrm>
+            <a:off x="4752300" y="3431274"/>
+            <a:ext cx="1079840" cy="362634"/>
+          </a:xfrm>
+          <a:prstGeom prst="rect">
+            <a:avLst/>
+          </a:prstGeom>
+          <a:noFill/>
+          <a:ln w="38100">
+            <a:solidFill>
+              <a:srgbClr val="0070C0"/>
+            </a:solidFill>
+          </a:ln>
+        </p:spPr>
+        <p:style>
+          <a:lnRef idx="2">
+            <a:schemeClr val="accent1">
+              <a:shade val="50000"/>
+            </a:schemeClr>
+          </a:lnRef>
+          <a:fillRef idx="1">
+            <a:schemeClr val="accent1"/>
+          </a:fillRef>
+          <a:effectRef idx="0">
+            <a:schemeClr val="accent1"/>
+          </a:effectRef>
+          <a:fontRef idx="minor">
+            <a:schemeClr val="lt1"/>
+          </a:fontRef>
+        </p:style>
+        <p:txBody>
+          <a:bodyPr rtlCol="0" anchor="ctr"/>
+          <a:lstStyle/>
+          <a:p>
+            <a:pPr algn="ctr"/>
+            <a:endParaRPr lang="de-DE"/>
+          </a:p>
+        </p:txBody>
+      </p:sp>
+      <p:sp>
+        <p:nvSpPr>
+          <p:cNvPr id="28" name="Rechteck 27"/>
+          <p:cNvSpPr/>
+          <p:nvPr/>
+        </p:nvSpPr>
+        <p:spPr>
+          <a:xfrm>
+            <a:off x="4748395" y="3392612"/>
+            <a:ext cx="1984447" cy="468436"/>
+          </a:xfrm>
+          <a:prstGeom prst="rect">
+            <a:avLst/>
+          </a:prstGeom>
+          <a:noFill/>
+          <a:ln w="19050">
+            <a:solidFill>
+              <a:srgbClr val="FF0000"/>
+            </a:solidFill>
+          </a:ln>
+        </p:spPr>
+        <p:style>
+          <a:lnRef idx="2">
+            <a:schemeClr val="accent1">
+              <a:shade val="50000"/>
+            </a:schemeClr>
+          </a:lnRef>
+          <a:fillRef idx="1">
+            <a:schemeClr val="accent1"/>
+          </a:fillRef>
+          <a:effectRef idx="0">
+            <a:schemeClr val="accent1"/>
+          </a:effectRef>
+          <a:fontRef idx="minor">
+            <a:schemeClr val="lt1"/>
+          </a:fontRef>
+        </p:style>
+        <p:txBody>
+          <a:bodyPr rtlCol="0" anchor="ctr"/>
+          <a:lstStyle/>
+          <a:p>
+            <a:pPr algn="ctr"/>
+            <a:endParaRPr lang="de-DE"/>
+          </a:p>
+        </p:txBody>
+      </p:sp>
+      <p:sp>
+        <p:nvSpPr>
+          <p:cNvPr id="29" name="Rechteck 28"/>
+          <p:cNvSpPr/>
+          <p:nvPr/>
+        </p:nvSpPr>
+        <p:spPr>
+          <a:xfrm>
+            <a:off x="6012440" y="4329304"/>
+            <a:ext cx="1071880" cy="359836"/>
+          </a:xfrm>
+          <a:prstGeom prst="rect">
+            <a:avLst/>
+          </a:prstGeom>
+          <a:noFill/>
+          <a:ln w="38100">
+            <a:solidFill>
+              <a:schemeClr val="tx1"/>
+            </a:solidFill>
+          </a:ln>
+        </p:spPr>
+        <p:style>
+          <a:lnRef idx="2">
+            <a:schemeClr val="accent1">
+              <a:shade val="50000"/>
+            </a:schemeClr>
+          </a:lnRef>
+          <a:fillRef idx="1">
+            <a:schemeClr val="accent1"/>
+          </a:fillRef>
+          <a:effectRef idx="0">
+            <a:schemeClr val="accent1"/>
+          </a:effectRef>
+          <a:fontRef idx="minor">
+            <a:schemeClr val="lt1"/>
+          </a:fontRef>
+        </p:style>
+        <p:txBody>
+          <a:bodyPr rtlCol="0" anchor="ctr"/>
+          <a:lstStyle/>
+          <a:p>
+            <a:pPr algn="ctr"/>
+            <a:endParaRPr lang="de-DE"/>
+          </a:p>
+        </p:txBody>
+      </p:sp>
+      <p:sp>
+        <p:nvSpPr>
+          <p:cNvPr id="30" name="Rechteck 29"/>
+          <p:cNvSpPr/>
+          <p:nvPr/>
+        </p:nvSpPr>
+        <p:spPr>
+          <a:xfrm>
+            <a:off x="4356256" y="4295370"/>
+            <a:ext cx="1079840" cy="362634"/>
+          </a:xfrm>
+          <a:prstGeom prst="rect">
+            <a:avLst/>
+          </a:prstGeom>
+          <a:noFill/>
+          <a:ln w="38100">
+            <a:solidFill>
+              <a:srgbClr val="0070C0"/>
+            </a:solidFill>
+          </a:ln>
+        </p:spPr>
+        <p:style>
+          <a:lnRef idx="2">
+            <a:schemeClr val="accent1">
+              <a:shade val="50000"/>
+            </a:schemeClr>
+          </a:lnRef>
+          <a:fillRef idx="1">
+            <a:schemeClr val="accent1"/>
+          </a:fillRef>
+          <a:effectRef idx="0">
+            <a:schemeClr val="accent1"/>
+          </a:effectRef>
+          <a:fontRef idx="minor">
+            <a:schemeClr val="lt1"/>
+          </a:fontRef>
+        </p:style>
+        <p:txBody>
+          <a:bodyPr rtlCol="0" anchor="ctr"/>
+          <a:lstStyle/>
+          <a:p>
+            <a:pPr algn="ctr"/>
+            <a:endParaRPr lang="de-DE"/>
+          </a:p>
+        </p:txBody>
+      </p:sp>
+      <p:sp>
+        <p:nvSpPr>
+          <p:cNvPr id="31" name="Rechteck 30"/>
+          <p:cNvSpPr/>
+          <p:nvPr/>
+        </p:nvSpPr>
+        <p:spPr>
+          <a:xfrm>
+            <a:off x="2636304" y="1872237"/>
+            <a:ext cx="1071880" cy="359836"/>
+          </a:xfrm>
+          <a:prstGeom prst="rect">
+            <a:avLst/>
+          </a:prstGeom>
+          <a:noFill/>
+          <a:ln w="38100">
+            <a:solidFill>
+              <a:schemeClr val="tx1"/>
+            </a:solidFill>
+          </a:ln>
+        </p:spPr>
+        <p:style>
+          <a:lnRef idx="2">
+            <a:schemeClr val="accent1">
+              <a:shade val="50000"/>
+            </a:schemeClr>
+          </a:lnRef>
+          <a:fillRef idx="1">
+            <a:schemeClr val="accent1"/>
+          </a:fillRef>
+          <a:effectRef idx="0">
+            <a:schemeClr val="accent1"/>
+          </a:effectRef>
+          <a:fontRef idx="minor">
+            <a:schemeClr val="lt1"/>
+          </a:fontRef>
+        </p:style>
+        <p:txBody>
+          <a:bodyPr rtlCol="0" anchor="ctr"/>
+          <a:lstStyle/>
+          <a:p>
+            <a:pPr algn="ctr"/>
+            <a:endParaRPr lang="de-DE"/>
+          </a:p>
+        </p:txBody>
+      </p:sp>
+      <p:cxnSp>
+        <p:nvCxnSpPr>
+          <p:cNvPr id="32" name="Gerade Verbindung mit Pfeil 31"/>
+          <p:cNvCxnSpPr/>
+          <p:nvPr/>
+        </p:nvCxnSpPr>
+        <p:spPr>
+          <a:xfrm>
+            <a:off x="6894189" y="4509222"/>
+            <a:ext cx="540000" cy="0"/>
+          </a:xfrm>
+          <a:prstGeom prst="straightConnector1">
+            <a:avLst/>
+          </a:prstGeom>
+          <a:ln w="19050">
+            <a:solidFill>
+              <a:schemeClr val="tx1"/>
+            </a:solidFill>
+            <a:headEnd type="none" w="med" len="med"/>
+            <a:tailEnd type="triangle" w="med" len="med"/>
+          </a:ln>
+        </p:spPr>
+        <p:style>
+          <a:lnRef idx="1">
+            <a:schemeClr val="accent1"/>
+          </a:lnRef>
+          <a:fillRef idx="0">
+            <a:schemeClr val="accent1"/>
+          </a:fillRef>
+          <a:effectRef idx="0">
+            <a:schemeClr val="accent1"/>
+          </a:effectRef>
+          <a:fontRef idx="minor">
+            <a:schemeClr val="tx1"/>
+          </a:fontRef>
+        </p:style>
+      </p:cxnSp>
+      <p:cxnSp>
+        <p:nvCxnSpPr>
+          <p:cNvPr id="33" name="Gerade Verbindung mit Pfeil 32"/>
+          <p:cNvCxnSpPr/>
+          <p:nvPr/>
+        </p:nvCxnSpPr>
+        <p:spPr>
+          <a:xfrm flipH="1">
+            <a:off x="4024572" y="4481293"/>
+            <a:ext cx="540000" cy="0"/>
+          </a:xfrm>
+          <a:prstGeom prst="straightConnector1">
+            <a:avLst/>
+          </a:prstGeom>
+          <a:ln w="19050">
+            <a:solidFill>
+              <a:srgbClr val="0070C0"/>
+            </a:solidFill>
+            <a:headEnd type="none" w="med" len="med"/>
+            <a:tailEnd type="triangle" w="med" len="med"/>
+          </a:ln>
+        </p:spPr>
+        <p:style>
+          <a:lnRef idx="1">
+            <a:schemeClr val="accent1"/>
+          </a:lnRef>
+          <a:fillRef idx="0">
+            <a:schemeClr val="accent1"/>
+          </a:fillRef>
+          <a:effectRef idx="0">
+            <a:schemeClr val="accent1"/>
+          </a:effectRef>
+          <a:fontRef idx="minor">
+            <a:schemeClr val="tx1"/>
+          </a:fontRef>
+        </p:style>
+      </p:cxnSp>
+      <p:sp>
+        <p:nvSpPr>
+          <p:cNvPr id="34" name="Textfeld 33"/>
+          <p:cNvSpPr txBox="1"/>
+          <p:nvPr/>
+        </p:nvSpPr>
+        <p:spPr>
+          <a:xfrm>
+            <a:off x="971549" y="2574588"/>
+            <a:ext cx="822661" cy="461665"/>
+          </a:xfrm>
+          <a:prstGeom prst="rect">
+            <a:avLst/>
+          </a:prstGeom>
+          <a:noFill/>
+        </p:spPr>
+        <p:txBody>
+          <a:bodyPr wrap="square" rtlCol="0">
+            <a:spAutoFit/>
+          </a:bodyPr>
+          <a:lstStyle/>
+          <a:p>
+            <a:r>
+              <a:rPr lang="de-DE" sz="1200" dirty="0" err="1" smtClean="0">
+                <a:latin typeface="Arial" panose="020B0604020202020204" pitchFamily="34" charset="0"/>
+                <a:cs typeface="Arial" panose="020B0604020202020204" pitchFamily="34" charset="0"/>
+              </a:rPr>
+              <a:t>create</a:t>
+            </a:r>
+            <a:r>
+              <a:rPr lang="de-DE" sz="1200" dirty="0" smtClean="0">
+                <a:latin typeface="Arial" panose="020B0604020202020204" pitchFamily="34" charset="0"/>
+                <a:cs typeface="Arial" panose="020B0604020202020204" pitchFamily="34" charset="0"/>
+              </a:rPr>
+              <a:t/>
+            </a:r>
+            <a:br>
+              <a:rPr lang="de-DE" sz="1200" dirty="0" smtClean="0">
+                <a:latin typeface="Arial" panose="020B0604020202020204" pitchFamily="34" charset="0"/>
+                <a:cs typeface="Arial" panose="020B0604020202020204" pitchFamily="34" charset="0"/>
+              </a:rPr>
+            </a:br>
+            <a:r>
+              <a:rPr lang="de-DE" sz="1200" dirty="0" err="1">
+                <a:latin typeface="Arial" panose="020B0604020202020204" pitchFamily="34" charset="0"/>
+                <a:cs typeface="Arial" panose="020B0604020202020204" pitchFamily="34" charset="0"/>
+              </a:rPr>
+              <a:t>o</a:t>
+            </a:r>
+            <a:r>
+              <a:rPr lang="de-DE" sz="1200" dirty="0" err="1" smtClean="0">
+                <a:latin typeface="Arial" panose="020B0604020202020204" pitchFamily="34" charset="0"/>
+                <a:cs typeface="Arial" panose="020B0604020202020204" pitchFamily="34" charset="0"/>
+              </a:rPr>
+              <a:t>cclusion</a:t>
+            </a:r>
+            <a:endParaRPr lang="de-DE" sz="1200" dirty="0" smtClean="0">
+              <a:latin typeface="Arial" panose="020B0604020202020204" pitchFamily="34" charset="0"/>
+              <a:cs typeface="Arial" panose="020B0604020202020204" pitchFamily="34" charset="0"/>
+            </a:endParaRPr>
+          </a:p>
+        </p:txBody>
+      </p:sp>
+      <p:sp>
+        <p:nvSpPr>
+          <p:cNvPr id="35" name="Textfeld 34"/>
+          <p:cNvSpPr txBox="1"/>
+          <p:nvPr/>
+        </p:nvSpPr>
+        <p:spPr>
+          <a:xfrm>
+            <a:off x="971549" y="3414293"/>
+            <a:ext cx="1222215" cy="461665"/>
+          </a:xfrm>
+          <a:prstGeom prst="rect">
+            <a:avLst/>
+          </a:prstGeom>
+          <a:noFill/>
+        </p:spPr>
+        <p:txBody>
+          <a:bodyPr wrap="square" rtlCol="0">
+            <a:spAutoFit/>
+          </a:bodyPr>
+          <a:lstStyle/>
+          <a:p>
+            <a:r>
+              <a:rPr lang="de-DE" sz="1200" dirty="0" err="1" smtClean="0">
+                <a:latin typeface="Arial" panose="020B0604020202020204" pitchFamily="34" charset="0"/>
+                <a:cs typeface="Arial" panose="020B0604020202020204" pitchFamily="34" charset="0"/>
+              </a:rPr>
+              <a:t>assign</a:t>
+            </a:r>
+            <a:r>
+              <a:rPr lang="de-DE" sz="1200" dirty="0" smtClean="0">
+                <a:latin typeface="Arial" panose="020B0604020202020204" pitchFamily="34" charset="0"/>
+                <a:cs typeface="Arial" panose="020B0604020202020204" pitchFamily="34" charset="0"/>
+              </a:rPr>
+              <a:t> </a:t>
+            </a:r>
+            <a:r>
+              <a:rPr lang="de-DE" sz="1200" dirty="0" err="1" smtClean="0">
+                <a:latin typeface="Arial" panose="020B0604020202020204" pitchFamily="34" charset="0"/>
+                <a:cs typeface="Arial" panose="020B0604020202020204" pitchFamily="34" charset="0"/>
+              </a:rPr>
+              <a:t>blobs</a:t>
+            </a:r>
+            <a:r>
+              <a:rPr lang="de-DE" sz="1200" dirty="0">
+                <a:latin typeface="Arial" panose="020B0604020202020204" pitchFamily="34" charset="0"/>
+                <a:cs typeface="Arial" panose="020B0604020202020204" pitchFamily="34" charset="0"/>
+              </a:rPr>
+              <a:t/>
+            </a:r>
+            <a:br>
+              <a:rPr lang="de-DE" sz="1200" dirty="0">
+                <a:latin typeface="Arial" panose="020B0604020202020204" pitchFamily="34" charset="0"/>
+                <a:cs typeface="Arial" panose="020B0604020202020204" pitchFamily="34" charset="0"/>
+              </a:rPr>
+            </a:br>
+            <a:r>
+              <a:rPr lang="de-DE" sz="1200" dirty="0" smtClean="0">
+                <a:latin typeface="Arial" panose="020B0604020202020204" pitchFamily="34" charset="0"/>
+                <a:cs typeface="Arial" panose="020B0604020202020204" pitchFamily="34" charset="0"/>
+              </a:rPr>
+              <a:t>in </a:t>
+            </a:r>
+            <a:r>
+              <a:rPr lang="de-DE" sz="1200" dirty="0" err="1" smtClean="0">
+                <a:latin typeface="Arial" panose="020B0604020202020204" pitchFamily="34" charset="0"/>
+                <a:cs typeface="Arial" panose="020B0604020202020204" pitchFamily="34" charset="0"/>
+              </a:rPr>
+              <a:t>occlusion</a:t>
+            </a:r>
+            <a:endParaRPr lang="de-DE" sz="1200" dirty="0" smtClean="0">
+              <a:latin typeface="Arial" panose="020B0604020202020204" pitchFamily="34" charset="0"/>
+              <a:cs typeface="Arial" panose="020B0604020202020204" pitchFamily="34" charset="0"/>
+            </a:endParaRPr>
+          </a:p>
+        </p:txBody>
+      </p:sp>
+      <p:sp>
+        <p:nvSpPr>
+          <p:cNvPr id="36" name="Textfeld 35"/>
+          <p:cNvSpPr txBox="1"/>
+          <p:nvPr/>
+        </p:nvSpPr>
+        <p:spPr>
+          <a:xfrm>
+            <a:off x="971549" y="4185084"/>
+            <a:ext cx="1222215" cy="461665"/>
+          </a:xfrm>
+          <a:prstGeom prst="rect">
+            <a:avLst/>
+          </a:prstGeom>
+          <a:noFill/>
+        </p:spPr>
+        <p:txBody>
+          <a:bodyPr wrap="square" rtlCol="0">
+            <a:spAutoFit/>
+          </a:bodyPr>
+          <a:lstStyle/>
+          <a:p>
+            <a:r>
+              <a:rPr lang="de-DE" sz="1200" dirty="0" err="1" smtClean="0">
+                <a:latin typeface="Arial" panose="020B0604020202020204" pitchFamily="34" charset="0"/>
+                <a:cs typeface="Arial" panose="020B0604020202020204" pitchFamily="34" charset="0"/>
+              </a:rPr>
+              <a:t>delete</a:t>
+            </a:r>
+            <a:r>
+              <a:rPr lang="de-DE" sz="1200" dirty="0" smtClean="0">
+                <a:latin typeface="Arial" panose="020B0604020202020204" pitchFamily="34" charset="0"/>
+                <a:cs typeface="Arial" panose="020B0604020202020204" pitchFamily="34" charset="0"/>
+              </a:rPr>
+              <a:t> </a:t>
+            </a:r>
+            <a:r>
+              <a:rPr lang="de-DE" sz="1200" dirty="0" err="1" smtClean="0">
+                <a:latin typeface="Arial" panose="020B0604020202020204" pitchFamily="34" charset="0"/>
+                <a:cs typeface="Arial" panose="020B0604020202020204" pitchFamily="34" charset="0"/>
+              </a:rPr>
+              <a:t>occlusion</a:t>
+            </a:r>
+            <a:endParaRPr lang="de-DE" sz="1200" dirty="0" smtClean="0">
+              <a:latin typeface="Arial" panose="020B0604020202020204" pitchFamily="34" charset="0"/>
+              <a:cs typeface="Arial" panose="020B0604020202020204" pitchFamily="34" charset="0"/>
+            </a:endParaRPr>
+          </a:p>
+        </p:txBody>
+      </p:sp>
+    </p:spTree>
+    <p:extLst>
+      <p:ext uri="{BB962C8B-B14F-4D97-AF65-F5344CB8AC3E}">
+        <p14:creationId xmlns:p14="http://schemas.microsoft.com/office/powerpoint/2010/main" val="3690905262"/>
       </p:ext>
     </p:extLst>
   </p:cSld>

</xml_diff>

<commit_message>
started visual test cases
</commit_message>
<xml_diff>
--- a/utilities/occlusion.pptx
+++ b/utilities/occlusion.pptx
@@ -9,6 +9,7 @@
     <p:sldId id="277" r:id="rId3"/>
     <p:sldId id="278" r:id="rId4"/>
     <p:sldId id="279" r:id="rId5"/>
+    <p:sldId id="280" r:id="rId6"/>
   </p:sldIdLst>
   <p:sldSz cx="9144000" cy="6858000" type="screen4x3"/>
   <p:notesSz cx="6865938" cy="9996488"/>
@@ -291,7 +292,7 @@
           <a:p>
             <a:fld id="{7F847C87-CECF-4A9A-88F5-87615B577ED8}" type="datetimeFigureOut">
               <a:rPr lang="de-DE" smtClean="0"/>
-              <a:t>18.01.2019</a:t>
+              <a:t>17.02.2019</a:t>
             </a:fld>
             <a:endParaRPr lang="de-DE"/>
           </a:p>
@@ -470,7 +471,7 @@
           <a:p>
             <a:fld id="{7F847C87-CECF-4A9A-88F5-87615B577ED8}" type="datetimeFigureOut">
               <a:rPr lang="de-DE" smtClean="0"/>
-              <a:t>18.01.2019</a:t>
+              <a:t>17.02.2019</a:t>
             </a:fld>
             <a:endParaRPr lang="de-DE"/>
           </a:p>
@@ -650,7 +651,7 @@
           <a:p>
             <a:fld id="{7F847C87-CECF-4A9A-88F5-87615B577ED8}" type="datetimeFigureOut">
               <a:rPr lang="de-DE" smtClean="0"/>
-              <a:t>18.01.2019</a:t>
+              <a:t>17.02.2019</a:t>
             </a:fld>
             <a:endParaRPr lang="de-DE"/>
           </a:p>
@@ -884,7 +885,7 @@
           <a:p>
             <a:fld id="{7F847C87-CECF-4A9A-88F5-87615B577ED8}" type="datetimeFigureOut">
               <a:rPr lang="de-DE" smtClean="0"/>
-              <a:t>18.01.2019</a:t>
+              <a:t>17.02.2019</a:t>
             </a:fld>
             <a:endParaRPr lang="de-DE"/>
           </a:p>
@@ -1137,7 +1138,7 @@
           <a:p>
             <a:fld id="{7F847C87-CECF-4A9A-88F5-87615B577ED8}" type="datetimeFigureOut">
               <a:rPr lang="de-DE" smtClean="0"/>
-              <a:t>18.01.2019</a:t>
+              <a:t>17.02.2019</a:t>
             </a:fld>
             <a:endParaRPr lang="de-DE"/>
           </a:p>
@@ -1425,7 +1426,7 @@
           <a:p>
             <a:fld id="{7F847C87-CECF-4A9A-88F5-87615B577ED8}" type="datetimeFigureOut">
               <a:rPr lang="de-DE" smtClean="0"/>
-              <a:t>18.01.2019</a:t>
+              <a:t>17.02.2019</a:t>
             </a:fld>
             <a:endParaRPr lang="de-DE"/>
           </a:p>
@@ -1847,7 +1848,7 @@
           <a:p>
             <a:fld id="{7F847C87-CECF-4A9A-88F5-87615B577ED8}" type="datetimeFigureOut">
               <a:rPr lang="de-DE" smtClean="0"/>
-              <a:t>18.01.2019</a:t>
+              <a:t>17.02.2019</a:t>
             </a:fld>
             <a:endParaRPr lang="de-DE"/>
           </a:p>
@@ -1965,7 +1966,7 @@
           <a:p>
             <a:fld id="{7F847C87-CECF-4A9A-88F5-87615B577ED8}" type="datetimeFigureOut">
               <a:rPr lang="de-DE" smtClean="0"/>
-              <a:t>18.01.2019</a:t>
+              <a:t>17.02.2019</a:t>
             </a:fld>
             <a:endParaRPr lang="de-DE"/>
           </a:p>
@@ -2060,7 +2061,7 @@
           <a:p>
             <a:fld id="{7F847C87-CECF-4A9A-88F5-87615B577ED8}" type="datetimeFigureOut">
               <a:rPr lang="de-DE" smtClean="0"/>
-              <a:t>18.01.2019</a:t>
+              <a:t>17.02.2019</a:t>
             </a:fld>
             <a:endParaRPr lang="de-DE"/>
           </a:p>
@@ -2337,7 +2338,7 @@
           <a:p>
             <a:fld id="{7F847C87-CECF-4A9A-88F5-87615B577ED8}" type="datetimeFigureOut">
               <a:rPr lang="de-DE" smtClean="0"/>
-              <a:t>18.01.2019</a:t>
+              <a:t>17.02.2019</a:t>
             </a:fld>
             <a:endParaRPr lang="de-DE"/>
           </a:p>
@@ -2590,7 +2591,7 @@
           <a:p>
             <a:fld id="{7F847C87-CECF-4A9A-88F5-87615B577ED8}" type="datetimeFigureOut">
               <a:rPr lang="de-DE" smtClean="0"/>
-              <a:t>18.01.2019</a:t>
+              <a:t>17.02.2019</a:t>
             </a:fld>
             <a:endParaRPr lang="de-DE"/>
           </a:p>
@@ -2796,7 +2797,7 @@
           <a:p>
             <a:fld id="{7F847C87-CECF-4A9A-88F5-87615B577ED8}" type="datetimeFigureOut">
               <a:rPr lang="de-DE" smtClean="0"/>
-              <a:t>18.01.2019</a:t>
+              <a:t>17.02.2019</a:t>
             </a:fld>
             <a:endParaRPr lang="de-DE"/>
           </a:p>
@@ -9243,19 +9244,8 @@
                 <a:latin typeface="Times New Roman" panose="02020603050405020304" pitchFamily="18" charset="0"/>
                 <a:cs typeface="Times New Roman" panose="02020603050405020304" pitchFamily="18" charset="0"/>
               </a:rPr>
-              <a:t> = </a:t>
-            </a:r>
-            <a:r>
-              <a:rPr lang="de-DE" sz="1200" i="1" dirty="0" smtClean="0">
-                <a:latin typeface="Times New Roman" panose="02020603050405020304" pitchFamily="18" charset="0"/>
-                <a:cs typeface="Times New Roman" panose="02020603050405020304" pitchFamily="18" charset="0"/>
-              </a:rPr>
-              <a:t>10</a:t>
-            </a:r>
-            <a:endParaRPr lang="de-DE" sz="1200" i="1" dirty="0" smtClean="0">
-              <a:latin typeface="Times New Roman" panose="02020603050405020304" pitchFamily="18" charset="0"/>
-              <a:cs typeface="Times New Roman" panose="02020603050405020304" pitchFamily="18" charset="0"/>
-            </a:endParaRPr>
+              <a:t> = 10</a:t>
+            </a:r>
           </a:p>
         </p:txBody>
       </p:sp>
@@ -9309,25 +9299,8 @@
                 <a:latin typeface="Times New Roman" panose="02020603050405020304" pitchFamily="18" charset="0"/>
                 <a:cs typeface="Times New Roman" panose="02020603050405020304" pitchFamily="18" charset="0"/>
               </a:rPr>
-              <a:t> = </a:t>
-            </a:r>
-            <a:r>
-              <a:rPr lang="de-DE" sz="1200" i="1" dirty="0" smtClean="0">
-                <a:solidFill>
-                  <a:srgbClr val="0070C0"/>
-                </a:solidFill>
-                <a:latin typeface="Times New Roman" panose="02020603050405020304" pitchFamily="18" charset="0"/>
-                <a:cs typeface="Times New Roman" panose="02020603050405020304" pitchFamily="18" charset="0"/>
-              </a:rPr>
-              <a:t>-10</a:t>
-            </a:r>
-            <a:endParaRPr lang="de-DE" sz="1200" i="1" dirty="0" smtClean="0">
-              <a:solidFill>
-                <a:srgbClr val="0070C0"/>
-              </a:solidFill>
-              <a:latin typeface="Times New Roman" panose="02020603050405020304" pitchFamily="18" charset="0"/>
-              <a:cs typeface="Times New Roman" panose="02020603050405020304" pitchFamily="18" charset="0"/>
-            </a:endParaRPr>
+              <a:t> = -10</a:t>
+            </a:r>
           </a:p>
         </p:txBody>
       </p:sp>
@@ -9844,19 +9817,8 @@
                 <a:latin typeface="Arial" panose="020B0604020202020204" pitchFamily="34" charset="0"/>
                 <a:cs typeface="Arial" panose="020B0604020202020204" pitchFamily="34" charset="0"/>
               </a:rPr>
-              <a:t>n+</a:t>
-            </a:r>
-            <a:r>
-              <a:rPr lang="de-DE" sz="1200" dirty="0" smtClean="0">
-                <a:latin typeface="Arial" panose="020B0604020202020204" pitchFamily="34" charset="0"/>
-                <a:cs typeface="Arial" panose="020B0604020202020204" pitchFamily="34" charset="0"/>
-              </a:rPr>
-              <a:t>1</a:t>
-            </a:r>
-            <a:endParaRPr lang="de-DE" sz="1200" dirty="0" smtClean="0">
-              <a:latin typeface="Arial" panose="020B0604020202020204" pitchFamily="34" charset="0"/>
-              <a:cs typeface="Arial" panose="020B0604020202020204" pitchFamily="34" charset="0"/>
-            </a:endParaRPr>
+              <a:t>n+1</a:t>
+            </a:r>
           </a:p>
         </p:txBody>
       </p:sp>
@@ -9975,19 +9937,8 @@
                 <a:latin typeface="Times New Roman" panose="02020603050405020304" pitchFamily="18" charset="0"/>
                 <a:cs typeface="Times New Roman" panose="02020603050405020304" pitchFamily="18" charset="0"/>
               </a:rPr>
-              <a:t> = </a:t>
-            </a:r>
-            <a:r>
-              <a:rPr lang="de-DE" sz="1200" i="1" dirty="0" smtClean="0">
-                <a:latin typeface="Times New Roman" panose="02020603050405020304" pitchFamily="18" charset="0"/>
-                <a:cs typeface="Times New Roman" panose="02020603050405020304" pitchFamily="18" charset="0"/>
-              </a:rPr>
-              <a:t>5</a:t>
-            </a:r>
-            <a:endParaRPr lang="de-DE" sz="1200" i="1" dirty="0" smtClean="0">
-              <a:latin typeface="Times New Roman" panose="02020603050405020304" pitchFamily="18" charset="0"/>
-              <a:cs typeface="Times New Roman" panose="02020603050405020304" pitchFamily="18" charset="0"/>
-            </a:endParaRPr>
+              <a:t> = 5</a:t>
+            </a:r>
           </a:p>
         </p:txBody>
       </p:sp>
@@ -10041,25 +9992,8 @@
                 <a:latin typeface="Times New Roman" panose="02020603050405020304" pitchFamily="18" charset="0"/>
                 <a:cs typeface="Times New Roman" panose="02020603050405020304" pitchFamily="18" charset="0"/>
               </a:rPr>
-              <a:t> = </a:t>
-            </a:r>
-            <a:r>
-              <a:rPr lang="de-DE" sz="1200" i="1" dirty="0" smtClean="0">
-                <a:solidFill>
-                  <a:srgbClr val="0070C0"/>
-                </a:solidFill>
-                <a:latin typeface="Times New Roman" panose="02020603050405020304" pitchFamily="18" charset="0"/>
-                <a:cs typeface="Times New Roman" panose="02020603050405020304" pitchFamily="18" charset="0"/>
-              </a:rPr>
-              <a:t>-5</a:t>
-            </a:r>
-            <a:endParaRPr lang="de-DE" sz="1200" i="1" dirty="0" smtClean="0">
-              <a:solidFill>
-                <a:srgbClr val="0070C0"/>
-              </a:solidFill>
-              <a:latin typeface="Times New Roman" panose="02020603050405020304" pitchFamily="18" charset="0"/>
-              <a:cs typeface="Times New Roman" panose="02020603050405020304" pitchFamily="18" charset="0"/>
-            </a:endParaRPr>
+              <a:t> = -5</a:t>
+            </a:r>
           </a:p>
         </p:txBody>
       </p:sp>
@@ -10280,19 +10214,8 @@
                 <a:latin typeface="Arial" panose="020B0604020202020204" pitchFamily="34" charset="0"/>
                 <a:cs typeface="Arial" panose="020B0604020202020204" pitchFamily="34" charset="0"/>
               </a:rPr>
-              <a:t>n+</a:t>
-            </a:r>
-            <a:r>
-              <a:rPr lang="de-DE" sz="1200" dirty="0" smtClean="0">
-                <a:latin typeface="Arial" panose="020B0604020202020204" pitchFamily="34" charset="0"/>
-                <a:cs typeface="Arial" panose="020B0604020202020204" pitchFamily="34" charset="0"/>
-              </a:rPr>
-              <a:t>2</a:t>
-            </a:r>
-            <a:endParaRPr lang="de-DE" sz="1200" dirty="0" smtClean="0">
-              <a:latin typeface="Arial" panose="020B0604020202020204" pitchFamily="34" charset="0"/>
-              <a:cs typeface="Arial" panose="020B0604020202020204" pitchFamily="34" charset="0"/>
-            </a:endParaRPr>
+              <a:t>n+2</a:t>
+            </a:r>
           </a:p>
         </p:txBody>
       </p:sp>
@@ -10323,19 +10246,8 @@
                 <a:latin typeface="Arial" panose="020B0604020202020204" pitchFamily="34" charset="0"/>
                 <a:cs typeface="Arial" panose="020B0604020202020204" pitchFamily="34" charset="0"/>
               </a:rPr>
-              <a:t>n+</a:t>
-            </a:r>
-            <a:r>
-              <a:rPr lang="de-DE" sz="1200" dirty="0" smtClean="0">
-                <a:latin typeface="Arial" panose="020B0604020202020204" pitchFamily="34" charset="0"/>
-                <a:cs typeface="Arial" panose="020B0604020202020204" pitchFamily="34" charset="0"/>
-              </a:rPr>
-              <a:t>8</a:t>
-            </a:r>
-            <a:endParaRPr lang="de-DE" sz="1200" dirty="0" smtClean="0">
-              <a:latin typeface="Arial" panose="020B0604020202020204" pitchFamily="34" charset="0"/>
-              <a:cs typeface="Arial" panose="020B0604020202020204" pitchFamily="34" charset="0"/>
-            </a:endParaRPr>
+              <a:t>n+8</a:t>
+            </a:r>
           </a:p>
         </p:txBody>
       </p:sp>
@@ -10439,14 +10351,7 @@
                 <a:latin typeface="Arial" panose="020B0604020202020204" pitchFamily="34" charset="0"/>
                 <a:cs typeface="Arial" panose="020B0604020202020204" pitchFamily="34" charset="0"/>
               </a:rPr>
-              <a:t>re</a:t>
-            </a:r>
-            <a:r>
-              <a:rPr lang="de-DE" sz="1200" dirty="0" err="1" smtClean="0">
-                <a:latin typeface="Arial" panose="020B0604020202020204" pitchFamily="34" charset="0"/>
-                <a:cs typeface="Arial" panose="020B0604020202020204" pitchFamily="34" charset="0"/>
-              </a:rPr>
-              <a:t>mainingOccludedUpdateSteps</a:t>
+              <a:t>remainingOccludedUpdateSteps</a:t>
             </a:r>
             <a:r>
               <a:rPr lang="de-DE" sz="1200" dirty="0" smtClean="0">
@@ -10469,10 +10374,6 @@
               </a:rPr>
               <a:t>84 / 20 = 4.2	</a:t>
             </a:r>
-            <a:endParaRPr lang="de-DE" sz="1200" dirty="0" smtClean="0">
-              <a:latin typeface="Arial" panose="020B0604020202020204" pitchFamily="34" charset="0"/>
-              <a:cs typeface="Arial" panose="020B0604020202020204" pitchFamily="34" charset="0"/>
-            </a:endParaRPr>
           </a:p>
         </p:txBody>
       </p:sp>
@@ -10550,10 +10451,6 @@
               </a:rPr>
               <a:t>24</a:t>
             </a:r>
-            <a:endParaRPr lang="de-DE" sz="1200" dirty="0" smtClean="0">
-              <a:latin typeface="Arial" panose="020B0604020202020204" pitchFamily="34" charset="0"/>
-              <a:cs typeface="Arial" panose="020B0604020202020204" pitchFamily="34" charset="0"/>
-            </a:endParaRPr>
           </a:p>
         </p:txBody>
       </p:sp>
@@ -10905,10 +10802,6 @@
               </a:rPr>
               <a:t>...</a:t>
             </a:r>
-            <a:endParaRPr lang="de-DE" sz="2000" dirty="0" smtClean="0">
-              <a:latin typeface="Arial" panose="020B0604020202020204" pitchFamily="34" charset="0"/>
-              <a:cs typeface="Arial" panose="020B0604020202020204" pitchFamily="34" charset="0"/>
-            </a:endParaRPr>
           </a:p>
         </p:txBody>
       </p:sp>
@@ -10941,10 +10834,6 @@
               </a:rPr>
               <a:t>...</a:t>
             </a:r>
-            <a:endParaRPr lang="de-DE" sz="2000" dirty="0" smtClean="0">
-              <a:latin typeface="Arial" panose="020B0604020202020204" pitchFamily="34" charset="0"/>
-              <a:cs typeface="Arial" panose="020B0604020202020204" pitchFamily="34" charset="0"/>
-            </a:endParaRPr>
           </a:p>
         </p:txBody>
       </p:sp>
@@ -11155,10 +11044,6 @@
               </a:rPr>
               <a:t>	</a:t>
             </a:r>
-            <a:endParaRPr lang="de-DE" sz="1200" dirty="0" smtClean="0">
-              <a:latin typeface="Arial" panose="020B0604020202020204" pitchFamily="34" charset="0"/>
-              <a:cs typeface="Arial" panose="020B0604020202020204" pitchFamily="34" charset="0"/>
-            </a:endParaRPr>
           </a:p>
         </p:txBody>
       </p:sp>
@@ -11353,19 +11238,8 @@
                 <a:latin typeface="Times New Roman" panose="02020603050405020304" pitchFamily="18" charset="0"/>
                 <a:cs typeface="Times New Roman" panose="02020603050405020304" pitchFamily="18" charset="0"/>
               </a:rPr>
-              <a:t> = </a:t>
-            </a:r>
-            <a:r>
-              <a:rPr lang="de-DE" sz="1200" i="1" dirty="0" smtClean="0">
-                <a:latin typeface="Times New Roman" panose="02020603050405020304" pitchFamily="18" charset="0"/>
-                <a:cs typeface="Times New Roman" panose="02020603050405020304" pitchFamily="18" charset="0"/>
-              </a:rPr>
-              <a:t>10</a:t>
-            </a:r>
-            <a:endParaRPr lang="de-DE" sz="1200" i="1" dirty="0" smtClean="0">
-              <a:latin typeface="Times New Roman" panose="02020603050405020304" pitchFamily="18" charset="0"/>
-              <a:cs typeface="Times New Roman" panose="02020603050405020304" pitchFamily="18" charset="0"/>
-            </a:endParaRPr>
+              <a:t> = 10</a:t>
+            </a:r>
           </a:p>
         </p:txBody>
       </p:sp>
@@ -11419,25 +11293,8 @@
                 <a:latin typeface="Times New Roman" panose="02020603050405020304" pitchFamily="18" charset="0"/>
                 <a:cs typeface="Times New Roman" panose="02020603050405020304" pitchFamily="18" charset="0"/>
               </a:rPr>
-              <a:t> = </a:t>
-            </a:r>
-            <a:r>
-              <a:rPr lang="de-DE" sz="1200" i="1" dirty="0" smtClean="0">
-                <a:solidFill>
-                  <a:srgbClr val="0070C0"/>
-                </a:solidFill>
-                <a:latin typeface="Times New Roman" panose="02020603050405020304" pitchFamily="18" charset="0"/>
-                <a:cs typeface="Times New Roman" panose="02020603050405020304" pitchFamily="18" charset="0"/>
-              </a:rPr>
-              <a:t>-10</a:t>
-            </a:r>
-            <a:endParaRPr lang="de-DE" sz="1200" i="1" dirty="0" smtClean="0">
-              <a:solidFill>
-                <a:srgbClr val="0070C0"/>
-              </a:solidFill>
-              <a:latin typeface="Times New Roman" panose="02020603050405020304" pitchFamily="18" charset="0"/>
-              <a:cs typeface="Times New Roman" panose="02020603050405020304" pitchFamily="18" charset="0"/>
-            </a:endParaRPr>
+              <a:t> = -10</a:t>
+            </a:r>
           </a:p>
         </p:txBody>
       </p:sp>
@@ -12478,6 +12335,627 @@
       </p:par>
     </p:tnLst>
   </p:timing>
+</p:sld>
+</file>
+
+<file path=ppt/slides/slide5.xml><?xml version="1.0" encoding="utf-8"?>
+<p:sld xmlns:a="http://schemas.openxmlformats.org/drawingml/2006/main" xmlns:r="http://schemas.openxmlformats.org/officeDocument/2006/relationships" xmlns:p="http://schemas.openxmlformats.org/presentationml/2006/main">
+  <p:cSld>
+    <p:spTree>
+      <p:nvGrpSpPr>
+        <p:cNvPr id="1" name=""/>
+        <p:cNvGrpSpPr/>
+        <p:nvPr/>
+      </p:nvGrpSpPr>
+      <p:grpSpPr>
+        <a:xfrm>
+          <a:off x="0" y="0"/>
+          <a:ext cx="0" cy="0"/>
+          <a:chOff x="0" y="0"/>
+          <a:chExt cx="0" cy="0"/>
+        </a:xfrm>
+      </p:grpSpPr>
+      <p:sp>
+        <p:nvSpPr>
+          <p:cNvPr id="2" name="Titel 1"/>
+          <p:cNvSpPr>
+            <a:spLocks noGrp="1"/>
+          </p:cNvSpPr>
+          <p:nvPr>
+            <p:ph type="title"/>
+          </p:nvPr>
+        </p:nvSpPr>
+        <p:spPr/>
+        <p:txBody>
+          <a:bodyPr/>
+          <a:lstStyle/>
+          <a:p>
+            <a:r>
+              <a:rPr lang="de-DE" dirty="0" err="1" smtClean="0"/>
+              <a:t>SceneTracker</a:t>
+            </a:r>
+            <a:r>
+              <a:rPr lang="de-DE" dirty="0" smtClean="0"/>
+              <a:t>::</a:t>
+            </a:r>
+            <a:r>
+              <a:rPr lang="de-DE" dirty="0" err="1" smtClean="0"/>
+              <a:t>updateTracksIntersect</a:t>
+            </a:r>
+            <a:endParaRPr lang="de-DE" dirty="0"/>
+          </a:p>
+        </p:txBody>
+      </p:sp>
+      <p:sp>
+        <p:nvSpPr>
+          <p:cNvPr id="3" name="Inhaltsplatzhalter 2"/>
+          <p:cNvSpPr txBox="1">
+            <a:spLocks/>
+          </p:cNvSpPr>
+          <p:nvPr/>
+        </p:nvSpPr>
+        <p:spPr>
+          <a:xfrm>
+            <a:off x="457200" y="1091877"/>
+            <a:ext cx="8229600" cy="5289451"/>
+          </a:xfrm>
+          <a:prstGeom prst="rect">
+            <a:avLst/>
+          </a:prstGeom>
+        </p:spPr>
+        <p:txBody>
+          <a:bodyPr/>
+          <a:lstStyle>
+            <a:lvl1pPr marL="180975" indent="-180975" algn="l" defTabSz="914400" rtl="0" eaLnBrk="1" latinLnBrk="0" hangingPunct="1">
+              <a:spcBef>
+                <a:spcPts val="300"/>
+              </a:spcBef>
+              <a:buFont typeface="Wingdings" panose="05000000000000000000" pitchFamily="2" charset="2"/>
+              <a:buChar char="§"/>
+              <a:defRPr lang="de-DE" sz="1200" kern="1200" baseline="0" dirty="0" smtClean="0">
+                <a:solidFill>
+                  <a:schemeClr val="tx1"/>
+                </a:solidFill>
+                <a:latin typeface="Arial" panose="020B0604020202020204" pitchFamily="34" charset="0"/>
+                <a:ea typeface="+mn-ea"/>
+                <a:cs typeface="Arial" panose="020B0604020202020204" pitchFamily="34" charset="0"/>
+              </a:defRPr>
+            </a:lvl1pPr>
+            <a:lvl2pPr marL="447675" indent="-180975" algn="l" defTabSz="914400" rtl="0" eaLnBrk="1" latinLnBrk="0" hangingPunct="1">
+              <a:spcBef>
+                <a:spcPts val="300"/>
+              </a:spcBef>
+              <a:buFont typeface="Wingdings" panose="05000000000000000000" pitchFamily="2" charset="2"/>
+              <a:buChar char="§"/>
+              <a:defRPr lang="de-DE" sz="1000" kern="1200" baseline="0" dirty="0" smtClean="0">
+                <a:solidFill>
+                  <a:schemeClr val="tx1"/>
+                </a:solidFill>
+                <a:latin typeface="Arial" panose="020B0604020202020204" pitchFamily="34" charset="0"/>
+                <a:ea typeface="+mn-ea"/>
+                <a:cs typeface="Arial" panose="020B0604020202020204" pitchFamily="34" charset="0"/>
+              </a:defRPr>
+            </a:lvl2pPr>
+            <a:lvl3pPr marL="712788" indent="-169863" algn="l" defTabSz="914400" rtl="0" eaLnBrk="1" latinLnBrk="0" hangingPunct="1">
+              <a:spcBef>
+                <a:spcPts val="0"/>
+              </a:spcBef>
+              <a:buFont typeface="Arial" panose="020B0604020202020204" pitchFamily="34" charset="0"/>
+              <a:buChar char="-"/>
+              <a:defRPr lang="de-DE" sz="1000" kern="1200" baseline="0" dirty="0" smtClean="0">
+                <a:solidFill>
+                  <a:schemeClr val="tx1"/>
+                </a:solidFill>
+                <a:latin typeface="Arial" panose="020B0604020202020204" pitchFamily="34" charset="0"/>
+                <a:ea typeface="+mn-ea"/>
+                <a:cs typeface="Arial" panose="020B0604020202020204" pitchFamily="34" charset="0"/>
+              </a:defRPr>
+            </a:lvl3pPr>
+            <a:lvl4pPr marL="1600200" indent="-228600" algn="l" defTabSz="914400" rtl="0" eaLnBrk="1" latinLnBrk="0" hangingPunct="1">
+              <a:spcBef>
+                <a:spcPct val="20000"/>
+              </a:spcBef>
+              <a:buFont typeface="Wingdings" panose="05000000000000000000" pitchFamily="2" charset="2"/>
+              <a:buChar char="§"/>
+              <a:defRPr lang="de-DE" sz="1400" kern="1200" baseline="0" dirty="0" smtClean="0">
+                <a:solidFill>
+                  <a:schemeClr val="tx1"/>
+                </a:solidFill>
+                <a:latin typeface="Arial" panose="020B0604020202020204" pitchFamily="34" charset="0"/>
+                <a:ea typeface="+mn-ea"/>
+                <a:cs typeface="Arial" panose="020B0604020202020204" pitchFamily="34" charset="0"/>
+              </a:defRPr>
+            </a:lvl4pPr>
+            <a:lvl5pPr marL="2057400" indent="-228600" algn="l" defTabSz="914400" rtl="0" eaLnBrk="1" latinLnBrk="0" hangingPunct="1">
+              <a:spcBef>
+                <a:spcPct val="20000"/>
+              </a:spcBef>
+              <a:buFont typeface="Wingdings" panose="05000000000000000000" pitchFamily="2" charset="2"/>
+              <a:buChar char="§"/>
+              <a:defRPr lang="de-DE" sz="1400" kern="1200" baseline="0" dirty="0">
+                <a:solidFill>
+                  <a:schemeClr val="tx1"/>
+                </a:solidFill>
+                <a:latin typeface="Arial" panose="020B0604020202020204" pitchFamily="34" charset="0"/>
+                <a:ea typeface="+mn-ea"/>
+                <a:cs typeface="Arial" panose="020B0604020202020204" pitchFamily="34" charset="0"/>
+              </a:defRPr>
+            </a:lvl5pPr>
+            <a:lvl6pPr marL="2514600" indent="-228600" algn="l" defTabSz="914400" rtl="0" eaLnBrk="1" latinLnBrk="0" hangingPunct="1">
+              <a:spcBef>
+                <a:spcPct val="20000"/>
+              </a:spcBef>
+              <a:buFont typeface="Arial" panose="020B0604020202020204" pitchFamily="34" charset="0"/>
+              <a:buChar char="•"/>
+              <a:defRPr sz="2000" kern="1200">
+                <a:solidFill>
+                  <a:schemeClr val="tx1"/>
+                </a:solidFill>
+                <a:latin typeface="+mn-lt"/>
+                <a:ea typeface="+mn-ea"/>
+                <a:cs typeface="+mn-cs"/>
+              </a:defRPr>
+            </a:lvl6pPr>
+            <a:lvl7pPr marL="2971800" indent="-228600" algn="l" defTabSz="914400" rtl="0" eaLnBrk="1" latinLnBrk="0" hangingPunct="1">
+              <a:spcBef>
+                <a:spcPct val="20000"/>
+              </a:spcBef>
+              <a:buFont typeface="Arial" panose="020B0604020202020204" pitchFamily="34" charset="0"/>
+              <a:buChar char="•"/>
+              <a:defRPr sz="2000" kern="1200">
+                <a:solidFill>
+                  <a:schemeClr val="tx1"/>
+                </a:solidFill>
+                <a:latin typeface="+mn-lt"/>
+                <a:ea typeface="+mn-ea"/>
+                <a:cs typeface="+mn-cs"/>
+              </a:defRPr>
+            </a:lvl7pPr>
+            <a:lvl8pPr marL="3429000" indent="-228600" algn="l" defTabSz="914400" rtl="0" eaLnBrk="1" latinLnBrk="0" hangingPunct="1">
+              <a:spcBef>
+                <a:spcPct val="20000"/>
+              </a:spcBef>
+              <a:buFont typeface="Arial" panose="020B0604020202020204" pitchFamily="34" charset="0"/>
+              <a:buChar char="•"/>
+              <a:defRPr sz="2000" kern="1200">
+                <a:solidFill>
+                  <a:schemeClr val="tx1"/>
+                </a:solidFill>
+                <a:latin typeface="+mn-lt"/>
+                <a:ea typeface="+mn-ea"/>
+                <a:cs typeface="+mn-cs"/>
+              </a:defRPr>
+            </a:lvl8pPr>
+            <a:lvl9pPr marL="3886200" indent="-228600" algn="l" defTabSz="914400" rtl="0" eaLnBrk="1" latinLnBrk="0" hangingPunct="1">
+              <a:spcBef>
+                <a:spcPct val="20000"/>
+              </a:spcBef>
+              <a:buFont typeface="Arial" panose="020B0604020202020204" pitchFamily="34" charset="0"/>
+              <a:buChar char="•"/>
+              <a:defRPr sz="2000" kern="1200">
+                <a:solidFill>
+                  <a:schemeClr val="tx1"/>
+                </a:solidFill>
+                <a:latin typeface="+mn-lt"/>
+                <a:ea typeface="+mn-ea"/>
+                <a:cs typeface="+mn-cs"/>
+              </a:defRPr>
+            </a:lvl9pPr>
+          </a:lstStyle>
+          <a:p>
+            <a:r>
+              <a:rPr lang="de-DE" dirty="0" err="1" smtClean="0"/>
+              <a:t>assign</a:t>
+            </a:r>
+            <a:r>
+              <a:rPr lang="de-DE" dirty="0" err="1" smtClean="0"/>
+              <a:t>BlobsIn</a:t>
+            </a:r>
+            <a:r>
+              <a:rPr lang="de-DE" dirty="0" err="1" smtClean="0"/>
+              <a:t>Occlusion</a:t>
+            </a:r>
+            <a:endParaRPr lang="de-DE" dirty="0" smtClean="0"/>
+          </a:p>
+          <a:p>
+            <a:pPr lvl="1">
+              <a:buFont typeface="Arial" panose="020B0604020202020204" pitchFamily="34" charset="0"/>
+              <a:buChar char="-"/>
+            </a:pPr>
+            <a:r>
+              <a:rPr lang="de-DE" dirty="0" smtClean="0"/>
+              <a:t>update </a:t>
+            </a:r>
+            <a:r>
+              <a:rPr lang="de-DE" dirty="0" err="1" smtClean="0"/>
+              <a:t>occluded</a:t>
+            </a:r>
+            <a:r>
+              <a:rPr lang="de-DE" dirty="0" smtClean="0"/>
+              <a:t> </a:t>
+            </a:r>
+            <a:r>
+              <a:rPr lang="de-DE" dirty="0" err="1" smtClean="0"/>
+              <a:t>tracks</a:t>
+            </a:r>
+            <a:r>
+              <a:rPr lang="de-DE" dirty="0" smtClean="0"/>
+              <a:t>, </a:t>
+            </a:r>
+            <a:r>
+              <a:rPr lang="de-DE" dirty="0" err="1" smtClean="0"/>
+              <a:t>delete</a:t>
+            </a:r>
+            <a:r>
+              <a:rPr lang="de-DE" dirty="0" smtClean="0"/>
+              <a:t> </a:t>
+            </a:r>
+            <a:r>
+              <a:rPr lang="de-DE" dirty="0" err="1" smtClean="0"/>
+              <a:t>related</a:t>
+            </a:r>
+            <a:r>
+              <a:rPr lang="de-DE" dirty="0" smtClean="0"/>
+              <a:t> </a:t>
+            </a:r>
+            <a:r>
+              <a:rPr lang="de-DE" dirty="0" err="1" smtClean="0"/>
+              <a:t>blobs</a:t>
+            </a:r>
+            <a:endParaRPr lang="de-DE" dirty="0" smtClean="0"/>
+          </a:p>
+          <a:p>
+            <a:pPr lvl="1">
+              <a:buFont typeface="Arial" panose="020B0604020202020204" pitchFamily="34" charset="0"/>
+              <a:buChar char="-"/>
+            </a:pPr>
+            <a:r>
+              <a:rPr lang="de-DE" dirty="0" err="1" smtClean="0"/>
+              <a:t>case</a:t>
+            </a:r>
+            <a:r>
+              <a:rPr lang="de-DE" dirty="0" smtClean="0"/>
+              <a:t> </a:t>
+            </a:r>
+            <a:r>
+              <a:rPr lang="de-DE" dirty="0" err="1" smtClean="0"/>
+              <a:t>blobs</a:t>
+            </a:r>
+            <a:r>
+              <a:rPr lang="de-DE" dirty="0" smtClean="0"/>
+              <a:t> in </a:t>
+            </a:r>
+            <a:r>
+              <a:rPr lang="de-DE" dirty="0" err="1" smtClean="0"/>
+              <a:t>occlusion</a:t>
+            </a:r>
+            <a:r>
+              <a:rPr lang="de-DE" dirty="0" smtClean="0"/>
+              <a:t>:</a:t>
+            </a:r>
+          </a:p>
+          <a:p>
+            <a:pPr lvl="2"/>
+            <a:r>
+              <a:rPr lang="de-DE" dirty="0" smtClean="0"/>
+              <a:t>0: </a:t>
+            </a:r>
+            <a:r>
+              <a:rPr lang="de-DE" dirty="0" err="1" smtClean="0"/>
+              <a:t>regular</a:t>
+            </a:r>
+            <a:r>
+              <a:rPr lang="de-DE" dirty="0"/>
+              <a:t> </a:t>
+            </a:r>
+            <a:r>
+              <a:rPr lang="de-DE" dirty="0" err="1" smtClean="0"/>
+              <a:t>track</a:t>
+            </a:r>
+            <a:r>
+              <a:rPr lang="de-DE" dirty="0" smtClean="0"/>
+              <a:t> update w/o </a:t>
+            </a:r>
+            <a:r>
+              <a:rPr lang="de-DE" dirty="0" err="1" smtClean="0"/>
+              <a:t>blobs</a:t>
+            </a:r>
+            <a:r>
+              <a:rPr lang="de-DE" dirty="0" smtClean="0"/>
+              <a:t> (</a:t>
+            </a:r>
+            <a:r>
+              <a:rPr lang="de-DE" dirty="0" err="1" smtClean="0"/>
+              <a:t>cals</a:t>
+            </a:r>
+            <a:r>
+              <a:rPr lang="de-DE" dirty="0" smtClean="0"/>
+              <a:t> </a:t>
+            </a:r>
+            <a:r>
+              <a:rPr lang="de-DE" dirty="0" err="1" smtClean="0"/>
+              <a:t>subst</a:t>
+            </a:r>
+            <a:r>
+              <a:rPr lang="de-DE" dirty="0" smtClean="0"/>
+              <a:t> </a:t>
+            </a:r>
+            <a:r>
+              <a:rPr lang="de-DE" dirty="0" err="1" smtClean="0"/>
+              <a:t>value</a:t>
+            </a:r>
+            <a:r>
+              <a:rPr lang="de-DE" dirty="0" smtClean="0"/>
+              <a:t>, </a:t>
+            </a:r>
+            <a:r>
+              <a:rPr lang="de-DE" dirty="0" err="1" smtClean="0"/>
+              <a:t>decrease</a:t>
+            </a:r>
+            <a:r>
+              <a:rPr lang="de-DE" dirty="0" smtClean="0"/>
+              <a:t> </a:t>
+            </a:r>
+            <a:r>
+              <a:rPr lang="de-DE" dirty="0" err="1" smtClean="0"/>
+              <a:t>confidence</a:t>
+            </a:r>
+            <a:r>
+              <a:rPr lang="de-DE" dirty="0" smtClean="0"/>
+              <a:t>)</a:t>
+            </a:r>
+          </a:p>
+          <a:p>
+            <a:pPr lvl="2"/>
+            <a:r>
+              <a:rPr lang="de-DE" dirty="0" smtClean="0"/>
+              <a:t>1: </a:t>
+            </a:r>
+            <a:r>
+              <a:rPr lang="de-DE" dirty="0" err="1" smtClean="0"/>
+              <a:t>calc</a:t>
+            </a:r>
+            <a:r>
+              <a:rPr lang="de-DE" dirty="0" smtClean="0"/>
+              <a:t> </a:t>
+            </a:r>
+            <a:r>
+              <a:rPr lang="de-DE" dirty="0" err="1" smtClean="0"/>
+              <a:t>subst</a:t>
+            </a:r>
+            <a:r>
+              <a:rPr lang="de-DE" dirty="0" smtClean="0"/>
+              <a:t> </a:t>
+            </a:r>
+            <a:r>
+              <a:rPr lang="de-DE" dirty="0" err="1" smtClean="0"/>
+              <a:t>value</a:t>
+            </a:r>
+            <a:r>
+              <a:rPr lang="de-DE" dirty="0" smtClean="0"/>
+              <a:t>, </a:t>
+            </a:r>
+            <a:r>
+              <a:rPr lang="de-DE" dirty="0" err="1" smtClean="0"/>
+              <a:t>keep</a:t>
+            </a:r>
+            <a:r>
+              <a:rPr lang="de-DE" dirty="0" smtClean="0"/>
+              <a:t> </a:t>
+            </a:r>
+            <a:r>
+              <a:rPr lang="de-DE" dirty="0" err="1" smtClean="0"/>
+              <a:t>confidence</a:t>
+            </a:r>
+            <a:r>
+              <a:rPr lang="de-DE" dirty="0" smtClean="0"/>
+              <a:t> (</a:t>
+            </a:r>
+            <a:r>
+              <a:rPr lang="de-DE" dirty="0" err="1" smtClean="0"/>
+              <a:t>no</a:t>
+            </a:r>
+            <a:r>
+              <a:rPr lang="de-DE" dirty="0" smtClean="0"/>
+              <a:t> </a:t>
+            </a:r>
+            <a:r>
+              <a:rPr lang="de-DE" dirty="0" err="1" smtClean="0"/>
+              <a:t>regular</a:t>
+            </a:r>
+            <a:r>
+              <a:rPr lang="de-DE" dirty="0" smtClean="0"/>
+              <a:t> </a:t>
+            </a:r>
+            <a:r>
+              <a:rPr lang="de-DE" dirty="0" err="1" smtClean="0"/>
+              <a:t>track</a:t>
+            </a:r>
+            <a:r>
+              <a:rPr lang="de-DE" dirty="0" smtClean="0"/>
+              <a:t> update)</a:t>
+            </a:r>
+          </a:p>
+          <a:p>
+            <a:pPr lvl="2"/>
+            <a:r>
+              <a:rPr lang="de-DE" dirty="0" smtClean="0"/>
+              <a:t>2 </a:t>
+            </a:r>
+            <a:r>
+              <a:rPr lang="de-DE" dirty="0" err="1" smtClean="0"/>
+              <a:t>or</a:t>
+            </a:r>
+            <a:r>
+              <a:rPr lang="de-DE" dirty="0" smtClean="0"/>
+              <a:t> </a:t>
+            </a:r>
+            <a:r>
+              <a:rPr lang="de-DE" dirty="0" err="1" smtClean="0"/>
+              <a:t>more</a:t>
+            </a:r>
+            <a:r>
+              <a:rPr lang="de-DE" dirty="0" smtClean="0"/>
+              <a:t>: </a:t>
+            </a:r>
+            <a:r>
+              <a:rPr lang="de-DE" dirty="0" err="1" smtClean="0"/>
+              <a:t>regular</a:t>
+            </a:r>
+            <a:r>
+              <a:rPr lang="de-DE" dirty="0" smtClean="0"/>
+              <a:t> </a:t>
+            </a:r>
+            <a:r>
+              <a:rPr lang="de-DE" dirty="0" err="1" smtClean="0"/>
+              <a:t>track</a:t>
+            </a:r>
+            <a:r>
+              <a:rPr lang="de-DE" dirty="0" smtClean="0"/>
+              <a:t> update </a:t>
+            </a:r>
+            <a:r>
+              <a:rPr lang="de-DE" dirty="0" err="1" smtClean="0"/>
+              <a:t>with</a:t>
+            </a:r>
+            <a:r>
+              <a:rPr lang="de-DE" dirty="0" smtClean="0"/>
+              <a:t> </a:t>
+            </a:r>
+            <a:r>
+              <a:rPr lang="de-DE" dirty="0" err="1" smtClean="0"/>
+              <a:t>blobs</a:t>
+            </a:r>
+            <a:endParaRPr lang="de-DE" dirty="0" smtClean="0"/>
+          </a:p>
+          <a:p>
+            <a:pPr lvl="1">
+              <a:buFont typeface="Calibri" panose="020F0502020204030204" pitchFamily="34" charset="0"/>
+              <a:buChar char="-"/>
+            </a:pPr>
+            <a:r>
+              <a:rPr lang="de-DE" smtClean="0"/>
+              <a:t>adjust</a:t>
+            </a:r>
+            <a:r>
+              <a:rPr lang="de-DE" smtClean="0"/>
+              <a:t>Occlusion</a:t>
+            </a:r>
+            <a:endParaRPr lang="de-DE" dirty="0" smtClean="0"/>
+          </a:p>
+          <a:p>
+            <a:pPr lvl="1">
+              <a:buFont typeface="Arial" panose="020B0604020202020204" pitchFamily="34" charset="0"/>
+              <a:buChar char="-"/>
+            </a:pPr>
+            <a:endParaRPr lang="de-DE" dirty="0"/>
+          </a:p>
+          <a:p>
+            <a:r>
+              <a:rPr lang="de-DE" dirty="0" err="1" smtClean="0"/>
+              <a:t>assignBlobs</a:t>
+            </a:r>
+            <a:endParaRPr lang="de-DE" dirty="0" smtClean="0"/>
+          </a:p>
+          <a:p>
+            <a:pPr lvl="1">
+              <a:buFont typeface="Calibri" panose="020F0502020204030204" pitchFamily="34" charset="0"/>
+              <a:buChar char="-"/>
+            </a:pPr>
+            <a:r>
+              <a:rPr lang="de-DE" dirty="0" err="1" smtClean="0"/>
+              <a:t>assign</a:t>
+            </a:r>
+            <a:r>
+              <a:rPr lang="de-DE" dirty="0" smtClean="0"/>
+              <a:t> </a:t>
+            </a:r>
+            <a:r>
+              <a:rPr lang="de-DE" dirty="0" err="1" smtClean="0"/>
+              <a:t>remaining</a:t>
+            </a:r>
+            <a:r>
+              <a:rPr lang="de-DE" dirty="0" smtClean="0"/>
+              <a:t> </a:t>
+            </a:r>
+            <a:r>
+              <a:rPr lang="de-DE" dirty="0" err="1" smtClean="0"/>
+              <a:t>blobs</a:t>
+            </a:r>
+            <a:r>
+              <a:rPr lang="de-DE" dirty="0" smtClean="0"/>
+              <a:t> </a:t>
+            </a:r>
+            <a:r>
+              <a:rPr lang="de-DE" dirty="0" err="1" smtClean="0"/>
+              <a:t>to</a:t>
+            </a:r>
+            <a:r>
+              <a:rPr lang="de-DE" dirty="0" smtClean="0"/>
+              <a:t> </a:t>
+            </a:r>
+            <a:r>
+              <a:rPr lang="de-DE" dirty="0" err="1" smtClean="0"/>
+              <a:t>tracks</a:t>
+            </a:r>
+            <a:r>
+              <a:rPr lang="de-DE" dirty="0" smtClean="0"/>
+              <a:t> outside </a:t>
+            </a:r>
+            <a:r>
+              <a:rPr lang="de-DE" dirty="0" err="1" smtClean="0"/>
+              <a:t>occlusion</a:t>
+            </a:r>
+            <a:endParaRPr lang="de-DE" dirty="0" smtClean="0"/>
+          </a:p>
+          <a:p>
+            <a:pPr marL="180975" lvl="1"/>
+            <a:endParaRPr lang="de-DE" sz="1200" dirty="0"/>
+          </a:p>
+          <a:p>
+            <a:r>
+              <a:rPr lang="de-DE" dirty="0" err="1"/>
+              <a:t>deleteMarkedTracks</a:t>
+            </a:r>
+            <a:endParaRPr lang="de-DE" dirty="0"/>
+          </a:p>
+          <a:p>
+            <a:r>
+              <a:rPr lang="de-DE" dirty="0" err="1"/>
+              <a:t>deleteReversingTracks</a:t>
+            </a:r>
+            <a:endParaRPr lang="de-DE" dirty="0"/>
+          </a:p>
+          <a:p>
+            <a:r>
+              <a:rPr lang="de-DE" dirty="0" err="1"/>
+              <a:t>combineBlobs</a:t>
+            </a:r>
+            <a:endParaRPr lang="de-DE" dirty="0"/>
+          </a:p>
+          <a:p>
+            <a:r>
+              <a:rPr lang="de-DE" dirty="0" err="1"/>
+              <a:t>deleteMarkedOcclusion</a:t>
+            </a:r>
+            <a:endParaRPr lang="de-DE" dirty="0"/>
+          </a:p>
+          <a:p>
+            <a:pPr lvl="2"/>
+            <a:endParaRPr lang="de-DE" dirty="0"/>
+          </a:p>
+        </p:txBody>
+      </p:sp>
+    </p:spTree>
+    <p:extLst>
+      <p:ext uri="{BB962C8B-B14F-4D97-AF65-F5344CB8AC3E}">
+        <p14:creationId xmlns:p14="http://schemas.microsoft.com/office/powerpoint/2010/main" val="2590192625"/>
+      </p:ext>
+    </p:extLst>
+  </p:cSld>
+  <p:clrMapOvr>
+    <a:masterClrMapping/>
+  </p:clrMapOvr>
 </p:sld>
 </file>
 

</xml_diff>